<commit_message>
Add forward_list slide to the presentation
</commit_message>
<xml_diff>
--- a/03_containrers_and_initialization/03_containers.pptx
+++ b/03_containrers_and_initialization/03_containers.pptx
@@ -5,10 +5,10 @@
     <p:sldMasterId id="2147483704" r:id="rId1"/>
   </p:sldMasterIdLst>
   <p:notesMasterIdLst>
-    <p:notesMasterId r:id="rId29"/>
+    <p:notesMasterId r:id="rId30"/>
   </p:notesMasterIdLst>
   <p:handoutMasterIdLst>
-    <p:handoutMasterId r:id="rId30"/>
+    <p:handoutMasterId r:id="rId31"/>
   </p:handoutMasterIdLst>
   <p:sldIdLst>
     <p:sldId id="297" r:id="rId2"/>
@@ -27,17 +27,18 @@
     <p:sldId id="568" r:id="rId15"/>
     <p:sldId id="592" r:id="rId16"/>
     <p:sldId id="593" r:id="rId17"/>
-    <p:sldId id="594" r:id="rId18"/>
-    <p:sldId id="586" r:id="rId19"/>
-    <p:sldId id="578" r:id="rId20"/>
-    <p:sldId id="579" r:id="rId21"/>
-    <p:sldId id="580" r:id="rId22"/>
-    <p:sldId id="587" r:id="rId23"/>
-    <p:sldId id="581" r:id="rId24"/>
-    <p:sldId id="582" r:id="rId25"/>
-    <p:sldId id="584" r:id="rId26"/>
-    <p:sldId id="583" r:id="rId27"/>
-    <p:sldId id="585" r:id="rId28"/>
+    <p:sldId id="595" r:id="rId18"/>
+    <p:sldId id="594" r:id="rId19"/>
+    <p:sldId id="586" r:id="rId20"/>
+    <p:sldId id="578" r:id="rId21"/>
+    <p:sldId id="579" r:id="rId22"/>
+    <p:sldId id="580" r:id="rId23"/>
+    <p:sldId id="587" r:id="rId24"/>
+    <p:sldId id="581" r:id="rId25"/>
+    <p:sldId id="582" r:id="rId26"/>
+    <p:sldId id="584" r:id="rId27"/>
+    <p:sldId id="583" r:id="rId28"/>
+    <p:sldId id="585" r:id="rId29"/>
   </p:sldIdLst>
   <p:sldSz cx="9144000" cy="5143500" type="screen16x9"/>
   <p:notesSz cx="6858000" cy="9144000"/>
@@ -267,7 +268,7 @@
                 <a:latin typeface="Intel Clear"/>
               </a:rPr>
               <a:pPr/>
-              <a:t>8/5/2020</a:t>
+              <a:t>8/6/2020</a:t>
             </a:fld>
             <a:endParaRPr lang="en-US" dirty="0">
               <a:latin typeface="Intel Clear"/>
@@ -447,7 +448,7 @@
             <a:fld id="{ED7FC5FE-6F0D-D34A-8EE6-C95B4F5F4DC8}" type="datetimeFigureOut">
               <a:rPr lang="en-US" smtClean="0"/>
               <a:pPr/>
-              <a:t>8/5/2020</a:t>
+              <a:t>8/6/2020</a:t>
             </a:fld>
             <a:endParaRPr lang="en-US" dirty="0"/>
           </a:p>
@@ -1135,7 +1136,7 @@
     </p:spTree>
     <p:extLst>
       <p:ext uri="{BB962C8B-B14F-4D97-AF65-F5344CB8AC3E}">
-        <p14:creationId xmlns:p14="http://schemas.microsoft.com/office/powerpoint/2010/main" val="3396596519"/>
+        <p14:creationId xmlns:p14="http://schemas.microsoft.com/office/powerpoint/2010/main" val="668160158"/>
       </p:ext>
     </p:extLst>
   </p:cSld>
@@ -1220,7 +1221,7 @@
     </p:spTree>
     <p:extLst>
       <p:ext uri="{BB962C8B-B14F-4D97-AF65-F5344CB8AC3E}">
-        <p14:creationId xmlns:p14="http://schemas.microsoft.com/office/powerpoint/2010/main" val="2236508556"/>
+        <p14:creationId xmlns:p14="http://schemas.microsoft.com/office/powerpoint/2010/main" val="3396596519"/>
       </p:ext>
     </p:extLst>
   </p:cSld>
@@ -1305,7 +1306,7 @@
     </p:spTree>
     <p:extLst>
       <p:ext uri="{BB962C8B-B14F-4D97-AF65-F5344CB8AC3E}">
-        <p14:creationId xmlns:p14="http://schemas.microsoft.com/office/powerpoint/2010/main" val="3551871"/>
+        <p14:creationId xmlns:p14="http://schemas.microsoft.com/office/powerpoint/2010/main" val="2236508556"/>
       </p:ext>
     </p:extLst>
   </p:cSld>
@@ -1390,7 +1391,7 @@
     </p:spTree>
     <p:extLst>
       <p:ext uri="{BB962C8B-B14F-4D97-AF65-F5344CB8AC3E}">
-        <p14:creationId xmlns:p14="http://schemas.microsoft.com/office/powerpoint/2010/main" val="1727388009"/>
+        <p14:creationId xmlns:p14="http://schemas.microsoft.com/office/powerpoint/2010/main" val="3551871"/>
       </p:ext>
     </p:extLst>
   </p:cSld>
@@ -1475,7 +1476,7 @@
     </p:spTree>
     <p:extLst>
       <p:ext uri="{BB962C8B-B14F-4D97-AF65-F5344CB8AC3E}">
-        <p14:creationId xmlns:p14="http://schemas.microsoft.com/office/powerpoint/2010/main" val="429259567"/>
+        <p14:creationId xmlns:p14="http://schemas.microsoft.com/office/powerpoint/2010/main" val="1727388009"/>
       </p:ext>
     </p:extLst>
   </p:cSld>
@@ -1560,7 +1561,7 @@
     </p:spTree>
     <p:extLst>
       <p:ext uri="{BB962C8B-B14F-4D97-AF65-F5344CB8AC3E}">
-        <p14:creationId xmlns:p14="http://schemas.microsoft.com/office/powerpoint/2010/main" val="4273929379"/>
+        <p14:creationId xmlns:p14="http://schemas.microsoft.com/office/powerpoint/2010/main" val="429259567"/>
       </p:ext>
     </p:extLst>
   </p:cSld>
@@ -1645,7 +1646,7 @@
     </p:spTree>
     <p:extLst>
       <p:ext uri="{BB962C8B-B14F-4D97-AF65-F5344CB8AC3E}">
-        <p14:creationId xmlns:p14="http://schemas.microsoft.com/office/powerpoint/2010/main" val="3175580494"/>
+        <p14:creationId xmlns:p14="http://schemas.microsoft.com/office/powerpoint/2010/main" val="4273929379"/>
       </p:ext>
     </p:extLst>
   </p:cSld>
@@ -1815,7 +1816,7 @@
     </p:spTree>
     <p:extLst>
       <p:ext uri="{BB962C8B-B14F-4D97-AF65-F5344CB8AC3E}">
-        <p14:creationId xmlns:p14="http://schemas.microsoft.com/office/powerpoint/2010/main" val="506520848"/>
+        <p14:creationId xmlns:p14="http://schemas.microsoft.com/office/powerpoint/2010/main" val="3175580494"/>
       </p:ext>
     </p:extLst>
   </p:cSld>
@@ -1900,7 +1901,7 @@
     </p:spTree>
     <p:extLst>
       <p:ext uri="{BB962C8B-B14F-4D97-AF65-F5344CB8AC3E}">
-        <p14:creationId xmlns:p14="http://schemas.microsoft.com/office/powerpoint/2010/main" val="4145146278"/>
+        <p14:creationId xmlns:p14="http://schemas.microsoft.com/office/powerpoint/2010/main" val="506520848"/>
       </p:ext>
     </p:extLst>
   </p:cSld>
@@ -1985,7 +1986,7 @@
     </p:spTree>
     <p:extLst>
       <p:ext uri="{BB962C8B-B14F-4D97-AF65-F5344CB8AC3E}">
-        <p14:creationId xmlns:p14="http://schemas.microsoft.com/office/powerpoint/2010/main" val="2619672578"/>
+        <p14:creationId xmlns:p14="http://schemas.microsoft.com/office/powerpoint/2010/main" val="4145146278"/>
       </p:ext>
     </p:extLst>
   </p:cSld>
@@ -2062,6 +2063,91 @@
               <a:rPr lang="en-US" smtClean="0"/>
               <a:pPr/>
               <a:t>27</a:t>
+            </a:fld>
+            <a:endParaRPr lang="en-US" dirty="0"/>
+          </a:p>
+        </p:txBody>
+      </p:sp>
+    </p:spTree>
+    <p:extLst>
+      <p:ext uri="{BB962C8B-B14F-4D97-AF65-F5344CB8AC3E}">
+        <p14:creationId xmlns:p14="http://schemas.microsoft.com/office/powerpoint/2010/main" val="2619672578"/>
+      </p:ext>
+    </p:extLst>
+  </p:cSld>
+  <p:clrMapOvr>
+    <a:masterClrMapping/>
+  </p:clrMapOvr>
+</p:notes>
+</file>
+
+<file path=ppt/notesSlides/notesSlide24.xml><?xml version="1.0" encoding="utf-8"?>
+<p:notes xmlns:a="http://schemas.openxmlformats.org/drawingml/2006/main" xmlns:r="http://schemas.openxmlformats.org/officeDocument/2006/relationships" xmlns:p="http://schemas.openxmlformats.org/presentationml/2006/main">
+  <p:cSld>
+    <p:spTree>
+      <p:nvGrpSpPr>
+        <p:cNvPr id="1" name=""/>
+        <p:cNvGrpSpPr/>
+        <p:nvPr/>
+      </p:nvGrpSpPr>
+      <p:grpSpPr>
+        <a:xfrm>
+          <a:off x="0" y="0"/>
+          <a:ext cx="0" cy="0"/>
+          <a:chOff x="0" y="0"/>
+          <a:chExt cx="0" cy="0"/>
+        </a:xfrm>
+      </p:grpSpPr>
+      <p:sp>
+        <p:nvSpPr>
+          <p:cNvPr id="2" name="Slide Image Placeholder 1"/>
+          <p:cNvSpPr>
+            <a:spLocks noGrp="1" noRot="1" noChangeAspect="1"/>
+          </p:cNvSpPr>
+          <p:nvPr>
+            <p:ph type="sldImg"/>
+          </p:nvPr>
+        </p:nvSpPr>
+        <p:spPr/>
+      </p:sp>
+      <p:sp>
+        <p:nvSpPr>
+          <p:cNvPr id="3" name="Notes Placeholder 2"/>
+          <p:cNvSpPr>
+            <a:spLocks noGrp="1"/>
+          </p:cNvSpPr>
+          <p:nvPr>
+            <p:ph type="body" idx="1"/>
+          </p:nvPr>
+        </p:nvSpPr>
+        <p:spPr/>
+        <p:txBody>
+          <a:bodyPr/>
+          <a:lstStyle/>
+          <a:p>
+            <a:endParaRPr lang="en-US" dirty="0"/>
+          </a:p>
+        </p:txBody>
+      </p:sp>
+      <p:sp>
+        <p:nvSpPr>
+          <p:cNvPr id="4" name="Slide Number Placeholder 3"/>
+          <p:cNvSpPr>
+            <a:spLocks noGrp="1"/>
+          </p:cNvSpPr>
+          <p:nvPr>
+            <p:ph type="sldNum" sz="quarter" idx="10"/>
+          </p:nvPr>
+        </p:nvSpPr>
+        <p:spPr/>
+        <p:txBody>
+          <a:bodyPr/>
+          <a:lstStyle/>
+          <a:p>
+            <a:fld id="{D61C8689-8455-3546-ADF9-3B7273760F66}" type="slidenum">
+              <a:rPr lang="en-US" smtClean="0"/>
+              <a:pPr/>
+              <a:t>28</a:t>
             </a:fld>
             <a:endParaRPr lang="en-US" dirty="0"/>
           </a:p>
@@ -2823,7 +2909,7 @@
             <a:fld id="{B61BEF0D-F0BB-DE4B-95CE-6DB70DBA9567}" type="datetimeFigureOut">
               <a:rPr lang="en-US" smtClean="0"/>
               <a:pPr/>
-              <a:t>8/5/2020</a:t>
+              <a:t>8/6/2020</a:t>
             </a:fld>
             <a:endParaRPr lang="en-US" dirty="0"/>
           </a:p>
@@ -3023,7 +3109,7 @@
           <a:p>
             <a:fld id="{55C6B4A9-1611-4792-9094-5F34BCA07E0B}" type="datetimeFigureOut">
               <a:rPr lang="en-US" smtClean="0"/>
-              <a:t>8/5/2020</a:t>
+              <a:t>8/6/2020</a:t>
             </a:fld>
             <a:endParaRPr lang="en-US" dirty="0"/>
           </a:p>
@@ -3234,7 +3320,7 @@
             <a:fld id="{B61BEF0D-F0BB-DE4B-95CE-6DB70DBA9567}" type="datetimeFigureOut">
               <a:rPr lang="en-US" smtClean="0"/>
               <a:pPr/>
-              <a:t>8/5/2020</a:t>
+              <a:t>8/6/2020</a:t>
             </a:fld>
             <a:endParaRPr lang="en-US" dirty="0"/>
           </a:p>
@@ -3626,7 +3712,7 @@
           <a:noFill/>
           <a:extLst>
             <a:ext uri="{909E8E84-426E-40dd-AFC4-6F175D3DCCD1}">
-              <a14:hiddenFill xmlns="" xmlns:a14="http://schemas.microsoft.com/office/drawing/2010/main">
+              <a14:hiddenFill xmlns:a14="http://schemas.microsoft.com/office/drawing/2010/main" xmlns="">
                 <a:solidFill>
                   <a:srgbClr val="FFFFFF"/>
                 </a:solidFill>
@@ -5651,7 +5737,7 @@
             <a:fld id="{B61BEF0D-F0BB-DE4B-95CE-6DB70DBA9567}" type="datetimeFigureOut">
               <a:rPr lang="en-US" smtClean="0"/>
               <a:pPr/>
-              <a:t>8/5/2020</a:t>
+              <a:t>8/6/2020</a:t>
             </a:fld>
             <a:endParaRPr lang="en-US" dirty="0"/>
           </a:p>
@@ -6854,7 +6940,7 @@
             <a:fld id="{B61BEF0D-F0BB-DE4B-95CE-6DB70DBA9567}" type="datetimeFigureOut">
               <a:rPr lang="en-US" smtClean="0"/>
               <a:pPr/>
-              <a:t>8/5/2020</a:t>
+              <a:t>8/6/2020</a:t>
             </a:fld>
             <a:endParaRPr lang="en-US" dirty="0"/>
           </a:p>
@@ -7121,7 +7207,7 @@
           <a:p>
             <a:fld id="{EB712588-04B1-427B-82EE-E8DB90309F08}" type="datetimeFigureOut">
               <a:rPr lang="en-US" smtClean="0"/>
-              <a:t>8/5/2020</a:t>
+              <a:t>8/6/2020</a:t>
             </a:fld>
             <a:endParaRPr lang="en-US" dirty="0"/>
           </a:p>
@@ -7536,7 +7622,7 @@
             <a:fld id="{B61BEF0D-F0BB-DE4B-95CE-6DB70DBA9567}" type="datetimeFigureOut">
               <a:rPr lang="en-US" smtClean="0"/>
               <a:pPr/>
-              <a:t>8/5/2020</a:t>
+              <a:t>8/6/2020</a:t>
             </a:fld>
             <a:endParaRPr lang="en-US" dirty="0"/>
           </a:p>
@@ -7680,7 +7766,7 @@
             <a:fld id="{B61BEF0D-F0BB-DE4B-95CE-6DB70DBA9567}" type="datetimeFigureOut">
               <a:rPr lang="en-US" smtClean="0"/>
               <a:pPr/>
-              <a:t>8/5/2020</a:t>
+              <a:t>8/6/2020</a:t>
             </a:fld>
             <a:endParaRPr lang="en-US" dirty="0"/>
           </a:p>
@@ -7807,7 +7893,7 @@
             <a:fld id="{B61BEF0D-F0BB-DE4B-95CE-6DB70DBA9567}" type="datetimeFigureOut">
               <a:rPr lang="en-US" smtClean="0"/>
               <a:pPr/>
-              <a:t>8/5/2020</a:t>
+              <a:t>8/6/2020</a:t>
             </a:fld>
             <a:endParaRPr lang="en-US" dirty="0"/>
           </a:p>
@@ -8131,7 +8217,7 @@
           <a:p>
             <a:fld id="{42A54C80-263E-416B-A8E0-580EDEADCBDC}" type="datetimeFigureOut">
               <a:rPr lang="en-US" smtClean="0"/>
-              <a:t>8/5/2020</a:t>
+              <a:t>8/6/2020</a:t>
             </a:fld>
             <a:endParaRPr lang="en-US" dirty="0"/>
           </a:p>
@@ -8422,7 +8508,7 @@
             <a:fld id="{B61BEF0D-F0BB-DE4B-95CE-6DB70DBA9567}" type="datetimeFigureOut">
               <a:rPr lang="en-US" smtClean="0"/>
               <a:pPr/>
-              <a:t>8/5/2020</a:t>
+              <a:t>8/6/2020</a:t>
             </a:fld>
             <a:endParaRPr lang="en-US" dirty="0"/>
           </a:p>
@@ -8666,7 +8752,7 @@
             <a:fld id="{B61BEF0D-F0BB-DE4B-95CE-6DB70DBA9567}" type="datetimeFigureOut">
               <a:rPr lang="en-US" smtClean="0"/>
               <a:pPr/>
-              <a:t>8/5/2020</a:t>
+              <a:t>8/6/2020</a:t>
             </a:fld>
             <a:endParaRPr lang="en-US" dirty="0"/>
           </a:p>
@@ -14466,270 +14552,6 @@
       </p:grpSpPr>
       <p:sp>
         <p:nvSpPr>
-          <p:cNvPr id="5" name="Content Placeholder 2"/>
-          <p:cNvSpPr txBox="1">
-            <a:spLocks/>
-          </p:cNvSpPr>
-          <p:nvPr/>
-        </p:nvSpPr>
-        <p:spPr>
-          <a:xfrm>
-            <a:off x="558800" y="943032"/>
-            <a:ext cx="8342313" cy="3394472"/>
-          </a:xfrm>
-          <a:prstGeom prst="rect">
-            <a:avLst/>
-          </a:prstGeom>
-        </p:spPr>
-        <p:txBody>
-          <a:bodyPr>
-            <a:normAutofit/>
-          </a:bodyPr>
-          <a:lstStyle>
-            <a:lvl1pPr marL="0" indent="0" algn="l" defTabSz="457200" rtl="0" eaLnBrk="1" latinLnBrk="0" hangingPunct="1">
-              <a:spcBef>
-                <a:spcPts val="1200"/>
-              </a:spcBef>
-              <a:spcAft>
-                <a:spcPts val="0"/>
-              </a:spcAft>
-              <a:buFont typeface="Wingdings" panose="05000000000000000000" pitchFamily="2" charset="2"/>
-              <a:buNone/>
-              <a:defRPr sz="1800" b="0" kern="1200">
-                <a:solidFill>
-                  <a:srgbClr val="0071C5"/>
-                </a:solidFill>
-                <a:latin typeface="+mn-lt"/>
-                <a:ea typeface="+mn-ea"/>
-                <a:cs typeface="Intel Clear" panose="020B0604020203020204" pitchFamily="34" charset="0"/>
-              </a:defRPr>
-            </a:lvl1pPr>
-            <a:lvl2pPr marL="225425" indent="-225425" algn="l" defTabSz="457200" rtl="0" eaLnBrk="1" latinLnBrk="0" hangingPunct="1">
-              <a:spcBef>
-                <a:spcPts val="1200"/>
-              </a:spcBef>
-              <a:buFont typeface="Wingdings" charset="2"/>
-              <a:buChar char="§"/>
-              <a:defRPr sz="1600" kern="1200" baseline="0">
-                <a:solidFill>
-                  <a:schemeClr val="tx2"/>
-                </a:solidFill>
-                <a:latin typeface="+mn-lt"/>
-                <a:ea typeface="+mn-ea"/>
-                <a:cs typeface="Intel Clear" panose="020B0604020203020204" pitchFamily="34" charset="0"/>
-              </a:defRPr>
-            </a:lvl2pPr>
-            <a:lvl3pPr marL="571500" indent="-228600" algn="l" defTabSz="457200" rtl="0" eaLnBrk="1" latinLnBrk="0" hangingPunct="1">
-              <a:spcBef>
-                <a:spcPts val="800"/>
-              </a:spcBef>
-              <a:buFont typeface="Intel Clear" panose="020B0604020203020204" pitchFamily="34" charset="0"/>
-              <a:buChar char="–"/>
-              <a:defRPr sz="1600" kern="1200">
-                <a:solidFill>
-                  <a:schemeClr val="tx2"/>
-                </a:solidFill>
-                <a:latin typeface="+mn-lt"/>
-                <a:ea typeface="+mn-ea"/>
-                <a:cs typeface="Intel Clear" panose="020B0604020203020204" pitchFamily="34" charset="0"/>
-              </a:defRPr>
-            </a:lvl3pPr>
-            <a:lvl4pPr marL="969963" indent="-228600" algn="l" defTabSz="457200" rtl="0" eaLnBrk="1" latinLnBrk="0" hangingPunct="1">
-              <a:spcBef>
-                <a:spcPct val="20000"/>
-              </a:spcBef>
-              <a:buFont typeface="Arial"/>
-              <a:buChar char="–"/>
-              <a:defRPr sz="1400" kern="1200">
-                <a:solidFill>
-                  <a:schemeClr val="tx2"/>
-                </a:solidFill>
-                <a:latin typeface="+mn-lt"/>
-                <a:ea typeface="+mn-ea"/>
-                <a:cs typeface="Intel Clear" panose="020B0604020203020204" pitchFamily="34" charset="0"/>
-              </a:defRPr>
-            </a:lvl4pPr>
-            <a:lvl5pPr marL="1319213" indent="-228600" algn="l" defTabSz="457200" rtl="0" eaLnBrk="1" latinLnBrk="0" hangingPunct="1">
-              <a:spcBef>
-                <a:spcPct val="20000"/>
-              </a:spcBef>
-              <a:buFont typeface="Intel Clear" panose="020B0604020203020204" pitchFamily="34" charset="0"/>
-              <a:buChar char="–"/>
-              <a:defRPr sz="1400" kern="1200">
-                <a:solidFill>
-                  <a:schemeClr val="tx2"/>
-                </a:solidFill>
-                <a:latin typeface="+mn-lt"/>
-                <a:ea typeface="+mn-ea"/>
-                <a:cs typeface="Intel Clear" panose="020B0604020203020204" pitchFamily="34" charset="0"/>
-              </a:defRPr>
-            </a:lvl5pPr>
-            <a:lvl6pPr marL="2514600" indent="-228600" algn="l" defTabSz="457200" rtl="0" eaLnBrk="1" latinLnBrk="0" hangingPunct="1">
-              <a:spcBef>
-                <a:spcPct val="20000"/>
-              </a:spcBef>
-              <a:buFont typeface="Arial"/>
-              <a:buChar char="•"/>
-              <a:defRPr sz="2000" kern="1200">
-                <a:solidFill>
-                  <a:schemeClr val="tx1"/>
-                </a:solidFill>
-                <a:latin typeface="+mn-lt"/>
-                <a:ea typeface="+mn-ea"/>
-                <a:cs typeface="+mn-cs"/>
-              </a:defRPr>
-            </a:lvl6pPr>
-            <a:lvl7pPr marL="2971800" indent="-228600" algn="l" defTabSz="457200" rtl="0" eaLnBrk="1" latinLnBrk="0" hangingPunct="1">
-              <a:spcBef>
-                <a:spcPct val="20000"/>
-              </a:spcBef>
-              <a:buFont typeface="Arial"/>
-              <a:buChar char="•"/>
-              <a:defRPr sz="2000" kern="1200">
-                <a:solidFill>
-                  <a:schemeClr val="tx1"/>
-                </a:solidFill>
-                <a:latin typeface="+mn-lt"/>
-                <a:ea typeface="+mn-ea"/>
-                <a:cs typeface="+mn-cs"/>
-              </a:defRPr>
-            </a:lvl7pPr>
-            <a:lvl8pPr marL="3429000" indent="-228600" algn="l" defTabSz="457200" rtl="0" eaLnBrk="1" latinLnBrk="0" hangingPunct="1">
-              <a:spcBef>
-                <a:spcPct val="20000"/>
-              </a:spcBef>
-              <a:buFont typeface="Arial"/>
-              <a:buChar char="•"/>
-              <a:defRPr sz="2000" kern="1200">
-                <a:solidFill>
-                  <a:schemeClr val="tx1"/>
-                </a:solidFill>
-                <a:latin typeface="+mn-lt"/>
-                <a:ea typeface="+mn-ea"/>
-                <a:cs typeface="+mn-cs"/>
-              </a:defRPr>
-            </a:lvl8pPr>
-            <a:lvl9pPr marL="3886200" indent="-228600" algn="l" defTabSz="457200" rtl="0" eaLnBrk="1" latinLnBrk="0" hangingPunct="1">
-              <a:spcBef>
-                <a:spcPct val="20000"/>
-              </a:spcBef>
-              <a:buFont typeface="Arial"/>
-              <a:buChar char="•"/>
-              <a:defRPr sz="2000" kern="1200">
-                <a:solidFill>
-                  <a:schemeClr val="tx1"/>
-                </a:solidFill>
-                <a:latin typeface="+mn-lt"/>
-                <a:ea typeface="+mn-ea"/>
-                <a:cs typeface="+mn-cs"/>
-              </a:defRPr>
-            </a:lvl9pPr>
-          </a:lstStyle>
-          <a:p>
-            <a:r>
-              <a:rPr lang="en-US" sz="2100" i="1" dirty="0">
-                <a:latin typeface="Intel Clear Light" panose="020B0404020203020204" pitchFamily="34" charset="0"/>
-                <a:ea typeface="Intel Clear Light" panose="020B0404020203020204" pitchFamily="34" charset="0"/>
-                <a:cs typeface="Intel Clear Light" panose="020B0404020203020204" pitchFamily="34" charset="0"/>
-              </a:rPr>
-              <a:t>					vector		deque		list		</a:t>
-            </a:r>
-            <a:r>
-              <a:rPr lang="en-US" sz="2100" i="1" dirty="0" err="1">
-                <a:latin typeface="Intel Clear Light" panose="020B0404020203020204" pitchFamily="34" charset="0"/>
-                <a:ea typeface="Intel Clear Light" panose="020B0404020203020204" pitchFamily="34" charset="0"/>
-                <a:cs typeface="Intel Clear Light" panose="020B0404020203020204" pitchFamily="34" charset="0"/>
-              </a:rPr>
-              <a:t>forward_list</a:t>
-            </a:r>
-            <a:endParaRPr lang="en-US" sz="2100" i="1" dirty="0">
-              <a:latin typeface="Intel Clear Light" panose="020B0404020203020204" pitchFamily="34" charset="0"/>
-              <a:ea typeface="Intel Clear Light" panose="020B0404020203020204" pitchFamily="34" charset="0"/>
-              <a:cs typeface="Intel Clear Light" panose="020B0404020203020204" pitchFamily="34" charset="0"/>
-            </a:endParaRPr>
-          </a:p>
-          <a:p>
-            <a:r>
-              <a:rPr lang="en-US" sz="2100" i="1" dirty="0" err="1">
-                <a:latin typeface="Intel Clear Light" panose="020B0404020203020204" pitchFamily="34" charset="0"/>
-                <a:ea typeface="Intel Clear Light" panose="020B0404020203020204" pitchFamily="34" charset="0"/>
-                <a:cs typeface="Intel Clear Light" panose="020B0404020203020204" pitchFamily="34" charset="0"/>
-              </a:rPr>
-              <a:t>push_back</a:t>
-            </a:r>
-            <a:r>
-              <a:rPr lang="en-US" sz="2100" i="1" dirty="0">
-                <a:latin typeface="Intel Clear Light" panose="020B0404020203020204" pitchFamily="34" charset="0"/>
-                <a:ea typeface="Intel Clear Light" panose="020B0404020203020204" pitchFamily="34" charset="0"/>
-                <a:cs typeface="Intel Clear Light" panose="020B0404020203020204" pitchFamily="34" charset="0"/>
-              </a:rPr>
-              <a:t>		     O(1)/O(N)	 O(1)		O(1)		O(1)/O(N)</a:t>
-            </a:r>
-          </a:p>
-          <a:p>
-            <a:r>
-              <a:rPr lang="en-US" sz="2100" i="1" dirty="0" err="1">
-                <a:latin typeface="Intel Clear Light" panose="020B0404020203020204" pitchFamily="34" charset="0"/>
-                <a:ea typeface="Intel Clear Light" panose="020B0404020203020204" pitchFamily="34" charset="0"/>
-                <a:cs typeface="Intel Clear Light" panose="020B0404020203020204" pitchFamily="34" charset="0"/>
-              </a:rPr>
-              <a:t>push_front</a:t>
-            </a:r>
-            <a:r>
-              <a:rPr lang="en-US" sz="2100" i="1" dirty="0">
-                <a:latin typeface="Intel Clear Light" panose="020B0404020203020204" pitchFamily="34" charset="0"/>
-                <a:ea typeface="Intel Clear Light" panose="020B0404020203020204" pitchFamily="34" charset="0"/>
-                <a:cs typeface="Intel Clear Light" panose="020B0404020203020204" pitchFamily="34" charset="0"/>
-              </a:rPr>
-              <a:t>			  O(N)		 O(1)		O(1)		O(1)</a:t>
-            </a:r>
-          </a:p>
-          <a:p>
-            <a:r>
-              <a:rPr lang="en-US" sz="2100" i="1" dirty="0">
-                <a:latin typeface="Intel Clear Light" panose="020B0404020203020204" pitchFamily="34" charset="0"/>
-                <a:ea typeface="Intel Clear Light" panose="020B0404020203020204" pitchFamily="34" charset="0"/>
-                <a:cs typeface="Intel Clear Light" panose="020B0404020203020204" pitchFamily="34" charset="0"/>
-              </a:rPr>
-              <a:t>Insert Mid           	  O(N)		 O(N)	       O(1)/O(N)    O(1)/O(N)</a:t>
-            </a:r>
-            <a:endParaRPr lang="ru-RU" sz="2100" i="1" dirty="0">
-              <a:latin typeface="Intel Clear Light" panose="020B0404020203020204" pitchFamily="34" charset="0"/>
-              <a:ea typeface="Intel Clear Light" panose="020B0404020203020204" pitchFamily="34" charset="0"/>
-              <a:cs typeface="Intel Clear Light" panose="020B0404020203020204" pitchFamily="34" charset="0"/>
-            </a:endParaRPr>
-          </a:p>
-          <a:p>
-            <a:r>
-              <a:rPr lang="en-US" sz="2100" i="1" dirty="0">
-                <a:latin typeface="Intel Clear Light" panose="020B0404020203020204" pitchFamily="34" charset="0"/>
-                <a:ea typeface="Intel Clear Light" panose="020B0404020203020204" pitchFamily="34" charset="0"/>
-                <a:cs typeface="Intel Clear Light" panose="020B0404020203020204" pitchFamily="34" charset="0"/>
-              </a:rPr>
-              <a:t>Erase Mid                    O(N)            O(N)            O(1)/O(N)    O(1)/O(N)</a:t>
-            </a:r>
-          </a:p>
-          <a:p>
-            <a:endParaRPr lang="en-US" sz="2100" i="1" dirty="0">
-              <a:latin typeface="Intel Clear Light" panose="020B0404020203020204" pitchFamily="34" charset="0"/>
-              <a:ea typeface="Intel Clear Light" panose="020B0404020203020204" pitchFamily="34" charset="0"/>
-              <a:cs typeface="Intel Clear Light" panose="020B0404020203020204" pitchFamily="34" charset="0"/>
-            </a:endParaRPr>
-          </a:p>
-          <a:p>
-            <a:r>
-              <a:rPr lang="en-US" i="1" dirty="0">
-                <a:latin typeface="Intel Clear Light" panose="020B0404020203020204" pitchFamily="34" charset="0"/>
-                <a:ea typeface="Intel Clear Light" panose="020B0404020203020204" pitchFamily="34" charset="0"/>
-                <a:cs typeface="Intel Clear Light" panose="020B0404020203020204" pitchFamily="34" charset="0"/>
-              </a:rPr>
-              <a:t>	</a:t>
-            </a:r>
-          </a:p>
-        </p:txBody>
-      </p:sp>
-      <p:sp>
-        <p:nvSpPr>
           <p:cNvPr id="2" name="Slide Number Placeholder 1"/>
           <p:cNvSpPr>
             <a:spLocks noGrp="1"/>
@@ -14762,12 +14584,7 @@
             <p:ph type="title"/>
           </p:nvPr>
         </p:nvSpPr>
-        <p:spPr>
-          <a:xfrm>
-            <a:off x="455613" y="308848"/>
-            <a:ext cx="8229600" cy="634184"/>
-          </a:xfrm>
-        </p:spPr>
+        <p:spPr/>
         <p:txBody>
           <a:bodyPr/>
           <a:lstStyle/>
@@ -14778,15 +14595,440 @@
                 <a:ea typeface="Intel Clear Pro Bold" panose="020B0804020202060201" pitchFamily="34" charset="-52"/>
                 <a:cs typeface="Intel Clear Pro Bold" panose="020B0804020202060201" pitchFamily="34" charset="-52"/>
               </a:rPr>
-              <a:t>Sequences - complexity</a:t>
-            </a:r>
-          </a:p>
-        </p:txBody>
-      </p:sp>
+              <a:t>Std::</a:t>
+            </a:r>
+            <a:r>
+              <a:rPr lang="en-US" dirty="0" err="1">
+                <a:latin typeface="Intel Clear Pro Bold" panose="020B0804020202060201" pitchFamily="34" charset="-52"/>
+                <a:ea typeface="Intel Clear Pro Bold" panose="020B0804020202060201" pitchFamily="34" charset="-52"/>
+                <a:cs typeface="Intel Clear Pro Bold" panose="020B0804020202060201" pitchFamily="34" charset="-52"/>
+              </a:rPr>
+              <a:t>FORWARD_list</a:t>
+            </a:r>
+            <a:endParaRPr lang="en-US" dirty="0">
+              <a:latin typeface="Intel Clear Pro Bold" panose="020B0804020202060201" pitchFamily="34" charset="-52"/>
+              <a:ea typeface="Intel Clear Pro Bold" panose="020B0804020202060201" pitchFamily="34" charset="-52"/>
+              <a:cs typeface="Intel Clear Pro Bold" panose="020B0804020202060201" pitchFamily="34" charset="-52"/>
+            </a:endParaRPr>
+          </a:p>
+        </p:txBody>
+      </p:sp>
+      <p:sp>
+        <p:nvSpPr>
+          <p:cNvPr id="6" name="Rectangle 5">
+            <a:extLst>
+              <a:ext uri="{FF2B5EF4-FFF2-40B4-BE49-F238E27FC236}">
+                <a16:creationId xmlns:a16="http://schemas.microsoft.com/office/drawing/2014/main" id="{5749D4A2-1899-472D-8EF0-5362D156CD64}"/>
+              </a:ext>
+            </a:extLst>
+          </p:cNvPr>
+          <p:cNvSpPr/>
+          <p:nvPr/>
+        </p:nvSpPr>
+        <p:spPr>
+          <a:xfrm>
+            <a:off x="908845" y="1303800"/>
+            <a:ext cx="678655" cy="753599"/>
+          </a:xfrm>
+          <a:prstGeom prst="rect">
+            <a:avLst/>
+          </a:prstGeom>
+          <a:solidFill>
+            <a:schemeClr val="bg1"/>
+          </a:solidFill>
+          <a:ln>
+            <a:solidFill>
+              <a:schemeClr val="tx1"/>
+            </a:solidFill>
+          </a:ln>
+          <a:effectLst/>
+        </p:spPr>
+        <p:style>
+          <a:lnRef idx="1">
+            <a:schemeClr val="accent1"/>
+          </a:lnRef>
+          <a:fillRef idx="3">
+            <a:schemeClr val="accent1"/>
+          </a:fillRef>
+          <a:effectRef idx="2">
+            <a:schemeClr val="accent1"/>
+          </a:effectRef>
+          <a:fontRef idx="minor">
+            <a:schemeClr val="lt1"/>
+          </a:fontRef>
+        </p:style>
+        <p:txBody>
+          <a:bodyPr rtlCol="0" anchor="ctr"/>
+          <a:lstStyle/>
+          <a:p>
+            <a:pPr algn="ctr"/>
+            <a:r>
+              <a:rPr lang="en-US" dirty="0">
+                <a:solidFill>
+                  <a:srgbClr val="FF0000"/>
+                </a:solidFill>
+              </a:rPr>
+              <a:t>7</a:t>
+            </a:r>
+          </a:p>
+        </p:txBody>
+      </p:sp>
+      <p:sp>
+        <p:nvSpPr>
+          <p:cNvPr id="8" name="Rectangle 7">
+            <a:extLst>
+              <a:ext uri="{FF2B5EF4-FFF2-40B4-BE49-F238E27FC236}">
+                <a16:creationId xmlns:a16="http://schemas.microsoft.com/office/drawing/2014/main" id="{28D589B8-7B65-40BF-AC7E-4279EC8B8025}"/>
+              </a:ext>
+            </a:extLst>
+          </p:cNvPr>
+          <p:cNvSpPr/>
+          <p:nvPr/>
+        </p:nvSpPr>
+        <p:spPr>
+          <a:xfrm>
+            <a:off x="2489995" y="1303800"/>
+            <a:ext cx="678655" cy="753599"/>
+          </a:xfrm>
+          <a:prstGeom prst="rect">
+            <a:avLst/>
+          </a:prstGeom>
+          <a:solidFill>
+            <a:schemeClr val="bg1"/>
+          </a:solidFill>
+          <a:ln>
+            <a:solidFill>
+              <a:schemeClr val="tx1"/>
+            </a:solidFill>
+          </a:ln>
+          <a:effectLst/>
+        </p:spPr>
+        <p:style>
+          <a:lnRef idx="1">
+            <a:schemeClr val="accent1"/>
+          </a:lnRef>
+          <a:fillRef idx="3">
+            <a:schemeClr val="accent1"/>
+          </a:fillRef>
+          <a:effectRef idx="2">
+            <a:schemeClr val="accent1"/>
+          </a:effectRef>
+          <a:fontRef idx="minor">
+            <a:schemeClr val="lt1"/>
+          </a:fontRef>
+        </p:style>
+        <p:txBody>
+          <a:bodyPr rtlCol="0" anchor="ctr"/>
+          <a:lstStyle/>
+          <a:p>
+            <a:pPr algn="ctr"/>
+            <a:r>
+              <a:rPr lang="en-US" dirty="0">
+                <a:solidFill>
+                  <a:srgbClr val="FF0000"/>
+                </a:solidFill>
+              </a:rPr>
+              <a:t>2</a:t>
+            </a:r>
+          </a:p>
+        </p:txBody>
+      </p:sp>
+      <p:cxnSp>
+        <p:nvCxnSpPr>
+          <p:cNvPr id="9" name="Straight Arrow Connector 8">
+            <a:extLst>
+              <a:ext uri="{FF2B5EF4-FFF2-40B4-BE49-F238E27FC236}">
+                <a16:creationId xmlns:a16="http://schemas.microsoft.com/office/drawing/2014/main" id="{6408E739-D13A-47C3-9668-166D130E4118}"/>
+              </a:ext>
+            </a:extLst>
+          </p:cNvPr>
+          <p:cNvCxnSpPr/>
+          <p:nvPr/>
+        </p:nvCxnSpPr>
+        <p:spPr>
+          <a:xfrm>
+            <a:off x="1587500" y="1680333"/>
+            <a:ext cx="920750" cy="0"/>
+          </a:xfrm>
+          <a:prstGeom prst="straightConnector1">
+            <a:avLst/>
+          </a:prstGeom>
+          <a:ln>
+            <a:solidFill>
+              <a:schemeClr val="tx2"/>
+            </a:solidFill>
+            <a:tailEnd type="triangle"/>
+          </a:ln>
+          <a:effectLst/>
+        </p:spPr>
+        <p:style>
+          <a:lnRef idx="2">
+            <a:schemeClr val="accent1"/>
+          </a:lnRef>
+          <a:fillRef idx="0">
+            <a:schemeClr val="accent1"/>
+          </a:fillRef>
+          <a:effectRef idx="1">
+            <a:schemeClr val="accent1"/>
+          </a:effectRef>
+          <a:fontRef idx="minor">
+            <a:schemeClr val="tx1"/>
+          </a:fontRef>
+        </p:style>
+      </p:cxnSp>
+      <p:sp>
+        <p:nvSpPr>
+          <p:cNvPr id="14" name="Rectangle 13">
+            <a:extLst>
+              <a:ext uri="{FF2B5EF4-FFF2-40B4-BE49-F238E27FC236}">
+                <a16:creationId xmlns:a16="http://schemas.microsoft.com/office/drawing/2014/main" id="{01871976-7218-4264-AD08-B1569C6DB425}"/>
+              </a:ext>
+            </a:extLst>
+          </p:cNvPr>
+          <p:cNvSpPr/>
+          <p:nvPr/>
+        </p:nvSpPr>
+        <p:spPr>
+          <a:xfrm>
+            <a:off x="4071145" y="1303800"/>
+            <a:ext cx="678655" cy="753599"/>
+          </a:xfrm>
+          <a:prstGeom prst="rect">
+            <a:avLst/>
+          </a:prstGeom>
+          <a:solidFill>
+            <a:schemeClr val="bg1"/>
+          </a:solidFill>
+          <a:ln>
+            <a:solidFill>
+              <a:schemeClr val="tx1"/>
+            </a:solidFill>
+          </a:ln>
+          <a:effectLst/>
+        </p:spPr>
+        <p:style>
+          <a:lnRef idx="1">
+            <a:schemeClr val="accent1"/>
+          </a:lnRef>
+          <a:fillRef idx="3">
+            <a:schemeClr val="accent1"/>
+          </a:fillRef>
+          <a:effectRef idx="2">
+            <a:schemeClr val="accent1"/>
+          </a:effectRef>
+          <a:fontRef idx="minor">
+            <a:schemeClr val="lt1"/>
+          </a:fontRef>
+        </p:style>
+        <p:txBody>
+          <a:bodyPr rtlCol="0" anchor="ctr"/>
+          <a:lstStyle/>
+          <a:p>
+            <a:pPr algn="ctr"/>
+            <a:r>
+              <a:rPr lang="en-US" dirty="0">
+                <a:solidFill>
+                  <a:srgbClr val="FF0000"/>
+                </a:solidFill>
+              </a:rPr>
+              <a:t>5</a:t>
+            </a:r>
+          </a:p>
+        </p:txBody>
+      </p:sp>
+      <p:cxnSp>
+        <p:nvCxnSpPr>
+          <p:cNvPr id="15" name="Straight Arrow Connector 14">
+            <a:extLst>
+              <a:ext uri="{FF2B5EF4-FFF2-40B4-BE49-F238E27FC236}">
+                <a16:creationId xmlns:a16="http://schemas.microsoft.com/office/drawing/2014/main" id="{B597C871-D7F1-46CC-845B-31267DE68F20}"/>
+              </a:ext>
+            </a:extLst>
+          </p:cNvPr>
+          <p:cNvCxnSpPr/>
+          <p:nvPr/>
+        </p:nvCxnSpPr>
+        <p:spPr>
+          <a:xfrm>
+            <a:off x="3168650" y="1680333"/>
+            <a:ext cx="920750" cy="0"/>
+          </a:xfrm>
+          <a:prstGeom prst="straightConnector1">
+            <a:avLst/>
+          </a:prstGeom>
+          <a:ln>
+            <a:solidFill>
+              <a:schemeClr val="tx2"/>
+            </a:solidFill>
+            <a:tailEnd type="triangle"/>
+          </a:ln>
+          <a:effectLst/>
+        </p:spPr>
+        <p:style>
+          <a:lnRef idx="2">
+            <a:schemeClr val="accent1"/>
+          </a:lnRef>
+          <a:fillRef idx="0">
+            <a:schemeClr val="accent1"/>
+          </a:fillRef>
+          <a:effectRef idx="1">
+            <a:schemeClr val="accent1"/>
+          </a:effectRef>
+          <a:fontRef idx="minor">
+            <a:schemeClr val="tx1"/>
+          </a:fontRef>
+        </p:style>
+      </p:cxnSp>
+      <p:sp>
+        <p:nvSpPr>
+          <p:cNvPr id="17" name="Rectangle 16">
+            <a:extLst>
+              <a:ext uri="{FF2B5EF4-FFF2-40B4-BE49-F238E27FC236}">
+                <a16:creationId xmlns:a16="http://schemas.microsoft.com/office/drawing/2014/main" id="{C8CFBA62-8699-482C-938E-224270DB4043}"/>
+              </a:ext>
+            </a:extLst>
+          </p:cNvPr>
+          <p:cNvSpPr/>
+          <p:nvPr/>
+        </p:nvSpPr>
+        <p:spPr>
+          <a:xfrm>
+            <a:off x="5652295" y="1303800"/>
+            <a:ext cx="678655" cy="753599"/>
+          </a:xfrm>
+          <a:prstGeom prst="rect">
+            <a:avLst/>
+          </a:prstGeom>
+          <a:solidFill>
+            <a:schemeClr val="bg1"/>
+          </a:solidFill>
+          <a:ln>
+            <a:solidFill>
+              <a:schemeClr val="tx1"/>
+            </a:solidFill>
+          </a:ln>
+          <a:effectLst/>
+        </p:spPr>
+        <p:style>
+          <a:lnRef idx="1">
+            <a:schemeClr val="accent1"/>
+          </a:lnRef>
+          <a:fillRef idx="3">
+            <a:schemeClr val="accent1"/>
+          </a:fillRef>
+          <a:effectRef idx="2">
+            <a:schemeClr val="accent1"/>
+          </a:effectRef>
+          <a:fontRef idx="minor">
+            <a:schemeClr val="lt1"/>
+          </a:fontRef>
+        </p:style>
+        <p:txBody>
+          <a:bodyPr rtlCol="0" anchor="ctr"/>
+          <a:lstStyle/>
+          <a:p>
+            <a:pPr algn="ctr"/>
+            <a:r>
+              <a:rPr lang="en-US" dirty="0">
+                <a:solidFill>
+                  <a:srgbClr val="FF0000"/>
+                </a:solidFill>
+              </a:rPr>
+              <a:t>10</a:t>
+            </a:r>
+          </a:p>
+        </p:txBody>
+      </p:sp>
+      <p:cxnSp>
+        <p:nvCxnSpPr>
+          <p:cNvPr id="18" name="Straight Arrow Connector 17">
+            <a:extLst>
+              <a:ext uri="{FF2B5EF4-FFF2-40B4-BE49-F238E27FC236}">
+                <a16:creationId xmlns:a16="http://schemas.microsoft.com/office/drawing/2014/main" id="{0A3801BF-C3FF-4B22-A5C1-DF0B3C738F53}"/>
+              </a:ext>
+            </a:extLst>
+          </p:cNvPr>
+          <p:cNvCxnSpPr/>
+          <p:nvPr/>
+        </p:nvCxnSpPr>
+        <p:spPr>
+          <a:xfrm>
+            <a:off x="4749800" y="1695573"/>
+            <a:ext cx="920750" cy="0"/>
+          </a:xfrm>
+          <a:prstGeom prst="straightConnector1">
+            <a:avLst/>
+          </a:prstGeom>
+          <a:ln>
+            <a:solidFill>
+              <a:schemeClr val="tx2"/>
+            </a:solidFill>
+            <a:tailEnd type="triangle"/>
+          </a:ln>
+          <a:effectLst/>
+        </p:spPr>
+        <p:style>
+          <a:lnRef idx="2">
+            <a:schemeClr val="accent1"/>
+          </a:lnRef>
+          <a:fillRef idx="0">
+            <a:schemeClr val="accent1"/>
+          </a:fillRef>
+          <a:effectRef idx="1">
+            <a:schemeClr val="accent1"/>
+          </a:effectRef>
+          <a:fontRef idx="minor">
+            <a:schemeClr val="tx1"/>
+          </a:fontRef>
+        </p:style>
+      </p:cxnSp>
+      <p:cxnSp>
+        <p:nvCxnSpPr>
+          <p:cNvPr id="21" name="Straight Arrow Connector 20">
+            <a:extLst>
+              <a:ext uri="{FF2B5EF4-FFF2-40B4-BE49-F238E27FC236}">
+                <a16:creationId xmlns:a16="http://schemas.microsoft.com/office/drawing/2014/main" id="{3379CC50-D6C0-49C0-8F72-5C44CCC20891}"/>
+              </a:ext>
+            </a:extLst>
+          </p:cNvPr>
+          <p:cNvCxnSpPr/>
+          <p:nvPr/>
+        </p:nvCxnSpPr>
+        <p:spPr>
+          <a:xfrm>
+            <a:off x="6330950" y="1680333"/>
+            <a:ext cx="723900" cy="0"/>
+          </a:xfrm>
+          <a:prstGeom prst="straightConnector1">
+            <a:avLst/>
+          </a:prstGeom>
+          <a:ln>
+            <a:solidFill>
+              <a:schemeClr val="tx2"/>
+            </a:solidFill>
+            <a:tailEnd type="triangle"/>
+          </a:ln>
+          <a:effectLst/>
+        </p:spPr>
+        <p:style>
+          <a:lnRef idx="2">
+            <a:schemeClr val="accent1"/>
+          </a:lnRef>
+          <a:fillRef idx="0">
+            <a:schemeClr val="accent1"/>
+          </a:fillRef>
+          <a:effectRef idx="1">
+            <a:schemeClr val="accent1"/>
+          </a:effectRef>
+          <a:fontRef idx="minor">
+            <a:schemeClr val="tx1"/>
+          </a:fontRef>
+        </p:style>
+      </p:cxnSp>
     </p:spTree>
     <p:extLst>
       <p:ext uri="{BB962C8B-B14F-4D97-AF65-F5344CB8AC3E}">
-        <p14:creationId xmlns:p14="http://schemas.microsoft.com/office/powerpoint/2010/main" val="507760561"/>
+        <p14:creationId xmlns:p14="http://schemas.microsoft.com/office/powerpoint/2010/main" val="1631745371"/>
       </p:ext>
     </p:extLst>
   </p:cSld>
@@ -14836,7 +15078,7 @@
         <p:spPr>
           <a:xfrm>
             <a:off x="558800" y="943032"/>
-            <a:ext cx="3973689" cy="3394472"/>
+            <a:ext cx="8342313" cy="3394472"/>
           </a:xfrm>
           <a:prstGeom prst="rect">
             <a:avLst/>
@@ -14988,50 +15230,104 @@
           </a:lstStyle>
           <a:p>
             <a:r>
-              <a:rPr lang="en-US" sz="2100" b="1" dirty="0">
+              <a:rPr lang="en-US" sz="2100" i="1" dirty="0">
                 <a:latin typeface="Intel Clear Light" panose="020B0404020203020204" pitchFamily="34" charset="0"/>
                 <a:ea typeface="Intel Clear Light" panose="020B0404020203020204" pitchFamily="34" charset="0"/>
                 <a:cs typeface="Intel Clear Light" panose="020B0404020203020204" pitchFamily="34" charset="0"/>
               </a:rPr>
-              <a:t>std::map</a:t>
-            </a:r>
-          </a:p>
-          <a:p>
-            <a:r>
-              <a:rPr lang="en-US" sz="2100" b="1" dirty="0">
+              <a:t>					vector		deque		list		</a:t>
+            </a:r>
+            <a:r>
+              <a:rPr lang="en-US" sz="2100" i="1" dirty="0" err="1">
                 <a:latin typeface="Intel Clear Light" panose="020B0404020203020204" pitchFamily="34" charset="0"/>
                 <a:ea typeface="Intel Clear Light" panose="020B0404020203020204" pitchFamily="34" charset="0"/>
                 <a:cs typeface="Intel Clear Light" panose="020B0404020203020204" pitchFamily="34" charset="0"/>
               </a:rPr>
-              <a:t>std::multimap</a:t>
-            </a:r>
-          </a:p>
-          <a:p>
-            <a:r>
-              <a:rPr lang="en-US" sz="2100" b="1" dirty="0">
-                <a:latin typeface="Intel Clear Light" panose="020B0404020203020204" pitchFamily="34" charset="0"/>
-                <a:ea typeface="Intel Clear Light" panose="020B0404020203020204" pitchFamily="34" charset="0"/>
-                <a:cs typeface="Intel Clear Light" panose="020B0404020203020204" pitchFamily="34" charset="0"/>
-              </a:rPr>
-              <a:t>std::set</a:t>
-            </a:r>
-          </a:p>
-          <a:p>
-            <a:r>
-              <a:rPr lang="en-US" sz="2100" b="1" dirty="0">
-                <a:latin typeface="Intel Clear Light" panose="020B0404020203020204" pitchFamily="34" charset="0"/>
-                <a:ea typeface="Intel Clear Light" panose="020B0404020203020204" pitchFamily="34" charset="0"/>
-                <a:cs typeface="Intel Clear Light" panose="020B0404020203020204" pitchFamily="34" charset="0"/>
-              </a:rPr>
-              <a:t>std::multiset</a:t>
-            </a:r>
-          </a:p>
-          <a:p>
-            <a:endParaRPr lang="en-US" dirty="0">
+              <a:t>forward_list</a:t>
+            </a:r>
+            <a:endParaRPr lang="en-US" sz="2100" i="1" dirty="0">
               <a:latin typeface="Intel Clear Light" panose="020B0404020203020204" pitchFamily="34" charset="0"/>
               <a:ea typeface="Intel Clear Light" panose="020B0404020203020204" pitchFamily="34" charset="0"/>
               <a:cs typeface="Intel Clear Light" panose="020B0404020203020204" pitchFamily="34" charset="0"/>
             </a:endParaRPr>
+          </a:p>
+          <a:p>
+            <a:r>
+              <a:rPr lang="en-US" sz="2100" i="1" dirty="0" err="1">
+                <a:latin typeface="Intel Clear Light" panose="020B0404020203020204" pitchFamily="34" charset="0"/>
+                <a:ea typeface="Intel Clear Light" panose="020B0404020203020204" pitchFamily="34" charset="0"/>
+                <a:cs typeface="Intel Clear Light" panose="020B0404020203020204" pitchFamily="34" charset="0"/>
+              </a:rPr>
+              <a:t>push_back</a:t>
+            </a:r>
+            <a:r>
+              <a:rPr lang="en-US" sz="2100" i="1" dirty="0">
+                <a:latin typeface="Intel Clear Light" panose="020B0404020203020204" pitchFamily="34" charset="0"/>
+                <a:ea typeface="Intel Clear Light" panose="020B0404020203020204" pitchFamily="34" charset="0"/>
+                <a:cs typeface="Intel Clear Light" panose="020B0404020203020204" pitchFamily="34" charset="0"/>
+              </a:rPr>
+              <a:t>		     O(1)/O(N)	 O(1)		O(1)		O(1)/O(N)</a:t>
+            </a:r>
+          </a:p>
+          <a:p>
+            <a:r>
+              <a:rPr lang="en-US" sz="2100" i="1" dirty="0" err="1">
+                <a:latin typeface="Intel Clear Light" panose="020B0404020203020204" pitchFamily="34" charset="0"/>
+                <a:ea typeface="Intel Clear Light" panose="020B0404020203020204" pitchFamily="34" charset="0"/>
+                <a:cs typeface="Intel Clear Light" panose="020B0404020203020204" pitchFamily="34" charset="0"/>
+              </a:rPr>
+              <a:t>push_front</a:t>
+            </a:r>
+            <a:r>
+              <a:rPr lang="en-US" sz="2100" i="1" dirty="0">
+                <a:latin typeface="Intel Clear Light" panose="020B0404020203020204" pitchFamily="34" charset="0"/>
+                <a:ea typeface="Intel Clear Light" panose="020B0404020203020204" pitchFamily="34" charset="0"/>
+                <a:cs typeface="Intel Clear Light" panose="020B0404020203020204" pitchFamily="34" charset="0"/>
+              </a:rPr>
+              <a:t>			  O(N)		 O(1)		O(1)		O(1)</a:t>
+            </a:r>
+          </a:p>
+          <a:p>
+            <a:r>
+              <a:rPr lang="en-US" sz="2100" i="1" dirty="0">
+                <a:latin typeface="Intel Clear Light" panose="020B0404020203020204" pitchFamily="34" charset="0"/>
+                <a:ea typeface="Intel Clear Light" panose="020B0404020203020204" pitchFamily="34" charset="0"/>
+                <a:cs typeface="Intel Clear Light" panose="020B0404020203020204" pitchFamily="34" charset="0"/>
+              </a:rPr>
+              <a:t>Insert Mid           	  O(N)		 O(N)	       O(1)/O(N)    O(1)/O(N)</a:t>
+            </a:r>
+            <a:endParaRPr lang="ru-RU" sz="2100" i="1" dirty="0">
+              <a:latin typeface="Intel Clear Light" panose="020B0404020203020204" pitchFamily="34" charset="0"/>
+              <a:ea typeface="Intel Clear Light" panose="020B0404020203020204" pitchFamily="34" charset="0"/>
+              <a:cs typeface="Intel Clear Light" panose="020B0404020203020204" pitchFamily="34" charset="0"/>
+            </a:endParaRPr>
+          </a:p>
+          <a:p>
+            <a:r>
+              <a:rPr lang="en-US" sz="2100" i="1" dirty="0">
+                <a:latin typeface="Intel Clear Light" panose="020B0404020203020204" pitchFamily="34" charset="0"/>
+                <a:ea typeface="Intel Clear Light" panose="020B0404020203020204" pitchFamily="34" charset="0"/>
+                <a:cs typeface="Intel Clear Light" panose="020B0404020203020204" pitchFamily="34" charset="0"/>
+              </a:rPr>
+              <a:t>Erase Mid                    O(N)            O(N)            O(1)/O(N)    O(1)/O(N)</a:t>
+            </a:r>
+          </a:p>
+          <a:p>
+            <a:endParaRPr lang="en-US" sz="2100" i="1" dirty="0">
+              <a:latin typeface="Intel Clear Light" panose="020B0404020203020204" pitchFamily="34" charset="0"/>
+              <a:ea typeface="Intel Clear Light" panose="020B0404020203020204" pitchFamily="34" charset="0"/>
+              <a:cs typeface="Intel Clear Light" panose="020B0404020203020204" pitchFamily="34" charset="0"/>
+            </a:endParaRPr>
+          </a:p>
+          <a:p>
+            <a:r>
+              <a:rPr lang="en-US" i="1" dirty="0">
+                <a:latin typeface="Intel Clear Light" panose="020B0404020203020204" pitchFamily="34" charset="0"/>
+                <a:ea typeface="Intel Clear Light" panose="020B0404020203020204" pitchFamily="34" charset="0"/>
+                <a:cs typeface="Intel Clear Light" panose="020B0404020203020204" pitchFamily="34" charset="0"/>
+              </a:rPr>
+              <a:t>	</a:t>
+            </a:r>
           </a:p>
         </p:txBody>
       </p:sp>
@@ -15071,8 +15367,8 @@
         </p:nvSpPr>
         <p:spPr>
           <a:xfrm>
-            <a:off x="628650" y="155857"/>
-            <a:ext cx="7886700" cy="994172"/>
+            <a:off x="455613" y="308848"/>
+            <a:ext cx="8229600" cy="634184"/>
           </a:xfrm>
         </p:spPr>
         <p:txBody>
@@ -15085,7 +15381,7 @@
                 <a:ea typeface="Intel Clear Pro Bold" panose="020B0804020202060201" pitchFamily="34" charset="-52"/>
                 <a:cs typeface="Intel Clear Pro Bold" panose="020B0804020202060201" pitchFamily="34" charset="-52"/>
               </a:rPr>
-              <a:t>Associative containers in STL</a:t>
+              <a:t>Sequences - complexity</a:t>
             </a:r>
           </a:p>
         </p:txBody>
@@ -15093,7 +15389,7 @@
     </p:spTree>
     <p:extLst>
       <p:ext uri="{BB962C8B-B14F-4D97-AF65-F5344CB8AC3E}">
-        <p14:creationId xmlns:p14="http://schemas.microsoft.com/office/powerpoint/2010/main" val="1186225897"/>
+        <p14:creationId xmlns:p14="http://schemas.microsoft.com/office/powerpoint/2010/main" val="507760561"/>
       </p:ext>
     </p:extLst>
   </p:cSld>
@@ -15134,77 +15430,16 @@
       </p:grpSpPr>
       <p:sp>
         <p:nvSpPr>
-          <p:cNvPr id="2" name="Slide Number Placeholder 1"/>
-          <p:cNvSpPr>
-            <a:spLocks noGrp="1"/>
-          </p:cNvSpPr>
-          <p:nvPr>
-            <p:ph type="sldNum" sz="quarter" idx="12"/>
-          </p:nvPr>
-        </p:nvSpPr>
-        <p:spPr/>
-        <p:txBody>
-          <a:bodyPr/>
-          <a:lstStyle/>
-          <a:p>
-            <a:fld id="{EE2556C5-CE8C-6547-B838-EA80C61A4AF7}" type="slidenum">
-              <a:rPr lang="en-US" smtClean="0"/>
-              <a:pPr/>
-              <a:t>19</a:t>
-            </a:fld>
-            <a:endParaRPr lang="en-US" dirty="0"/>
-          </a:p>
-        </p:txBody>
-      </p:sp>
-      <p:sp>
-        <p:nvSpPr>
-          <p:cNvPr id="7" name="Title 3"/>
-          <p:cNvSpPr>
-            <a:spLocks noGrp="1"/>
-          </p:cNvSpPr>
-          <p:nvPr>
-            <p:ph type="title"/>
-          </p:nvPr>
+          <p:cNvPr id="5" name="Content Placeholder 2"/>
+          <p:cNvSpPr txBox="1">
+            <a:spLocks/>
+          </p:cNvSpPr>
+          <p:nvPr/>
         </p:nvSpPr>
         <p:spPr>
           <a:xfrm>
-            <a:off x="457200" y="171812"/>
-            <a:ext cx="8229600" cy="634184"/>
-          </a:xfrm>
-        </p:spPr>
-        <p:txBody>
-          <a:bodyPr/>
-          <a:lstStyle/>
-          <a:p>
-            <a:r>
-              <a:rPr lang="en-US" dirty="0">
-                <a:latin typeface="Intel Clear Pro Bold" panose="020B0804020202060201" pitchFamily="34" charset="-52"/>
-                <a:ea typeface="Intel Clear Pro Bold" panose="020B0804020202060201" pitchFamily="34" charset="-52"/>
-                <a:cs typeface="Intel Clear Pro Bold" panose="020B0804020202060201" pitchFamily="34" charset="-52"/>
-              </a:rPr>
-              <a:t>Associative containers</a:t>
-            </a:r>
-          </a:p>
-        </p:txBody>
-      </p:sp>
-      <p:sp>
-        <p:nvSpPr>
-          <p:cNvPr id="16" name="Content Placeholder 2">
-            <a:extLst>
-              <a:ext uri="{FF2B5EF4-FFF2-40B4-BE49-F238E27FC236}">
-                <a16:creationId xmlns:a16="http://schemas.microsoft.com/office/drawing/2014/main" id="{4932622C-479E-4CD8-BADB-4D2E0D79A554}"/>
-              </a:ext>
-            </a:extLst>
-          </p:cNvPr>
-          <p:cNvSpPr txBox="1">
-            <a:spLocks/>
-          </p:cNvSpPr>
-          <p:nvPr/>
-        </p:nvSpPr>
-        <p:spPr>
-          <a:xfrm>
-            <a:off x="127322" y="943032"/>
-            <a:ext cx="9016678" cy="3394472"/>
+            <a:off x="558800" y="943032"/>
+            <a:ext cx="3973689" cy="3394472"/>
           </a:xfrm>
           <a:prstGeom prst="rect">
             <a:avLst/>
@@ -15356,249 +15591,112 @@
           </a:lstStyle>
           <a:p>
             <a:r>
-              <a:rPr lang="en-US" dirty="0">
-                <a:solidFill>
-                  <a:srgbClr val="000000"/>
-                </a:solidFill>
-                <a:latin typeface="Consolas, "/>
-              </a:rPr>
-              <a:t>std::map&lt;</a:t>
-            </a:r>
-            <a:r>
-              <a:rPr lang="en-US" dirty="0">
-                <a:solidFill>
-                  <a:srgbClr val="0000FF"/>
-                </a:solidFill>
-                <a:latin typeface="Consolas, "/>
-              </a:rPr>
-              <a:t>int</a:t>
-            </a:r>
-            <a:r>
-              <a:rPr lang="en-US" dirty="0">
-                <a:solidFill>
-                  <a:srgbClr val="000000"/>
-                </a:solidFill>
-                <a:latin typeface="Consolas, "/>
-              </a:rPr>
-              <a:t>, </a:t>
-            </a:r>
-            <a:r>
-              <a:rPr lang="en-US" dirty="0">
-                <a:solidFill>
-                  <a:srgbClr val="0000FF"/>
-                </a:solidFill>
-                <a:latin typeface="Consolas, "/>
-              </a:rPr>
-              <a:t>int</a:t>
-            </a:r>
-            <a:r>
-              <a:rPr lang="en-US" dirty="0">
-                <a:solidFill>
-                  <a:srgbClr val="000000"/>
-                </a:solidFill>
-                <a:latin typeface="Consolas, "/>
-              </a:rPr>
-              <a:t>&gt; map;</a:t>
-            </a:r>
-          </a:p>
-          <a:p>
-            <a:r>
-              <a:rPr lang="en-US" dirty="0" err="1">
-                <a:solidFill>
-                  <a:srgbClr val="000000"/>
-                </a:solidFill>
-                <a:latin typeface="Consolas, "/>
-              </a:rPr>
-              <a:t>map.insert</a:t>
-            </a:r>
-            <a:r>
-              <a:rPr lang="en-US" dirty="0">
-                <a:solidFill>
-                  <a:srgbClr val="000000"/>
-                </a:solidFill>
-                <a:latin typeface="Consolas, "/>
-              </a:rPr>
-              <a:t>(std::</a:t>
-            </a:r>
-            <a:r>
-              <a:rPr lang="en-US" dirty="0" err="1">
-                <a:solidFill>
-                  <a:srgbClr val="000000"/>
-                </a:solidFill>
-                <a:latin typeface="Consolas, "/>
-              </a:rPr>
-              <a:t>make_pair</a:t>
-            </a:r>
-            <a:r>
-              <a:rPr lang="en-US" dirty="0">
-                <a:solidFill>
-                  <a:srgbClr val="000000"/>
-                </a:solidFill>
-                <a:latin typeface="Consolas, "/>
-              </a:rPr>
-              <a:t>(</a:t>
-            </a:r>
-            <a:r>
-              <a:rPr lang="en-US" dirty="0">
-                <a:solidFill>
-                  <a:srgbClr val="098658"/>
-                </a:solidFill>
-                <a:latin typeface="Consolas, "/>
-              </a:rPr>
-              <a:t>1</a:t>
-            </a:r>
-            <a:r>
-              <a:rPr lang="en-US" dirty="0">
-                <a:solidFill>
-                  <a:srgbClr val="000000"/>
-                </a:solidFill>
-                <a:latin typeface="Consolas, "/>
-              </a:rPr>
-              <a:t>, </a:t>
-            </a:r>
-            <a:r>
-              <a:rPr lang="en-US" dirty="0">
-                <a:solidFill>
-                  <a:srgbClr val="098658"/>
-                </a:solidFill>
-                <a:latin typeface="Consolas, "/>
-              </a:rPr>
-              <a:t>1</a:t>
-            </a:r>
-            <a:r>
-              <a:rPr lang="en-US" dirty="0">
-                <a:solidFill>
-                  <a:srgbClr val="000000"/>
-                </a:solidFill>
-                <a:latin typeface="Consolas, "/>
-              </a:rPr>
-              <a:t>)); </a:t>
-            </a:r>
-            <a:r>
-              <a:rPr lang="en-US" dirty="0">
-                <a:solidFill>
-                  <a:srgbClr val="008000"/>
-                </a:solidFill>
-                <a:latin typeface="Consolas, "/>
-              </a:rPr>
-              <a:t>// key is 1, value is 1</a:t>
-            </a:r>
+              <a:rPr lang="en-US" sz="2100" b="1" dirty="0">
+                <a:latin typeface="Intel Clear Light" panose="020B0404020203020204" pitchFamily="34" charset="0"/>
+                <a:ea typeface="Intel Clear Light" panose="020B0404020203020204" pitchFamily="34" charset="0"/>
+                <a:cs typeface="Intel Clear Light" panose="020B0404020203020204" pitchFamily="34" charset="0"/>
+              </a:rPr>
+              <a:t>std::map</a:t>
+            </a:r>
+          </a:p>
+          <a:p>
+            <a:r>
+              <a:rPr lang="en-US" sz="2100" b="1" dirty="0">
+                <a:latin typeface="Intel Clear Light" panose="020B0404020203020204" pitchFamily="34" charset="0"/>
+                <a:ea typeface="Intel Clear Light" panose="020B0404020203020204" pitchFamily="34" charset="0"/>
+                <a:cs typeface="Intel Clear Light" panose="020B0404020203020204" pitchFamily="34" charset="0"/>
+              </a:rPr>
+              <a:t>std::multimap</a:t>
+            </a:r>
+          </a:p>
+          <a:p>
+            <a:r>
+              <a:rPr lang="en-US" sz="2100" b="1" dirty="0">
+                <a:latin typeface="Intel Clear Light" panose="020B0404020203020204" pitchFamily="34" charset="0"/>
+                <a:ea typeface="Intel Clear Light" panose="020B0404020203020204" pitchFamily="34" charset="0"/>
+                <a:cs typeface="Intel Clear Light" panose="020B0404020203020204" pitchFamily="34" charset="0"/>
+              </a:rPr>
+              <a:t>std::set</a:t>
+            </a:r>
+          </a:p>
+          <a:p>
+            <a:r>
+              <a:rPr lang="en-US" sz="2100" b="1" dirty="0">
+                <a:latin typeface="Intel Clear Light" panose="020B0404020203020204" pitchFamily="34" charset="0"/>
+                <a:ea typeface="Intel Clear Light" panose="020B0404020203020204" pitchFamily="34" charset="0"/>
+                <a:cs typeface="Intel Clear Light" panose="020B0404020203020204" pitchFamily="34" charset="0"/>
+              </a:rPr>
+              <a:t>std::multiset</a:t>
+            </a:r>
+          </a:p>
+          <a:p>
             <a:endParaRPr lang="en-US" dirty="0">
-              <a:solidFill>
-                <a:srgbClr val="000000"/>
-              </a:solidFill>
-              <a:latin typeface="Consolas, "/>
-            </a:endParaRPr>
-          </a:p>
-          <a:p>
-            <a:r>
-              <a:rPr lang="en-US" dirty="0" err="1">
-                <a:solidFill>
-                  <a:srgbClr val="000000"/>
-                </a:solidFill>
-                <a:latin typeface="Consolas, "/>
-              </a:rPr>
-              <a:t>map.insert</a:t>
-            </a:r>
-            <a:r>
-              <a:rPr lang="en-US" dirty="0">
-                <a:solidFill>
-                  <a:srgbClr val="000000"/>
-                </a:solidFill>
-                <a:latin typeface="Consolas, "/>
-              </a:rPr>
-              <a:t>(std::</a:t>
-            </a:r>
-            <a:r>
-              <a:rPr lang="en-US" dirty="0" err="1">
-                <a:solidFill>
-                  <a:srgbClr val="000000"/>
-                </a:solidFill>
-                <a:latin typeface="Consolas, "/>
-              </a:rPr>
-              <a:t>make_pair</a:t>
-            </a:r>
-            <a:r>
-              <a:rPr lang="en-US" dirty="0">
-                <a:solidFill>
-                  <a:srgbClr val="000000"/>
-                </a:solidFill>
-                <a:latin typeface="Consolas, "/>
-              </a:rPr>
-              <a:t>(</a:t>
-            </a:r>
-            <a:r>
-              <a:rPr lang="en-US" dirty="0">
-                <a:solidFill>
-                  <a:srgbClr val="098658"/>
-                </a:solidFill>
-                <a:latin typeface="Consolas, "/>
-              </a:rPr>
-              <a:t>1</a:t>
-            </a:r>
-            <a:r>
-              <a:rPr lang="en-US" dirty="0">
-                <a:solidFill>
-                  <a:srgbClr val="000000"/>
-                </a:solidFill>
-                <a:latin typeface="Consolas, "/>
-              </a:rPr>
-              <a:t>, </a:t>
-            </a:r>
-            <a:r>
-              <a:rPr lang="en-US" dirty="0">
-                <a:solidFill>
-                  <a:srgbClr val="098658"/>
-                </a:solidFill>
-                <a:latin typeface="Consolas, "/>
-              </a:rPr>
-              <a:t>10</a:t>
-            </a:r>
-            <a:r>
-              <a:rPr lang="en-US" dirty="0">
-                <a:solidFill>
-                  <a:srgbClr val="000000"/>
-                </a:solidFill>
-                <a:latin typeface="Consolas, "/>
-              </a:rPr>
-              <a:t>)); </a:t>
-            </a:r>
-            <a:r>
-              <a:rPr lang="en-US" dirty="0">
-                <a:solidFill>
-                  <a:srgbClr val="008000"/>
-                </a:solidFill>
-                <a:latin typeface="Consolas, "/>
-              </a:rPr>
-              <a:t>// Failed - key 1 is duplicated</a:t>
-            </a:r>
-            <a:endParaRPr lang="en-US" dirty="0">
-              <a:solidFill>
-                <a:srgbClr val="000000"/>
-              </a:solidFill>
-              <a:latin typeface="Consolas, "/>
-            </a:endParaRPr>
-          </a:p>
-          <a:p>
-            <a:endParaRPr lang="en-US" sz="2100" i="1" dirty="0">
               <a:latin typeface="Intel Clear Light" panose="020B0404020203020204" pitchFamily="34" charset="0"/>
               <a:ea typeface="Intel Clear Light" panose="020B0404020203020204" pitchFamily="34" charset="0"/>
               <a:cs typeface="Intel Clear Light" panose="020B0404020203020204" pitchFamily="34" charset="0"/>
             </a:endParaRPr>
           </a:p>
-          <a:p>
-            <a:endParaRPr lang="en-US" i="1" dirty="0">
-              <a:latin typeface="Intel Clear Light" panose="020B0404020203020204" pitchFamily="34" charset="0"/>
-              <a:ea typeface="Intel Clear Light" panose="020B0404020203020204" pitchFamily="34" charset="0"/>
-              <a:cs typeface="Intel Clear Light" panose="020B0404020203020204" pitchFamily="34" charset="0"/>
-            </a:endParaRPr>
+        </p:txBody>
+      </p:sp>
+      <p:sp>
+        <p:nvSpPr>
+          <p:cNvPr id="2" name="Slide Number Placeholder 1"/>
+          <p:cNvSpPr>
+            <a:spLocks noGrp="1"/>
+          </p:cNvSpPr>
+          <p:nvPr>
+            <p:ph type="sldNum" sz="quarter" idx="12"/>
+          </p:nvPr>
+        </p:nvSpPr>
+        <p:spPr/>
+        <p:txBody>
+          <a:bodyPr/>
+          <a:lstStyle/>
+          <a:p>
+            <a:fld id="{EE2556C5-CE8C-6547-B838-EA80C61A4AF7}" type="slidenum">
+              <a:rPr lang="en-US" smtClean="0"/>
+              <a:pPr/>
+              <a:t>19</a:t>
+            </a:fld>
+            <a:endParaRPr lang="en-US" dirty="0"/>
+          </a:p>
+        </p:txBody>
+      </p:sp>
+      <p:sp>
+        <p:nvSpPr>
+          <p:cNvPr id="7" name="Title 3"/>
+          <p:cNvSpPr>
+            <a:spLocks noGrp="1"/>
+          </p:cNvSpPr>
+          <p:nvPr>
+            <p:ph type="title"/>
+          </p:nvPr>
+        </p:nvSpPr>
+        <p:spPr>
+          <a:xfrm>
+            <a:off x="628650" y="155857"/>
+            <a:ext cx="7886700" cy="994172"/>
+          </a:xfrm>
+        </p:spPr>
+        <p:txBody>
+          <a:bodyPr/>
+          <a:lstStyle/>
+          <a:p>
+            <a:r>
+              <a:rPr lang="en-US" dirty="0">
+                <a:latin typeface="Intel Clear Pro Bold" panose="020B0804020202060201" pitchFamily="34" charset="-52"/>
+                <a:ea typeface="Intel Clear Pro Bold" panose="020B0804020202060201" pitchFamily="34" charset="-52"/>
+                <a:cs typeface="Intel Clear Pro Bold" panose="020B0804020202060201" pitchFamily="34" charset="-52"/>
+              </a:rPr>
+              <a:t>Associative containers in STL</a:t>
+            </a:r>
           </a:p>
         </p:txBody>
       </p:sp>
     </p:spTree>
     <p:extLst>
       <p:ext uri="{BB962C8B-B14F-4D97-AF65-F5344CB8AC3E}">
-        <p14:creationId xmlns:p14="http://schemas.microsoft.com/office/powerpoint/2010/main" val="782856707"/>
+        <p14:creationId xmlns:p14="http://schemas.microsoft.com/office/powerpoint/2010/main" val="1186225897"/>
       </p:ext>
     </p:extLst>
   </p:cSld>
@@ -15607,10 +15705,14 @@
   </p:clrMapOvr>
   <mc:AlternateContent xmlns:mc="http://schemas.openxmlformats.org/markup-compatibility/2006" xmlns:p14="http://schemas.microsoft.com/office/powerpoint/2010/main">
     <mc:Choice Requires="p14">
-      <p:transition p14:dur="10"/>
+      <p:transition spd="med" p14:dur="700">
+        <p:fade/>
+      </p:transition>
     </mc:Choice>
     <mc:Fallback xmlns="">
-      <p:transition/>
+      <p:transition spd="med">
+        <p:fade/>
+      </p:transition>
     </mc:Fallback>
   </mc:AlternateContent>
 </p:sld>
@@ -15817,8 +15919,8 @@
         </p:nvSpPr>
         <p:spPr>
           <a:xfrm>
-            <a:off x="558800" y="943032"/>
-            <a:ext cx="8342313" cy="3394472"/>
+            <a:off x="127322" y="943032"/>
+            <a:ext cx="9016678" cy="3394472"/>
           </a:xfrm>
           <a:prstGeom prst="rect">
             <a:avLst/>
@@ -16012,16 +16114,90 @@
                 </a:solidFill>
                 <a:latin typeface="Consolas, "/>
               </a:rPr>
-              <a:t>&gt; map; </a:t>
+              <a:t>&gt; map;</a:t>
+            </a:r>
+          </a:p>
+          <a:p>
+            <a:r>
+              <a:rPr lang="en-US" dirty="0" err="1">
+                <a:solidFill>
+                  <a:srgbClr val="000000"/>
+                </a:solidFill>
+                <a:latin typeface="Consolas, "/>
+              </a:rPr>
+              <a:t>map.insert</a:t>
             </a:r>
             <a:r>
               <a:rPr lang="en-US" dirty="0">
                 <a:solidFill>
+                  <a:srgbClr val="000000"/>
+                </a:solidFill>
+                <a:latin typeface="Consolas, "/>
+              </a:rPr>
+              <a:t>(std::</a:t>
+            </a:r>
+            <a:r>
+              <a:rPr lang="en-US" dirty="0" err="1">
+                <a:solidFill>
+                  <a:srgbClr val="000000"/>
+                </a:solidFill>
+                <a:latin typeface="Consolas, "/>
+              </a:rPr>
+              <a:t>make_pair</a:t>
+            </a:r>
+            <a:r>
+              <a:rPr lang="en-US" dirty="0">
+                <a:solidFill>
+                  <a:srgbClr val="000000"/>
+                </a:solidFill>
+                <a:latin typeface="Consolas, "/>
+              </a:rPr>
+              <a:t>(</a:t>
+            </a:r>
+            <a:r>
+              <a:rPr lang="en-US" dirty="0">
+                <a:solidFill>
+                  <a:srgbClr val="098658"/>
+                </a:solidFill>
+                <a:latin typeface="Consolas, "/>
+              </a:rPr>
+              <a:t>1</a:t>
+            </a:r>
+            <a:r>
+              <a:rPr lang="en-US" dirty="0">
+                <a:solidFill>
+                  <a:srgbClr val="000000"/>
+                </a:solidFill>
+                <a:latin typeface="Consolas, "/>
+              </a:rPr>
+              <a:t>, </a:t>
+            </a:r>
+            <a:r>
+              <a:rPr lang="en-US" dirty="0">
+                <a:solidFill>
+                  <a:srgbClr val="098658"/>
+                </a:solidFill>
+                <a:latin typeface="Consolas, "/>
+              </a:rPr>
+              <a:t>1</a:t>
+            </a:r>
+            <a:r>
+              <a:rPr lang="en-US" dirty="0">
+                <a:solidFill>
+                  <a:srgbClr val="000000"/>
+                </a:solidFill>
+                <a:latin typeface="Consolas, "/>
+              </a:rPr>
+              <a:t>)); </a:t>
+            </a:r>
+            <a:r>
+              <a:rPr lang="en-US" dirty="0">
+                <a:solidFill>
                   <a:srgbClr val="008000"/>
                 </a:solidFill>
                 <a:latin typeface="Consolas, "/>
               </a:rPr>
-              <a:t>// Unique keys, associated with values</a:t>
+              <a:t>// key is 1, value is 1</a:t>
             </a:r>
             <a:endParaRPr lang="en-US" dirty="0">
               <a:solidFill>
@@ -16032,26 +16208,53 @@
           </a:p>
           <a:p>
             <a:r>
+              <a:rPr lang="en-US" dirty="0" err="1">
+                <a:solidFill>
+                  <a:srgbClr val="000000"/>
+                </a:solidFill>
+                <a:latin typeface="Consolas, "/>
+              </a:rPr>
+              <a:t>map.insert</a:t>
+            </a:r>
+            <a:r>
               <a:rPr lang="en-US" dirty="0">
                 <a:solidFill>
                   <a:srgbClr val="000000"/>
                 </a:solidFill>
                 <a:latin typeface="Consolas, "/>
               </a:rPr>
-              <a:t>std::multimap&lt;</a:t>
+              <a:t>(std::</a:t>
+            </a:r>
+            <a:r>
+              <a:rPr lang="en-US" dirty="0" err="1">
+                <a:solidFill>
+                  <a:srgbClr val="000000"/>
+                </a:solidFill>
+                <a:latin typeface="Consolas, "/>
+              </a:rPr>
+              <a:t>make_pair</a:t>
             </a:r>
             <a:r>
               <a:rPr lang="en-US" dirty="0">
                 <a:solidFill>
-                  <a:srgbClr val="0000FF"/>
+                  <a:srgbClr val="000000"/>
                 </a:solidFill>
                 <a:latin typeface="Consolas, "/>
               </a:rPr>
-              <a:t>int</a:t>
+              <a:t>(</a:t>
             </a:r>
             <a:r>
               <a:rPr lang="en-US" dirty="0">
                 <a:solidFill>
+                  <a:srgbClr val="098658"/>
+                </a:solidFill>
+                <a:latin typeface="Consolas, "/>
+              </a:rPr>
+              <a:t>1</a:t>
+            </a:r>
+            <a:r>
+              <a:rPr lang="en-US" dirty="0">
+                <a:solidFill>
                   <a:srgbClr val="000000"/>
                 </a:solidFill>
                 <a:latin typeface="Consolas, "/>
@@ -16061,11 +16264,11 @@
             <a:r>
               <a:rPr lang="en-US" dirty="0">
                 <a:solidFill>
-                  <a:srgbClr val="0000FF"/>
+                  <a:srgbClr val="098658"/>
                 </a:solidFill>
                 <a:latin typeface="Consolas, "/>
               </a:rPr>
-              <a:t>int</a:t>
+              <a:t>10</a:t>
             </a:r>
             <a:r>
               <a:rPr lang="en-US" dirty="0">
@@ -16074,34 +16277,16 @@
                 </a:solidFill>
                 <a:latin typeface="Consolas, "/>
               </a:rPr>
-              <a:t>&gt; </a:t>
-            </a:r>
-            <a:r>
-              <a:rPr lang="en-US" dirty="0" err="1">
-                <a:solidFill>
-                  <a:srgbClr val="000000"/>
+              <a:t>)); </a:t>
+            </a:r>
+            <a:r>
+              <a:rPr lang="en-US" dirty="0">
+                <a:solidFill>
+                  <a:srgbClr val="008000"/>
                 </a:solidFill>
                 <a:latin typeface="Consolas, "/>
               </a:rPr>
-              <a:t>mmap</a:t>
-            </a:r>
-            <a:r>
-              <a:rPr lang="en-US" dirty="0">
-                <a:solidFill>
-                  <a:srgbClr val="000000"/>
-                </a:solidFill>
-                <a:latin typeface="Consolas, "/>
-              </a:rPr>
-              <a:t>; </a:t>
-            </a:r>
-            <a:r>
-              <a:rPr lang="en-US" dirty="0">
-                <a:solidFill>
-                  <a:srgbClr val="008000"/>
-                </a:solidFill>
-                <a:latin typeface="Consolas, "/>
-              </a:rPr>
-              <a:t>// Allows duplicated keys</a:t>
+              <a:t>// Failed - key 1 is duplicated</a:t>
             </a:r>
             <a:endParaRPr lang="en-US" dirty="0">
               <a:solidFill>
@@ -16111,125 +16296,10 @@
             </a:endParaRPr>
           </a:p>
           <a:p>
-            <a:r>
-              <a:rPr lang="en-US" dirty="0">
-                <a:solidFill>
-                  <a:srgbClr val="000000"/>
-                </a:solidFill>
-                <a:latin typeface="Consolas, "/>
-              </a:rPr>
-              <a:t>std::set&lt;</a:t>
-            </a:r>
-            <a:r>
-              <a:rPr lang="en-US" dirty="0">
-                <a:solidFill>
-                  <a:srgbClr val="0000FF"/>
-                </a:solidFill>
-                <a:latin typeface="Consolas, "/>
-              </a:rPr>
-              <a:t>int</a:t>
-            </a:r>
-            <a:r>
-              <a:rPr lang="en-US" dirty="0">
-                <a:solidFill>
-                  <a:srgbClr val="000000"/>
-                </a:solidFill>
-                <a:latin typeface="Consolas, "/>
-              </a:rPr>
-              <a:t>&gt; set; </a:t>
-            </a:r>
-            <a:r>
-              <a:rPr lang="en-US" dirty="0">
-                <a:solidFill>
-                  <a:srgbClr val="008000"/>
-                </a:solidFill>
-                <a:latin typeface="Consolas, "/>
-              </a:rPr>
-              <a:t>//  Unique elements</a:t>
-            </a:r>
-            <a:endParaRPr lang="en-US" dirty="0">
-              <a:solidFill>
-                <a:srgbClr val="000000"/>
-              </a:solidFill>
-              <a:latin typeface="Consolas, "/>
-            </a:endParaRPr>
-          </a:p>
-          <a:p>
-            <a:r>
-              <a:rPr lang="en-US" dirty="0">
-                <a:solidFill>
-                  <a:srgbClr val="000000"/>
-                </a:solidFill>
-                <a:latin typeface="Consolas, "/>
-              </a:rPr>
-              <a:t>std::multiset&lt;</a:t>
-            </a:r>
-            <a:r>
-              <a:rPr lang="en-US" dirty="0">
-                <a:solidFill>
-                  <a:srgbClr val="0000FF"/>
-                </a:solidFill>
-                <a:latin typeface="Consolas, "/>
-              </a:rPr>
-              <a:t>int</a:t>
-            </a:r>
-            <a:r>
-              <a:rPr lang="en-US" dirty="0">
-                <a:solidFill>
-                  <a:srgbClr val="000000"/>
-                </a:solidFill>
-                <a:latin typeface="Consolas, "/>
-              </a:rPr>
-              <a:t>&gt; </a:t>
-            </a:r>
-            <a:r>
-              <a:rPr lang="en-US" dirty="0" err="1">
-                <a:solidFill>
-                  <a:srgbClr val="000000"/>
-                </a:solidFill>
-                <a:latin typeface="Consolas, "/>
-              </a:rPr>
-              <a:t>mset</a:t>
-            </a:r>
-            <a:r>
-              <a:rPr lang="en-US" dirty="0">
-                <a:solidFill>
-                  <a:srgbClr val="000000"/>
-                </a:solidFill>
-                <a:latin typeface="Consolas, "/>
-              </a:rPr>
-              <a:t>; </a:t>
-            </a:r>
-            <a:r>
-              <a:rPr lang="en-US" dirty="0">
-                <a:solidFill>
-                  <a:srgbClr val="008000"/>
-                </a:solidFill>
-                <a:latin typeface="Consolas, "/>
-              </a:rPr>
-              <a:t>// Duplicated elements</a:t>
-            </a:r>
-            <a:endParaRPr lang="en-US" dirty="0">
-              <a:solidFill>
-                <a:srgbClr val="000000"/>
-              </a:solidFill>
-              <a:latin typeface="Consolas, "/>
-            </a:endParaRPr>
-          </a:p>
-          <a:p>
-            <a:br>
-              <a:rPr lang="en-US" sz="2400" dirty="0">
-                <a:solidFill>
-                  <a:srgbClr val="000000"/>
-                </a:solidFill>
-                <a:latin typeface="Consolas, "/>
-              </a:rPr>
-            </a:br>
-            <a:endParaRPr lang="en-US" sz="2400" dirty="0">
-              <a:solidFill>
-                <a:srgbClr val="000000"/>
-              </a:solidFill>
-              <a:latin typeface="Consolas, "/>
+            <a:endParaRPr lang="en-US" sz="2100" i="1" dirty="0">
+              <a:latin typeface="Intel Clear Light" panose="020B0404020203020204" pitchFamily="34" charset="0"/>
+              <a:ea typeface="Intel Clear Light" panose="020B0404020203020204" pitchFamily="34" charset="0"/>
+              <a:cs typeface="Intel Clear Light" panose="020B0404020203020204" pitchFamily="34" charset="0"/>
             </a:endParaRPr>
           </a:p>
           <a:p>
@@ -16244,7 +16314,7 @@
     </p:spTree>
     <p:extLst>
       <p:ext uri="{BB962C8B-B14F-4D97-AF65-F5344CB8AC3E}">
-        <p14:creationId xmlns:p14="http://schemas.microsoft.com/office/powerpoint/2010/main" val="992135282"/>
+        <p14:creationId xmlns:p14="http://schemas.microsoft.com/office/powerpoint/2010/main" val="782856707"/>
       </p:ext>
     </p:extLst>
   </p:cSld>
@@ -16315,7 +16385,7 @@
         </p:nvSpPr>
         <p:spPr>
           <a:xfrm>
-            <a:off x="457200" y="196181"/>
+            <a:off x="457200" y="171812"/>
             <a:ext cx="8229600" cy="634184"/>
           </a:xfrm>
         </p:spPr>
@@ -16503,16 +16573,158 @@
           </a:lstStyle>
           <a:p>
             <a:r>
-              <a:rPr lang="nn-NO" sz="2400" dirty="0">
+              <a:rPr lang="en-US" dirty="0">
                 <a:solidFill>
                   <a:srgbClr val="000000"/>
                 </a:solidFill>
                 <a:latin typeface="Consolas, "/>
               </a:rPr>
+              <a:t>std::map&lt;</a:t>
+            </a:r>
+            <a:r>
+              <a:rPr lang="en-US" dirty="0">
+                <a:solidFill>
+                  <a:srgbClr val="0000FF"/>
+                </a:solidFill>
+                <a:latin typeface="Consolas, "/>
+              </a:rPr>
+              <a:t>int</a:t>
+            </a:r>
+            <a:r>
+              <a:rPr lang="en-US" dirty="0">
+                <a:solidFill>
+                  <a:srgbClr val="000000"/>
+                </a:solidFill>
+                <a:latin typeface="Consolas, "/>
+              </a:rPr>
+              <a:t>, </a:t>
+            </a:r>
+            <a:r>
+              <a:rPr lang="en-US" dirty="0">
+                <a:solidFill>
+                  <a:srgbClr val="0000FF"/>
+                </a:solidFill>
+                <a:latin typeface="Consolas, "/>
+              </a:rPr>
+              <a:t>int</a:t>
+            </a:r>
+            <a:r>
+              <a:rPr lang="en-US" dirty="0">
+                <a:solidFill>
+                  <a:srgbClr val="000000"/>
+                </a:solidFill>
+                <a:latin typeface="Consolas, "/>
+              </a:rPr>
+              <a:t>&gt; map; </a:t>
+            </a:r>
+            <a:r>
+              <a:rPr lang="en-US" dirty="0">
+                <a:solidFill>
+                  <a:srgbClr val="008000"/>
+                </a:solidFill>
+                <a:latin typeface="Consolas, "/>
+              </a:rPr>
+              <a:t>// Unique keys, associated with values</a:t>
+            </a:r>
+            <a:endParaRPr lang="en-US" dirty="0">
+              <a:solidFill>
+                <a:srgbClr val="000000"/>
+              </a:solidFill>
+              <a:latin typeface="Consolas, "/>
+            </a:endParaRPr>
+          </a:p>
+          <a:p>
+            <a:r>
+              <a:rPr lang="en-US" dirty="0">
+                <a:solidFill>
+                  <a:srgbClr val="000000"/>
+                </a:solidFill>
+                <a:latin typeface="Consolas, "/>
+              </a:rPr>
+              <a:t>std::multimap&lt;</a:t>
+            </a:r>
+            <a:r>
+              <a:rPr lang="en-US" dirty="0">
+                <a:solidFill>
+                  <a:srgbClr val="0000FF"/>
+                </a:solidFill>
+                <a:latin typeface="Consolas, "/>
+              </a:rPr>
+              <a:t>int</a:t>
+            </a:r>
+            <a:r>
+              <a:rPr lang="en-US" dirty="0">
+                <a:solidFill>
+                  <a:srgbClr val="000000"/>
+                </a:solidFill>
+                <a:latin typeface="Consolas, "/>
+              </a:rPr>
+              <a:t>, </a:t>
+            </a:r>
+            <a:r>
+              <a:rPr lang="en-US" dirty="0">
+                <a:solidFill>
+                  <a:srgbClr val="0000FF"/>
+                </a:solidFill>
+                <a:latin typeface="Consolas, "/>
+              </a:rPr>
+              <a:t>int</a:t>
+            </a:r>
+            <a:r>
+              <a:rPr lang="en-US" dirty="0">
+                <a:solidFill>
+                  <a:srgbClr val="000000"/>
+                </a:solidFill>
+                <a:latin typeface="Consolas, "/>
+              </a:rPr>
+              <a:t>&gt; </a:t>
+            </a:r>
+            <a:r>
+              <a:rPr lang="en-US" dirty="0" err="1">
+                <a:solidFill>
+                  <a:srgbClr val="000000"/>
+                </a:solidFill>
+                <a:latin typeface="Consolas, "/>
+              </a:rPr>
+              <a:t>mmap</a:t>
+            </a:r>
+            <a:r>
+              <a:rPr lang="en-US" dirty="0">
+                <a:solidFill>
+                  <a:srgbClr val="000000"/>
+                </a:solidFill>
+                <a:latin typeface="Consolas, "/>
+              </a:rPr>
+              <a:t>; </a:t>
+            </a:r>
+            <a:r>
+              <a:rPr lang="en-US" dirty="0">
+                <a:solidFill>
+                  <a:srgbClr val="008000"/>
+                </a:solidFill>
+                <a:latin typeface="Consolas, "/>
+              </a:rPr>
+              <a:t>// Allows duplicated keys</a:t>
+            </a:r>
+            <a:endParaRPr lang="en-US" dirty="0">
+              <a:solidFill>
+                <a:srgbClr val="000000"/>
+              </a:solidFill>
+              <a:latin typeface="Consolas, "/>
+            </a:endParaRPr>
+          </a:p>
+          <a:p>
+            <a:r>
+              <a:rPr lang="en-US" dirty="0">
+                <a:solidFill>
+                  <a:srgbClr val="000000"/>
+                </a:solidFill>
+                <a:latin typeface="Consolas, "/>
+              </a:rPr>
               <a:t>std::set&lt;</a:t>
             </a:r>
             <a:r>
-              <a:rPr lang="nn-NO" sz="2400" dirty="0">
+              <a:rPr lang="en-US" dirty="0">
                 <a:solidFill>
                   <a:srgbClr val="0000FF"/>
                 </a:solidFill>
@@ -16521,101 +16733,107 @@
               <a:t>int</a:t>
             </a:r>
             <a:r>
-              <a:rPr lang="nn-NO" sz="2400" dirty="0">
+              <a:rPr lang="en-US" dirty="0">
                 <a:solidFill>
                   <a:srgbClr val="000000"/>
                 </a:solidFill>
                 <a:latin typeface="Consolas, "/>
               </a:rPr>
-              <a:t>&gt; s;</a:t>
-            </a:r>
-          </a:p>
-          <a:p>
-            <a:r>
-              <a:rPr lang="nn-NO" sz="2400" dirty="0">
+              <a:t>&gt; set; </a:t>
+            </a:r>
+            <a:r>
+              <a:rPr lang="en-US" dirty="0">
+                <a:solidFill>
+                  <a:srgbClr val="008000"/>
+                </a:solidFill>
+                <a:latin typeface="Consolas, "/>
+              </a:rPr>
+              <a:t>//  Unique elements</a:t>
+            </a:r>
+            <a:endParaRPr lang="en-US" dirty="0">
+              <a:solidFill>
+                <a:srgbClr val="000000"/>
+              </a:solidFill>
+              <a:latin typeface="Consolas, "/>
+            </a:endParaRPr>
+          </a:p>
+          <a:p>
+            <a:r>
+              <a:rPr lang="en-US" dirty="0">
                 <a:solidFill>
                   <a:srgbClr val="000000"/>
                 </a:solidFill>
                 <a:latin typeface="Consolas, "/>
               </a:rPr>
-              <a:t>s.insert(</a:t>
-            </a:r>
-            <a:r>
-              <a:rPr lang="nn-NO" sz="2400" dirty="0">
-                <a:solidFill>
-                  <a:srgbClr val="098658"/>
+              <a:t>std::multiset&lt;</a:t>
+            </a:r>
+            <a:r>
+              <a:rPr lang="en-US" dirty="0">
+                <a:solidFill>
+                  <a:srgbClr val="0000FF"/>
                 </a:solidFill>
                 <a:latin typeface="Consolas, "/>
               </a:rPr>
-              <a:t>100</a:t>
-            </a:r>
-            <a:r>
-              <a:rPr lang="nn-NO" sz="2400" dirty="0">
+              <a:t>int</a:t>
+            </a:r>
+            <a:r>
+              <a:rPr lang="en-US" dirty="0">
                 <a:solidFill>
                   <a:srgbClr val="000000"/>
                 </a:solidFill>
                 <a:latin typeface="Consolas, "/>
               </a:rPr>
-              <a:t>);</a:t>
-            </a:r>
-          </a:p>
-          <a:p>
-            <a:r>
-              <a:rPr lang="nn-NO" sz="2400" dirty="0">
+              <a:t>&gt; </a:t>
+            </a:r>
+            <a:r>
+              <a:rPr lang="en-US" dirty="0" err="1">
                 <a:solidFill>
                   <a:srgbClr val="000000"/>
                 </a:solidFill>
                 <a:latin typeface="Consolas, "/>
               </a:rPr>
-              <a:t>s.insert(</a:t>
-            </a:r>
-            <a:r>
-              <a:rPr lang="nn-NO" sz="2400" dirty="0">
-                <a:solidFill>
-                  <a:srgbClr val="098658"/>
+              <a:t>mset</a:t>
+            </a:r>
+            <a:r>
+              <a:rPr lang="en-US" dirty="0">
+                <a:solidFill>
+                  <a:srgbClr val="000000"/>
                 </a:solidFill>
                 <a:latin typeface="Consolas, "/>
               </a:rPr>
-              <a:t>10</a:t>
-            </a:r>
-            <a:r>
-              <a:rPr lang="nn-NO" sz="2400" dirty="0">
+              <a:t>; </a:t>
+            </a:r>
+            <a:r>
+              <a:rPr lang="en-US" dirty="0">
+                <a:solidFill>
+                  <a:srgbClr val="008000"/>
+                </a:solidFill>
+                <a:latin typeface="Consolas, "/>
+              </a:rPr>
+              <a:t>// Duplicated elements</a:t>
+            </a:r>
+            <a:endParaRPr lang="en-US" dirty="0">
+              <a:solidFill>
+                <a:srgbClr val="000000"/>
+              </a:solidFill>
+              <a:latin typeface="Consolas, "/>
+            </a:endParaRPr>
+          </a:p>
+          <a:p>
+            <a:br>
+              <a:rPr lang="en-US" sz="2400" dirty="0">
                 <a:solidFill>
                   <a:srgbClr val="000000"/>
                 </a:solidFill>
                 <a:latin typeface="Consolas, "/>
               </a:rPr>
-              <a:t>);</a:t>
-            </a:r>
-          </a:p>
-          <a:p>
-            <a:r>
-              <a:rPr lang="nn-NO" sz="2400" dirty="0">
-                <a:solidFill>
-                  <a:srgbClr val="000000"/>
-                </a:solidFill>
-                <a:latin typeface="Consolas, "/>
-              </a:rPr>
-              <a:t>s.insert(</a:t>
-            </a:r>
-            <a:r>
-              <a:rPr lang="nn-NO" sz="2400" dirty="0">
-                <a:solidFill>
-                  <a:srgbClr val="098658"/>
-                </a:solidFill>
-                <a:latin typeface="Consolas, "/>
-              </a:rPr>
-              <a:t>1</a:t>
-            </a:r>
-            <a:r>
-              <a:rPr lang="nn-NO" sz="2400" dirty="0">
-                <a:solidFill>
-                  <a:srgbClr val="000000"/>
-                </a:solidFill>
-                <a:latin typeface="Consolas, "/>
-              </a:rPr>
-              <a:t>);</a:t>
-            </a:r>
+            </a:br>
+            <a:endParaRPr lang="en-US" sz="2400" dirty="0">
+              <a:solidFill>
+                <a:srgbClr val="000000"/>
+              </a:solidFill>
+              <a:latin typeface="Consolas, "/>
+            </a:endParaRPr>
           </a:p>
           <a:p>
             <a:endParaRPr lang="en-US" i="1" dirty="0">
@@ -16626,190 +16844,10 @@
           </a:p>
         </p:txBody>
       </p:sp>
-      <p:sp>
-        <p:nvSpPr>
-          <p:cNvPr id="5" name="Rectangle 4">
-            <a:extLst>
-              <a:ext uri="{FF2B5EF4-FFF2-40B4-BE49-F238E27FC236}">
-                <a16:creationId xmlns:a16="http://schemas.microsoft.com/office/drawing/2014/main" id="{A616C0BA-6B3F-47E4-95C0-6E79024A8C31}"/>
-              </a:ext>
-            </a:extLst>
-          </p:cNvPr>
-          <p:cNvSpPr/>
-          <p:nvPr/>
-        </p:nvSpPr>
-        <p:spPr>
-          <a:xfrm>
-            <a:off x="4950116" y="1046927"/>
-            <a:ext cx="633865" cy="436099"/>
-          </a:xfrm>
-          <a:prstGeom prst="rect">
-            <a:avLst/>
-          </a:prstGeom>
-          <a:solidFill>
-            <a:schemeClr val="bg1"/>
-          </a:solidFill>
-          <a:ln>
-            <a:solidFill>
-              <a:schemeClr val="tx1"/>
-            </a:solidFill>
-          </a:ln>
-          <a:effectLst/>
-        </p:spPr>
-        <p:style>
-          <a:lnRef idx="1">
-            <a:schemeClr val="accent1"/>
-          </a:lnRef>
-          <a:fillRef idx="3">
-            <a:schemeClr val="accent1"/>
-          </a:fillRef>
-          <a:effectRef idx="2">
-            <a:schemeClr val="accent1"/>
-          </a:effectRef>
-          <a:fontRef idx="minor">
-            <a:schemeClr val="lt1"/>
-          </a:fontRef>
-        </p:style>
-        <p:txBody>
-          <a:bodyPr rtlCol="0" anchor="ctr"/>
-          <a:lstStyle/>
-          <a:p>
-            <a:pPr algn="ctr"/>
-            <a:r>
-              <a:rPr lang="en-US" dirty="0">
-                <a:solidFill>
-                  <a:srgbClr val="FF0000"/>
-                </a:solidFill>
-              </a:rPr>
-              <a:t>1</a:t>
-            </a:r>
-          </a:p>
-        </p:txBody>
-      </p:sp>
-      <p:sp>
-        <p:nvSpPr>
-          <p:cNvPr id="6" name="Rectangle 5">
-            <a:extLst>
-              <a:ext uri="{FF2B5EF4-FFF2-40B4-BE49-F238E27FC236}">
-                <a16:creationId xmlns:a16="http://schemas.microsoft.com/office/drawing/2014/main" id="{CC39A4D6-7D1B-4D68-8A8A-BC3789DCBA02}"/>
-              </a:ext>
-            </a:extLst>
-          </p:cNvPr>
-          <p:cNvSpPr/>
-          <p:nvPr/>
-        </p:nvSpPr>
-        <p:spPr>
-          <a:xfrm>
-            <a:off x="5584475" y="1046927"/>
-            <a:ext cx="783425" cy="436099"/>
-          </a:xfrm>
-          <a:prstGeom prst="rect">
-            <a:avLst/>
-          </a:prstGeom>
-          <a:solidFill>
-            <a:schemeClr val="bg1"/>
-          </a:solidFill>
-          <a:ln>
-            <a:solidFill>
-              <a:schemeClr val="tx1"/>
-            </a:solidFill>
-          </a:ln>
-          <a:effectLst/>
-        </p:spPr>
-        <p:style>
-          <a:lnRef idx="1">
-            <a:schemeClr val="accent1"/>
-          </a:lnRef>
-          <a:fillRef idx="3">
-            <a:schemeClr val="accent1"/>
-          </a:fillRef>
-          <a:effectRef idx="2">
-            <a:schemeClr val="accent1"/>
-          </a:effectRef>
-          <a:fontRef idx="minor">
-            <a:schemeClr val="lt1"/>
-          </a:fontRef>
-        </p:style>
-        <p:txBody>
-          <a:bodyPr rtlCol="0" anchor="ctr"/>
-          <a:lstStyle/>
-          <a:p>
-            <a:pPr algn="ctr"/>
-            <a:r>
-              <a:rPr lang="en-US" dirty="0">
-                <a:solidFill>
-                  <a:srgbClr val="FF0000"/>
-                </a:solidFill>
-              </a:rPr>
-              <a:t>10</a:t>
-            </a:r>
-          </a:p>
-        </p:txBody>
-      </p:sp>
-      <p:sp>
-        <p:nvSpPr>
-          <p:cNvPr id="8" name="Rectangle 7">
-            <a:extLst>
-              <a:ext uri="{FF2B5EF4-FFF2-40B4-BE49-F238E27FC236}">
-                <a16:creationId xmlns:a16="http://schemas.microsoft.com/office/drawing/2014/main" id="{3E76F52A-D68F-4470-9D3E-506DB28EED07}"/>
-              </a:ext>
-            </a:extLst>
-          </p:cNvPr>
-          <p:cNvSpPr/>
-          <p:nvPr/>
-        </p:nvSpPr>
-        <p:spPr>
-          <a:xfrm>
-            <a:off x="6367900" y="1046927"/>
-            <a:ext cx="745978" cy="436099"/>
-          </a:xfrm>
-          <a:prstGeom prst="rect">
-            <a:avLst/>
-          </a:prstGeom>
-          <a:solidFill>
-            <a:schemeClr val="bg1"/>
-          </a:solidFill>
-          <a:ln>
-            <a:solidFill>
-              <a:schemeClr val="tx1"/>
-            </a:solidFill>
-          </a:ln>
-          <a:effectLst/>
-        </p:spPr>
-        <p:style>
-          <a:lnRef idx="1">
-            <a:schemeClr val="accent1"/>
-          </a:lnRef>
-          <a:fillRef idx="3">
-            <a:schemeClr val="accent1"/>
-          </a:fillRef>
-          <a:effectRef idx="2">
-            <a:schemeClr val="accent1"/>
-          </a:effectRef>
-          <a:fontRef idx="minor">
-            <a:schemeClr val="lt1"/>
-          </a:fontRef>
-        </p:style>
-        <p:txBody>
-          <a:bodyPr rtlCol="0" anchor="ctr"/>
-          <a:lstStyle/>
-          <a:p>
-            <a:pPr algn="ctr"/>
-            <a:r>
-              <a:rPr lang="en-US" dirty="0">
-                <a:solidFill>
-                  <a:srgbClr val="FF0000"/>
-                </a:solidFill>
-              </a:rPr>
-              <a:t>100</a:t>
-            </a:r>
-          </a:p>
-        </p:txBody>
-      </p:sp>
     </p:spTree>
     <p:extLst>
       <p:ext uri="{BB962C8B-B14F-4D97-AF65-F5344CB8AC3E}">
-        <p14:creationId xmlns:p14="http://schemas.microsoft.com/office/powerpoint/2010/main" val="266470324"/>
+        <p14:creationId xmlns:p14="http://schemas.microsoft.com/office/powerpoint/2010/main" val="992135282"/>
       </p:ext>
     </p:extLst>
   </p:cSld>
@@ -16846,7 +16884,68 @@
       </p:grpSpPr>
       <p:sp>
         <p:nvSpPr>
-          <p:cNvPr id="5" name="Content Placeholder 2"/>
+          <p:cNvPr id="2" name="Slide Number Placeholder 1"/>
+          <p:cNvSpPr>
+            <a:spLocks noGrp="1"/>
+          </p:cNvSpPr>
+          <p:nvPr>
+            <p:ph type="sldNum" sz="quarter" idx="12"/>
+          </p:nvPr>
+        </p:nvSpPr>
+        <p:spPr/>
+        <p:txBody>
+          <a:bodyPr/>
+          <a:lstStyle/>
+          <a:p>
+            <a:fld id="{EE2556C5-CE8C-6547-B838-EA80C61A4AF7}" type="slidenum">
+              <a:rPr lang="en-US" smtClean="0"/>
+              <a:pPr/>
+              <a:t>22</a:t>
+            </a:fld>
+            <a:endParaRPr lang="en-US" dirty="0"/>
+          </a:p>
+        </p:txBody>
+      </p:sp>
+      <p:sp>
+        <p:nvSpPr>
+          <p:cNvPr id="7" name="Title 3"/>
+          <p:cNvSpPr>
+            <a:spLocks noGrp="1"/>
+          </p:cNvSpPr>
+          <p:nvPr>
+            <p:ph type="title"/>
+          </p:nvPr>
+        </p:nvSpPr>
+        <p:spPr>
+          <a:xfrm>
+            <a:off x="457200" y="196181"/>
+            <a:ext cx="8229600" cy="634184"/>
+          </a:xfrm>
+        </p:spPr>
+        <p:txBody>
+          <a:bodyPr/>
+          <a:lstStyle/>
+          <a:p>
+            <a:r>
+              <a:rPr lang="en-US" dirty="0">
+                <a:latin typeface="Intel Clear Pro Bold" panose="020B0804020202060201" pitchFamily="34" charset="-52"/>
+                <a:ea typeface="Intel Clear Pro Bold" panose="020B0804020202060201" pitchFamily="34" charset="-52"/>
+                <a:cs typeface="Intel Clear Pro Bold" panose="020B0804020202060201" pitchFamily="34" charset="-52"/>
+              </a:rPr>
+              <a:t>Associative containers</a:t>
+            </a:r>
+          </a:p>
+        </p:txBody>
+      </p:sp>
+      <p:sp>
+        <p:nvSpPr>
+          <p:cNvPr id="16" name="Content Placeholder 2">
+            <a:extLst>
+              <a:ext uri="{FF2B5EF4-FFF2-40B4-BE49-F238E27FC236}">
+                <a16:creationId xmlns:a16="http://schemas.microsoft.com/office/drawing/2014/main" id="{4932622C-479E-4CD8-BADB-4D2E0D79A554}"/>
+              </a:ext>
+            </a:extLst>
+          </p:cNvPr>
           <p:cNvSpPr txBox="1">
             <a:spLocks/>
           </p:cNvSpPr>
@@ -16855,7 +16954,7 @@
         <p:spPr>
           <a:xfrm>
             <a:off x="558800" y="943032"/>
-            <a:ext cx="3973689" cy="3394472"/>
+            <a:ext cx="8342313" cy="3394472"/>
           </a:xfrm>
           <a:prstGeom prst="rect">
             <a:avLst/>
@@ -17007,6 +17106,510 @@
           </a:lstStyle>
           <a:p>
             <a:r>
+              <a:rPr lang="nn-NO" sz="2400" dirty="0">
+                <a:solidFill>
+                  <a:srgbClr val="000000"/>
+                </a:solidFill>
+                <a:latin typeface="Consolas, "/>
+              </a:rPr>
+              <a:t>std::set&lt;</a:t>
+            </a:r>
+            <a:r>
+              <a:rPr lang="nn-NO" sz="2400" dirty="0">
+                <a:solidFill>
+                  <a:srgbClr val="0000FF"/>
+                </a:solidFill>
+                <a:latin typeface="Consolas, "/>
+              </a:rPr>
+              <a:t>int</a:t>
+            </a:r>
+            <a:r>
+              <a:rPr lang="nn-NO" sz="2400" dirty="0">
+                <a:solidFill>
+                  <a:srgbClr val="000000"/>
+                </a:solidFill>
+                <a:latin typeface="Consolas, "/>
+              </a:rPr>
+              <a:t>&gt; s;</a:t>
+            </a:r>
+          </a:p>
+          <a:p>
+            <a:r>
+              <a:rPr lang="nn-NO" sz="2400" dirty="0">
+                <a:solidFill>
+                  <a:srgbClr val="000000"/>
+                </a:solidFill>
+                <a:latin typeface="Consolas, "/>
+              </a:rPr>
+              <a:t>s.insert(</a:t>
+            </a:r>
+            <a:r>
+              <a:rPr lang="nn-NO" sz="2400" dirty="0">
+                <a:solidFill>
+                  <a:srgbClr val="098658"/>
+                </a:solidFill>
+                <a:latin typeface="Consolas, "/>
+              </a:rPr>
+              <a:t>100</a:t>
+            </a:r>
+            <a:r>
+              <a:rPr lang="nn-NO" sz="2400" dirty="0">
+                <a:solidFill>
+                  <a:srgbClr val="000000"/>
+                </a:solidFill>
+                <a:latin typeface="Consolas, "/>
+              </a:rPr>
+              <a:t>);</a:t>
+            </a:r>
+          </a:p>
+          <a:p>
+            <a:r>
+              <a:rPr lang="nn-NO" sz="2400" dirty="0">
+                <a:solidFill>
+                  <a:srgbClr val="000000"/>
+                </a:solidFill>
+                <a:latin typeface="Consolas, "/>
+              </a:rPr>
+              <a:t>s.insert(</a:t>
+            </a:r>
+            <a:r>
+              <a:rPr lang="nn-NO" sz="2400" dirty="0">
+                <a:solidFill>
+                  <a:srgbClr val="098658"/>
+                </a:solidFill>
+                <a:latin typeface="Consolas, "/>
+              </a:rPr>
+              <a:t>10</a:t>
+            </a:r>
+            <a:r>
+              <a:rPr lang="nn-NO" sz="2400" dirty="0">
+                <a:solidFill>
+                  <a:srgbClr val="000000"/>
+                </a:solidFill>
+                <a:latin typeface="Consolas, "/>
+              </a:rPr>
+              <a:t>);</a:t>
+            </a:r>
+          </a:p>
+          <a:p>
+            <a:r>
+              <a:rPr lang="nn-NO" sz="2400" dirty="0">
+                <a:solidFill>
+                  <a:srgbClr val="000000"/>
+                </a:solidFill>
+                <a:latin typeface="Consolas, "/>
+              </a:rPr>
+              <a:t>s.insert(</a:t>
+            </a:r>
+            <a:r>
+              <a:rPr lang="nn-NO" sz="2400" dirty="0">
+                <a:solidFill>
+                  <a:srgbClr val="098658"/>
+                </a:solidFill>
+                <a:latin typeface="Consolas, "/>
+              </a:rPr>
+              <a:t>1</a:t>
+            </a:r>
+            <a:r>
+              <a:rPr lang="nn-NO" sz="2400" dirty="0">
+                <a:solidFill>
+                  <a:srgbClr val="000000"/>
+                </a:solidFill>
+                <a:latin typeface="Consolas, "/>
+              </a:rPr>
+              <a:t>);</a:t>
+            </a:r>
+          </a:p>
+          <a:p>
+            <a:endParaRPr lang="en-US" i="1" dirty="0">
+              <a:latin typeface="Intel Clear Light" panose="020B0404020203020204" pitchFamily="34" charset="0"/>
+              <a:ea typeface="Intel Clear Light" panose="020B0404020203020204" pitchFamily="34" charset="0"/>
+              <a:cs typeface="Intel Clear Light" panose="020B0404020203020204" pitchFamily="34" charset="0"/>
+            </a:endParaRPr>
+          </a:p>
+        </p:txBody>
+      </p:sp>
+      <p:sp>
+        <p:nvSpPr>
+          <p:cNvPr id="5" name="Rectangle 4">
+            <a:extLst>
+              <a:ext uri="{FF2B5EF4-FFF2-40B4-BE49-F238E27FC236}">
+                <a16:creationId xmlns:a16="http://schemas.microsoft.com/office/drawing/2014/main" id="{A616C0BA-6B3F-47E4-95C0-6E79024A8C31}"/>
+              </a:ext>
+            </a:extLst>
+          </p:cNvPr>
+          <p:cNvSpPr/>
+          <p:nvPr/>
+        </p:nvSpPr>
+        <p:spPr>
+          <a:xfrm>
+            <a:off x="4950116" y="1046927"/>
+            <a:ext cx="633865" cy="436099"/>
+          </a:xfrm>
+          <a:prstGeom prst="rect">
+            <a:avLst/>
+          </a:prstGeom>
+          <a:solidFill>
+            <a:schemeClr val="bg1"/>
+          </a:solidFill>
+          <a:ln>
+            <a:solidFill>
+              <a:schemeClr val="tx1"/>
+            </a:solidFill>
+          </a:ln>
+          <a:effectLst/>
+        </p:spPr>
+        <p:style>
+          <a:lnRef idx="1">
+            <a:schemeClr val="accent1"/>
+          </a:lnRef>
+          <a:fillRef idx="3">
+            <a:schemeClr val="accent1"/>
+          </a:fillRef>
+          <a:effectRef idx="2">
+            <a:schemeClr val="accent1"/>
+          </a:effectRef>
+          <a:fontRef idx="minor">
+            <a:schemeClr val="lt1"/>
+          </a:fontRef>
+        </p:style>
+        <p:txBody>
+          <a:bodyPr rtlCol="0" anchor="ctr"/>
+          <a:lstStyle/>
+          <a:p>
+            <a:pPr algn="ctr"/>
+            <a:r>
+              <a:rPr lang="en-US" dirty="0">
+                <a:solidFill>
+                  <a:srgbClr val="FF0000"/>
+                </a:solidFill>
+              </a:rPr>
+              <a:t>1</a:t>
+            </a:r>
+          </a:p>
+        </p:txBody>
+      </p:sp>
+      <p:sp>
+        <p:nvSpPr>
+          <p:cNvPr id="6" name="Rectangle 5">
+            <a:extLst>
+              <a:ext uri="{FF2B5EF4-FFF2-40B4-BE49-F238E27FC236}">
+                <a16:creationId xmlns:a16="http://schemas.microsoft.com/office/drawing/2014/main" id="{CC39A4D6-7D1B-4D68-8A8A-BC3789DCBA02}"/>
+              </a:ext>
+            </a:extLst>
+          </p:cNvPr>
+          <p:cNvSpPr/>
+          <p:nvPr/>
+        </p:nvSpPr>
+        <p:spPr>
+          <a:xfrm>
+            <a:off x="5584475" y="1046927"/>
+            <a:ext cx="783425" cy="436099"/>
+          </a:xfrm>
+          <a:prstGeom prst="rect">
+            <a:avLst/>
+          </a:prstGeom>
+          <a:solidFill>
+            <a:schemeClr val="bg1"/>
+          </a:solidFill>
+          <a:ln>
+            <a:solidFill>
+              <a:schemeClr val="tx1"/>
+            </a:solidFill>
+          </a:ln>
+          <a:effectLst/>
+        </p:spPr>
+        <p:style>
+          <a:lnRef idx="1">
+            <a:schemeClr val="accent1"/>
+          </a:lnRef>
+          <a:fillRef idx="3">
+            <a:schemeClr val="accent1"/>
+          </a:fillRef>
+          <a:effectRef idx="2">
+            <a:schemeClr val="accent1"/>
+          </a:effectRef>
+          <a:fontRef idx="minor">
+            <a:schemeClr val="lt1"/>
+          </a:fontRef>
+        </p:style>
+        <p:txBody>
+          <a:bodyPr rtlCol="0" anchor="ctr"/>
+          <a:lstStyle/>
+          <a:p>
+            <a:pPr algn="ctr"/>
+            <a:r>
+              <a:rPr lang="en-US" dirty="0">
+                <a:solidFill>
+                  <a:srgbClr val="FF0000"/>
+                </a:solidFill>
+              </a:rPr>
+              <a:t>10</a:t>
+            </a:r>
+          </a:p>
+        </p:txBody>
+      </p:sp>
+      <p:sp>
+        <p:nvSpPr>
+          <p:cNvPr id="8" name="Rectangle 7">
+            <a:extLst>
+              <a:ext uri="{FF2B5EF4-FFF2-40B4-BE49-F238E27FC236}">
+                <a16:creationId xmlns:a16="http://schemas.microsoft.com/office/drawing/2014/main" id="{3E76F52A-D68F-4470-9D3E-506DB28EED07}"/>
+              </a:ext>
+            </a:extLst>
+          </p:cNvPr>
+          <p:cNvSpPr/>
+          <p:nvPr/>
+        </p:nvSpPr>
+        <p:spPr>
+          <a:xfrm>
+            <a:off x="6367900" y="1046927"/>
+            <a:ext cx="745978" cy="436099"/>
+          </a:xfrm>
+          <a:prstGeom prst="rect">
+            <a:avLst/>
+          </a:prstGeom>
+          <a:solidFill>
+            <a:schemeClr val="bg1"/>
+          </a:solidFill>
+          <a:ln>
+            <a:solidFill>
+              <a:schemeClr val="tx1"/>
+            </a:solidFill>
+          </a:ln>
+          <a:effectLst/>
+        </p:spPr>
+        <p:style>
+          <a:lnRef idx="1">
+            <a:schemeClr val="accent1"/>
+          </a:lnRef>
+          <a:fillRef idx="3">
+            <a:schemeClr val="accent1"/>
+          </a:fillRef>
+          <a:effectRef idx="2">
+            <a:schemeClr val="accent1"/>
+          </a:effectRef>
+          <a:fontRef idx="minor">
+            <a:schemeClr val="lt1"/>
+          </a:fontRef>
+        </p:style>
+        <p:txBody>
+          <a:bodyPr rtlCol="0" anchor="ctr"/>
+          <a:lstStyle/>
+          <a:p>
+            <a:pPr algn="ctr"/>
+            <a:r>
+              <a:rPr lang="en-US" dirty="0">
+                <a:solidFill>
+                  <a:srgbClr val="FF0000"/>
+                </a:solidFill>
+              </a:rPr>
+              <a:t>100</a:t>
+            </a:r>
+          </a:p>
+        </p:txBody>
+      </p:sp>
+    </p:spTree>
+    <p:extLst>
+      <p:ext uri="{BB962C8B-B14F-4D97-AF65-F5344CB8AC3E}">
+        <p14:creationId xmlns:p14="http://schemas.microsoft.com/office/powerpoint/2010/main" val="266470324"/>
+      </p:ext>
+    </p:extLst>
+  </p:cSld>
+  <p:clrMapOvr>
+    <a:masterClrMapping/>
+  </p:clrMapOvr>
+  <mc:AlternateContent xmlns:mc="http://schemas.openxmlformats.org/markup-compatibility/2006" xmlns:p14="http://schemas.microsoft.com/office/powerpoint/2010/main">
+    <mc:Choice Requires="p14">
+      <p:transition p14:dur="10"/>
+    </mc:Choice>
+    <mc:Fallback xmlns="">
+      <p:transition/>
+    </mc:Fallback>
+  </mc:AlternateContent>
+</p:sld>
+</file>
+
+<file path=ppt/slides/slide23.xml><?xml version="1.0" encoding="utf-8"?>
+<p:sld xmlns:a="http://schemas.openxmlformats.org/drawingml/2006/main" xmlns:r="http://schemas.openxmlformats.org/officeDocument/2006/relationships" xmlns:p="http://schemas.openxmlformats.org/presentationml/2006/main">
+  <p:cSld>
+    <p:spTree>
+      <p:nvGrpSpPr>
+        <p:cNvPr id="1" name=""/>
+        <p:cNvGrpSpPr/>
+        <p:nvPr/>
+      </p:nvGrpSpPr>
+      <p:grpSpPr>
+        <a:xfrm>
+          <a:off x="0" y="0"/>
+          <a:ext cx="0" cy="0"/>
+          <a:chOff x="0" y="0"/>
+          <a:chExt cx="0" cy="0"/>
+        </a:xfrm>
+      </p:grpSpPr>
+      <p:sp>
+        <p:nvSpPr>
+          <p:cNvPr id="5" name="Content Placeholder 2"/>
+          <p:cNvSpPr txBox="1">
+            <a:spLocks/>
+          </p:cNvSpPr>
+          <p:nvPr/>
+        </p:nvSpPr>
+        <p:spPr>
+          <a:xfrm>
+            <a:off x="558800" y="943032"/>
+            <a:ext cx="3973689" cy="3394472"/>
+          </a:xfrm>
+          <a:prstGeom prst="rect">
+            <a:avLst/>
+          </a:prstGeom>
+        </p:spPr>
+        <p:txBody>
+          <a:bodyPr>
+            <a:normAutofit/>
+          </a:bodyPr>
+          <a:lstStyle>
+            <a:lvl1pPr marL="0" indent="0" algn="l" defTabSz="457200" rtl="0" eaLnBrk="1" latinLnBrk="0" hangingPunct="1">
+              <a:spcBef>
+                <a:spcPts val="1200"/>
+              </a:spcBef>
+              <a:spcAft>
+                <a:spcPts val="0"/>
+              </a:spcAft>
+              <a:buFont typeface="Wingdings" panose="05000000000000000000" pitchFamily="2" charset="2"/>
+              <a:buNone/>
+              <a:defRPr sz="1800" b="0" kern="1200">
+                <a:solidFill>
+                  <a:srgbClr val="0071C5"/>
+                </a:solidFill>
+                <a:latin typeface="+mn-lt"/>
+                <a:ea typeface="+mn-ea"/>
+                <a:cs typeface="Intel Clear" panose="020B0604020203020204" pitchFamily="34" charset="0"/>
+              </a:defRPr>
+            </a:lvl1pPr>
+            <a:lvl2pPr marL="225425" indent="-225425" algn="l" defTabSz="457200" rtl="0" eaLnBrk="1" latinLnBrk="0" hangingPunct="1">
+              <a:spcBef>
+                <a:spcPts val="1200"/>
+              </a:spcBef>
+              <a:buFont typeface="Wingdings" charset="2"/>
+              <a:buChar char="§"/>
+              <a:defRPr sz="1600" kern="1200" baseline="0">
+                <a:solidFill>
+                  <a:schemeClr val="tx2"/>
+                </a:solidFill>
+                <a:latin typeface="+mn-lt"/>
+                <a:ea typeface="+mn-ea"/>
+                <a:cs typeface="Intel Clear" panose="020B0604020203020204" pitchFamily="34" charset="0"/>
+              </a:defRPr>
+            </a:lvl2pPr>
+            <a:lvl3pPr marL="571500" indent="-228600" algn="l" defTabSz="457200" rtl="0" eaLnBrk="1" latinLnBrk="0" hangingPunct="1">
+              <a:spcBef>
+                <a:spcPts val="800"/>
+              </a:spcBef>
+              <a:buFont typeface="Intel Clear" panose="020B0604020203020204" pitchFamily="34" charset="0"/>
+              <a:buChar char="–"/>
+              <a:defRPr sz="1600" kern="1200">
+                <a:solidFill>
+                  <a:schemeClr val="tx2"/>
+                </a:solidFill>
+                <a:latin typeface="+mn-lt"/>
+                <a:ea typeface="+mn-ea"/>
+                <a:cs typeface="Intel Clear" panose="020B0604020203020204" pitchFamily="34" charset="0"/>
+              </a:defRPr>
+            </a:lvl3pPr>
+            <a:lvl4pPr marL="969963" indent="-228600" algn="l" defTabSz="457200" rtl="0" eaLnBrk="1" latinLnBrk="0" hangingPunct="1">
+              <a:spcBef>
+                <a:spcPct val="20000"/>
+              </a:spcBef>
+              <a:buFont typeface="Arial"/>
+              <a:buChar char="–"/>
+              <a:defRPr sz="1400" kern="1200">
+                <a:solidFill>
+                  <a:schemeClr val="tx2"/>
+                </a:solidFill>
+                <a:latin typeface="+mn-lt"/>
+                <a:ea typeface="+mn-ea"/>
+                <a:cs typeface="Intel Clear" panose="020B0604020203020204" pitchFamily="34" charset="0"/>
+              </a:defRPr>
+            </a:lvl4pPr>
+            <a:lvl5pPr marL="1319213" indent="-228600" algn="l" defTabSz="457200" rtl="0" eaLnBrk="1" latinLnBrk="0" hangingPunct="1">
+              <a:spcBef>
+                <a:spcPct val="20000"/>
+              </a:spcBef>
+              <a:buFont typeface="Intel Clear" panose="020B0604020203020204" pitchFamily="34" charset="0"/>
+              <a:buChar char="–"/>
+              <a:defRPr sz="1400" kern="1200">
+                <a:solidFill>
+                  <a:schemeClr val="tx2"/>
+                </a:solidFill>
+                <a:latin typeface="+mn-lt"/>
+                <a:ea typeface="+mn-ea"/>
+                <a:cs typeface="Intel Clear" panose="020B0604020203020204" pitchFamily="34" charset="0"/>
+              </a:defRPr>
+            </a:lvl5pPr>
+            <a:lvl6pPr marL="2514600" indent="-228600" algn="l" defTabSz="457200" rtl="0" eaLnBrk="1" latinLnBrk="0" hangingPunct="1">
+              <a:spcBef>
+                <a:spcPct val="20000"/>
+              </a:spcBef>
+              <a:buFont typeface="Arial"/>
+              <a:buChar char="•"/>
+              <a:defRPr sz="2000" kern="1200">
+                <a:solidFill>
+                  <a:schemeClr val="tx1"/>
+                </a:solidFill>
+                <a:latin typeface="+mn-lt"/>
+                <a:ea typeface="+mn-ea"/>
+                <a:cs typeface="+mn-cs"/>
+              </a:defRPr>
+            </a:lvl6pPr>
+            <a:lvl7pPr marL="2971800" indent="-228600" algn="l" defTabSz="457200" rtl="0" eaLnBrk="1" latinLnBrk="0" hangingPunct="1">
+              <a:spcBef>
+                <a:spcPct val="20000"/>
+              </a:spcBef>
+              <a:buFont typeface="Arial"/>
+              <a:buChar char="•"/>
+              <a:defRPr sz="2000" kern="1200">
+                <a:solidFill>
+                  <a:schemeClr val="tx1"/>
+                </a:solidFill>
+                <a:latin typeface="+mn-lt"/>
+                <a:ea typeface="+mn-ea"/>
+                <a:cs typeface="+mn-cs"/>
+              </a:defRPr>
+            </a:lvl7pPr>
+            <a:lvl8pPr marL="3429000" indent="-228600" algn="l" defTabSz="457200" rtl="0" eaLnBrk="1" latinLnBrk="0" hangingPunct="1">
+              <a:spcBef>
+                <a:spcPct val="20000"/>
+              </a:spcBef>
+              <a:buFont typeface="Arial"/>
+              <a:buChar char="•"/>
+              <a:defRPr sz="2000" kern="1200">
+                <a:solidFill>
+                  <a:schemeClr val="tx1"/>
+                </a:solidFill>
+                <a:latin typeface="+mn-lt"/>
+                <a:ea typeface="+mn-ea"/>
+                <a:cs typeface="+mn-cs"/>
+              </a:defRPr>
+            </a:lvl8pPr>
+            <a:lvl9pPr marL="3886200" indent="-228600" algn="l" defTabSz="457200" rtl="0" eaLnBrk="1" latinLnBrk="0" hangingPunct="1">
+              <a:spcBef>
+                <a:spcPct val="20000"/>
+              </a:spcBef>
+              <a:buFont typeface="Arial"/>
+              <a:buChar char="•"/>
+              <a:defRPr sz="2000" kern="1200">
+                <a:solidFill>
+                  <a:schemeClr val="tx1"/>
+                </a:solidFill>
+                <a:latin typeface="+mn-lt"/>
+                <a:ea typeface="+mn-ea"/>
+                <a:cs typeface="+mn-cs"/>
+              </a:defRPr>
+            </a:lvl9pPr>
+          </a:lstStyle>
+          <a:p>
+            <a:r>
               <a:rPr lang="en-US" sz="2100" b="1" dirty="0">
                 <a:latin typeface="Intel Clear Light" panose="020B0404020203020204" pitchFamily="34" charset="0"/>
                 <a:ea typeface="Intel Clear Light" panose="020B0404020203020204" pitchFamily="34" charset="0"/>
@@ -17124,7 +17727,7 @@
             <a:fld id="{EE2556C5-CE8C-6547-B838-EA80C61A4AF7}" type="slidenum">
               <a:rPr lang="en-US" smtClean="0"/>
               <a:pPr/>
-              <a:t>22</a:t>
+              <a:t>23</a:t>
             </a:fld>
             <a:endParaRPr lang="en-US" dirty="0"/>
           </a:p>
@@ -17186,436 +17789,6 @@
 </p:sld>
 </file>
 
-<file path=ppt/slides/slide23.xml><?xml version="1.0" encoding="utf-8"?>
-<p:sld xmlns:a="http://schemas.openxmlformats.org/drawingml/2006/main" xmlns:r="http://schemas.openxmlformats.org/officeDocument/2006/relationships" xmlns:p="http://schemas.openxmlformats.org/presentationml/2006/main">
-  <p:cSld>
-    <p:spTree>
-      <p:nvGrpSpPr>
-        <p:cNvPr id="1" name=""/>
-        <p:cNvGrpSpPr/>
-        <p:nvPr/>
-      </p:nvGrpSpPr>
-      <p:grpSpPr>
-        <a:xfrm>
-          <a:off x="0" y="0"/>
-          <a:ext cx="0" cy="0"/>
-          <a:chOff x="0" y="0"/>
-          <a:chExt cx="0" cy="0"/>
-        </a:xfrm>
-      </p:grpSpPr>
-      <p:sp>
-        <p:nvSpPr>
-          <p:cNvPr id="2" name="Slide Number Placeholder 1"/>
-          <p:cNvSpPr>
-            <a:spLocks noGrp="1"/>
-          </p:cNvSpPr>
-          <p:nvPr>
-            <p:ph type="sldNum" sz="quarter" idx="12"/>
-          </p:nvPr>
-        </p:nvSpPr>
-        <p:spPr/>
-        <p:txBody>
-          <a:bodyPr/>
-          <a:lstStyle/>
-          <a:p>
-            <a:fld id="{EE2556C5-CE8C-6547-B838-EA80C61A4AF7}" type="slidenum">
-              <a:rPr lang="en-US" smtClean="0"/>
-              <a:pPr/>
-              <a:t>23</a:t>
-            </a:fld>
-            <a:endParaRPr lang="en-US" dirty="0"/>
-          </a:p>
-        </p:txBody>
-      </p:sp>
-      <p:sp>
-        <p:nvSpPr>
-          <p:cNvPr id="7" name="Title 3"/>
-          <p:cNvSpPr>
-            <a:spLocks noGrp="1"/>
-          </p:cNvSpPr>
-          <p:nvPr>
-            <p:ph type="title"/>
-          </p:nvPr>
-        </p:nvSpPr>
-        <p:spPr>
-          <a:xfrm>
-            <a:off x="457200" y="196181"/>
-            <a:ext cx="8229600" cy="634184"/>
-          </a:xfrm>
-        </p:spPr>
-        <p:txBody>
-          <a:bodyPr/>
-          <a:lstStyle/>
-          <a:p>
-            <a:r>
-              <a:rPr lang="en-US" dirty="0">
-                <a:latin typeface="Intel Clear Pro Bold" panose="020B0804020202060201" pitchFamily="34" charset="-52"/>
-                <a:ea typeface="Intel Clear Pro Bold" panose="020B0804020202060201" pitchFamily="34" charset="-52"/>
-                <a:cs typeface="Intel Clear Pro Bold" panose="020B0804020202060201" pitchFamily="34" charset="-52"/>
-              </a:rPr>
-              <a:t>Associative containers</a:t>
-            </a:r>
-          </a:p>
-        </p:txBody>
-      </p:sp>
-      <p:sp>
-        <p:nvSpPr>
-          <p:cNvPr id="16" name="Content Placeholder 2">
-            <a:extLst>
-              <a:ext uri="{FF2B5EF4-FFF2-40B4-BE49-F238E27FC236}">
-                <a16:creationId xmlns:a16="http://schemas.microsoft.com/office/drawing/2014/main" id="{4932622C-479E-4CD8-BADB-4D2E0D79A554}"/>
-              </a:ext>
-            </a:extLst>
-          </p:cNvPr>
-          <p:cNvSpPr txBox="1">
-            <a:spLocks/>
-          </p:cNvSpPr>
-          <p:nvPr/>
-        </p:nvSpPr>
-        <p:spPr>
-          <a:xfrm>
-            <a:off x="558800" y="943032"/>
-            <a:ext cx="8342313" cy="3394472"/>
-          </a:xfrm>
-          <a:prstGeom prst="rect">
-            <a:avLst/>
-          </a:prstGeom>
-        </p:spPr>
-        <p:txBody>
-          <a:bodyPr>
-            <a:normAutofit/>
-          </a:bodyPr>
-          <a:lstStyle>
-            <a:lvl1pPr marL="0" indent="0" algn="l" defTabSz="457200" rtl="0" eaLnBrk="1" latinLnBrk="0" hangingPunct="1">
-              <a:spcBef>
-                <a:spcPts val="1200"/>
-              </a:spcBef>
-              <a:spcAft>
-                <a:spcPts val="0"/>
-              </a:spcAft>
-              <a:buFont typeface="Wingdings" panose="05000000000000000000" pitchFamily="2" charset="2"/>
-              <a:buNone/>
-              <a:defRPr sz="1800" b="0" kern="1200">
-                <a:solidFill>
-                  <a:srgbClr val="0071C5"/>
-                </a:solidFill>
-                <a:latin typeface="+mn-lt"/>
-                <a:ea typeface="+mn-ea"/>
-                <a:cs typeface="Intel Clear" panose="020B0604020203020204" pitchFamily="34" charset="0"/>
-              </a:defRPr>
-            </a:lvl1pPr>
-            <a:lvl2pPr marL="225425" indent="-225425" algn="l" defTabSz="457200" rtl="0" eaLnBrk="1" latinLnBrk="0" hangingPunct="1">
-              <a:spcBef>
-                <a:spcPts val="1200"/>
-              </a:spcBef>
-              <a:buFont typeface="Wingdings" charset="2"/>
-              <a:buChar char="§"/>
-              <a:defRPr sz="1600" kern="1200" baseline="0">
-                <a:solidFill>
-                  <a:schemeClr val="tx2"/>
-                </a:solidFill>
-                <a:latin typeface="+mn-lt"/>
-                <a:ea typeface="+mn-ea"/>
-                <a:cs typeface="Intel Clear" panose="020B0604020203020204" pitchFamily="34" charset="0"/>
-              </a:defRPr>
-            </a:lvl2pPr>
-            <a:lvl3pPr marL="571500" indent="-228600" algn="l" defTabSz="457200" rtl="0" eaLnBrk="1" latinLnBrk="0" hangingPunct="1">
-              <a:spcBef>
-                <a:spcPts val="800"/>
-              </a:spcBef>
-              <a:buFont typeface="Intel Clear" panose="020B0604020203020204" pitchFamily="34" charset="0"/>
-              <a:buChar char="–"/>
-              <a:defRPr sz="1600" kern="1200">
-                <a:solidFill>
-                  <a:schemeClr val="tx2"/>
-                </a:solidFill>
-                <a:latin typeface="+mn-lt"/>
-                <a:ea typeface="+mn-ea"/>
-                <a:cs typeface="Intel Clear" panose="020B0604020203020204" pitchFamily="34" charset="0"/>
-              </a:defRPr>
-            </a:lvl3pPr>
-            <a:lvl4pPr marL="969963" indent="-228600" algn="l" defTabSz="457200" rtl="0" eaLnBrk="1" latinLnBrk="0" hangingPunct="1">
-              <a:spcBef>
-                <a:spcPct val="20000"/>
-              </a:spcBef>
-              <a:buFont typeface="Arial"/>
-              <a:buChar char="–"/>
-              <a:defRPr sz="1400" kern="1200">
-                <a:solidFill>
-                  <a:schemeClr val="tx2"/>
-                </a:solidFill>
-                <a:latin typeface="+mn-lt"/>
-                <a:ea typeface="+mn-ea"/>
-                <a:cs typeface="Intel Clear" panose="020B0604020203020204" pitchFamily="34" charset="0"/>
-              </a:defRPr>
-            </a:lvl4pPr>
-            <a:lvl5pPr marL="1319213" indent="-228600" algn="l" defTabSz="457200" rtl="0" eaLnBrk="1" latinLnBrk="0" hangingPunct="1">
-              <a:spcBef>
-                <a:spcPct val="20000"/>
-              </a:spcBef>
-              <a:buFont typeface="Intel Clear" panose="020B0604020203020204" pitchFamily="34" charset="0"/>
-              <a:buChar char="–"/>
-              <a:defRPr sz="1400" kern="1200">
-                <a:solidFill>
-                  <a:schemeClr val="tx2"/>
-                </a:solidFill>
-                <a:latin typeface="+mn-lt"/>
-                <a:ea typeface="+mn-ea"/>
-                <a:cs typeface="Intel Clear" panose="020B0604020203020204" pitchFamily="34" charset="0"/>
-              </a:defRPr>
-            </a:lvl5pPr>
-            <a:lvl6pPr marL="2514600" indent="-228600" algn="l" defTabSz="457200" rtl="0" eaLnBrk="1" latinLnBrk="0" hangingPunct="1">
-              <a:spcBef>
-                <a:spcPct val="20000"/>
-              </a:spcBef>
-              <a:buFont typeface="Arial"/>
-              <a:buChar char="•"/>
-              <a:defRPr sz="2000" kern="1200">
-                <a:solidFill>
-                  <a:schemeClr val="tx1"/>
-                </a:solidFill>
-                <a:latin typeface="+mn-lt"/>
-                <a:ea typeface="+mn-ea"/>
-                <a:cs typeface="+mn-cs"/>
-              </a:defRPr>
-            </a:lvl6pPr>
-            <a:lvl7pPr marL="2971800" indent="-228600" algn="l" defTabSz="457200" rtl="0" eaLnBrk="1" latinLnBrk="0" hangingPunct="1">
-              <a:spcBef>
-                <a:spcPct val="20000"/>
-              </a:spcBef>
-              <a:buFont typeface="Arial"/>
-              <a:buChar char="•"/>
-              <a:defRPr sz="2000" kern="1200">
-                <a:solidFill>
-                  <a:schemeClr val="tx1"/>
-                </a:solidFill>
-                <a:latin typeface="+mn-lt"/>
-                <a:ea typeface="+mn-ea"/>
-                <a:cs typeface="+mn-cs"/>
-              </a:defRPr>
-            </a:lvl7pPr>
-            <a:lvl8pPr marL="3429000" indent="-228600" algn="l" defTabSz="457200" rtl="0" eaLnBrk="1" latinLnBrk="0" hangingPunct="1">
-              <a:spcBef>
-                <a:spcPct val="20000"/>
-              </a:spcBef>
-              <a:buFont typeface="Arial"/>
-              <a:buChar char="•"/>
-              <a:defRPr sz="2000" kern="1200">
-                <a:solidFill>
-                  <a:schemeClr val="tx1"/>
-                </a:solidFill>
-                <a:latin typeface="+mn-lt"/>
-                <a:ea typeface="+mn-ea"/>
-                <a:cs typeface="+mn-cs"/>
-              </a:defRPr>
-            </a:lvl8pPr>
-            <a:lvl9pPr marL="3886200" indent="-228600" algn="l" defTabSz="457200" rtl="0" eaLnBrk="1" latinLnBrk="0" hangingPunct="1">
-              <a:spcBef>
-                <a:spcPct val="20000"/>
-              </a:spcBef>
-              <a:buFont typeface="Arial"/>
-              <a:buChar char="•"/>
-              <a:defRPr sz="2000" kern="1200">
-                <a:solidFill>
-                  <a:schemeClr val="tx1"/>
-                </a:solidFill>
-                <a:latin typeface="+mn-lt"/>
-                <a:ea typeface="+mn-ea"/>
-                <a:cs typeface="+mn-cs"/>
-              </a:defRPr>
-            </a:lvl9pPr>
-          </a:lstStyle>
-          <a:p>
-            <a:r>
-              <a:rPr lang="en-US" sz="2400" dirty="0">
-                <a:solidFill>
-                  <a:srgbClr val="000000"/>
-                </a:solidFill>
-                <a:latin typeface="Consolas, "/>
-              </a:rPr>
-              <a:t>std::</a:t>
-            </a:r>
-            <a:r>
-              <a:rPr lang="en-US" sz="2400" dirty="0" err="1">
-                <a:solidFill>
-                  <a:srgbClr val="000000"/>
-                </a:solidFill>
-                <a:latin typeface="Consolas, "/>
-              </a:rPr>
-              <a:t>unordered_set</a:t>
-            </a:r>
-            <a:r>
-              <a:rPr lang="en-US" sz="2400" dirty="0">
-                <a:solidFill>
-                  <a:srgbClr val="000000"/>
-                </a:solidFill>
-                <a:latin typeface="Consolas, "/>
-              </a:rPr>
-              <a:t>&lt;</a:t>
-            </a:r>
-            <a:r>
-              <a:rPr lang="en-US" sz="2400" dirty="0">
-                <a:solidFill>
-                  <a:srgbClr val="0000FF"/>
-                </a:solidFill>
-                <a:latin typeface="Consolas, "/>
-              </a:rPr>
-              <a:t>int</a:t>
-            </a:r>
-            <a:r>
-              <a:rPr lang="en-US" sz="2400" dirty="0">
-                <a:solidFill>
-                  <a:srgbClr val="000000"/>
-                </a:solidFill>
-                <a:latin typeface="Consolas, "/>
-              </a:rPr>
-              <a:t>&gt; s;</a:t>
-            </a:r>
-          </a:p>
-          <a:p>
-            <a:r>
-              <a:rPr lang="en-US" sz="2400" dirty="0" err="1">
-                <a:solidFill>
-                  <a:srgbClr val="000000"/>
-                </a:solidFill>
-                <a:latin typeface="Consolas, "/>
-              </a:rPr>
-              <a:t>s.insert</a:t>
-            </a:r>
-            <a:r>
-              <a:rPr lang="en-US" sz="2400" dirty="0">
-                <a:solidFill>
-                  <a:srgbClr val="000000"/>
-                </a:solidFill>
-                <a:latin typeface="Consolas, "/>
-              </a:rPr>
-              <a:t>(</a:t>
-            </a:r>
-            <a:r>
-              <a:rPr lang="en-US" sz="2400" dirty="0">
-                <a:solidFill>
-                  <a:srgbClr val="098658"/>
-                </a:solidFill>
-                <a:latin typeface="Consolas, "/>
-              </a:rPr>
-              <a:t>100</a:t>
-            </a:r>
-            <a:r>
-              <a:rPr lang="en-US" sz="2400" dirty="0">
-                <a:solidFill>
-                  <a:srgbClr val="000000"/>
-                </a:solidFill>
-                <a:latin typeface="Consolas, "/>
-              </a:rPr>
-              <a:t>);</a:t>
-            </a:r>
-          </a:p>
-          <a:p>
-            <a:r>
-              <a:rPr lang="en-US" sz="2400" dirty="0" err="1">
-                <a:solidFill>
-                  <a:srgbClr val="000000"/>
-                </a:solidFill>
-                <a:latin typeface="Consolas, "/>
-              </a:rPr>
-              <a:t>s.insert</a:t>
-            </a:r>
-            <a:r>
-              <a:rPr lang="en-US" sz="2400" dirty="0">
-                <a:solidFill>
-                  <a:srgbClr val="000000"/>
-                </a:solidFill>
-                <a:latin typeface="Consolas, "/>
-              </a:rPr>
-              <a:t>(</a:t>
-            </a:r>
-            <a:r>
-              <a:rPr lang="en-US" sz="2400" dirty="0">
-                <a:solidFill>
-                  <a:srgbClr val="098658"/>
-                </a:solidFill>
-                <a:latin typeface="Consolas, "/>
-              </a:rPr>
-              <a:t>10</a:t>
-            </a:r>
-            <a:r>
-              <a:rPr lang="en-US" sz="2400" dirty="0">
-                <a:solidFill>
-                  <a:srgbClr val="000000"/>
-                </a:solidFill>
-                <a:latin typeface="Consolas, "/>
-              </a:rPr>
-              <a:t>);</a:t>
-            </a:r>
-          </a:p>
-          <a:p>
-            <a:r>
-              <a:rPr lang="en-US" sz="2400" dirty="0" err="1">
-                <a:solidFill>
-                  <a:srgbClr val="000000"/>
-                </a:solidFill>
-                <a:latin typeface="Consolas, "/>
-              </a:rPr>
-              <a:t>s.insert</a:t>
-            </a:r>
-            <a:r>
-              <a:rPr lang="en-US" sz="2400" dirty="0">
-                <a:solidFill>
-                  <a:srgbClr val="000000"/>
-                </a:solidFill>
-                <a:latin typeface="Consolas, "/>
-              </a:rPr>
-              <a:t>(</a:t>
-            </a:r>
-            <a:r>
-              <a:rPr lang="en-US" sz="2400" dirty="0">
-                <a:solidFill>
-                  <a:srgbClr val="098658"/>
-                </a:solidFill>
-                <a:latin typeface="Consolas, "/>
-              </a:rPr>
-              <a:t>1</a:t>
-            </a:r>
-            <a:r>
-              <a:rPr lang="en-US" sz="2400" dirty="0">
-                <a:solidFill>
-                  <a:srgbClr val="000000"/>
-                </a:solidFill>
-                <a:latin typeface="Consolas, "/>
-              </a:rPr>
-              <a:t>);</a:t>
-            </a:r>
-          </a:p>
-          <a:p>
-            <a:endParaRPr lang="en-US" i="1" dirty="0">
-              <a:latin typeface="Intel Clear Light" panose="020B0404020203020204" pitchFamily="34" charset="0"/>
-              <a:ea typeface="Intel Clear Light" panose="020B0404020203020204" pitchFamily="34" charset="0"/>
-              <a:cs typeface="Intel Clear Light" panose="020B0404020203020204" pitchFamily="34" charset="0"/>
-            </a:endParaRPr>
-          </a:p>
-        </p:txBody>
-      </p:sp>
-    </p:spTree>
-    <p:extLst>
-      <p:ext uri="{BB962C8B-B14F-4D97-AF65-F5344CB8AC3E}">
-        <p14:creationId xmlns:p14="http://schemas.microsoft.com/office/powerpoint/2010/main" val="2519402377"/>
-      </p:ext>
-    </p:extLst>
-  </p:cSld>
-  <p:clrMapOvr>
-    <a:masterClrMapping/>
-  </p:clrMapOvr>
-  <mc:AlternateContent xmlns:mc="http://schemas.openxmlformats.org/markup-compatibility/2006" xmlns:p14="http://schemas.microsoft.com/office/powerpoint/2010/main">
-    <mc:Choice Requires="p14">
-      <p:transition p14:dur="10"/>
-    </mc:Choice>
-    <mc:Fallback xmlns="">
-      <p:transition/>
-    </mc:Fallback>
-  </mc:AlternateContent>
-</p:sld>
-</file>
-
 <file path=ppt/slides/slide24.xml><?xml version="1.0" encoding="utf-8"?>
 <p:sld xmlns:a="http://schemas.openxmlformats.org/drawingml/2006/main" xmlns:r="http://schemas.openxmlformats.org/officeDocument/2006/relationships" xmlns:p="http://schemas.openxmlformats.org/presentationml/2006/main">
   <p:cSld>
@@ -17669,7 +17842,7 @@
         </p:nvSpPr>
         <p:spPr>
           <a:xfrm>
-            <a:off x="455613" y="308848"/>
+            <a:off x="457200" y="196181"/>
             <a:ext cx="8229600" cy="634184"/>
           </a:xfrm>
         </p:spPr>
@@ -17683,7 +17856,7 @@
                 <a:ea typeface="Intel Clear Pro Bold" panose="020B0804020202060201" pitchFamily="34" charset="-52"/>
                 <a:cs typeface="Intel Clear Pro Bold" panose="020B0804020202060201" pitchFamily="34" charset="-52"/>
               </a:rPr>
-              <a:t>Associative containers- average complexity</a:t>
+              <a:t>Associative containers</a:t>
             </a:r>
           </a:p>
         </p:txBody>
@@ -17856,123 +18029,167 @@
             </a:lvl9pPr>
           </a:lstStyle>
           <a:p>
-            <a:br>
-              <a:rPr lang="en-US" i="1" dirty="0">
-                <a:latin typeface="Intel Clear Light" panose="020B0404020203020204" pitchFamily="34" charset="0"/>
-                <a:ea typeface="Intel Clear Light" panose="020B0404020203020204" pitchFamily="34" charset="0"/>
-                <a:cs typeface="Intel Clear Light" panose="020B0404020203020204" pitchFamily="34" charset="0"/>
-              </a:rPr>
-            </a:br>
-            <a:r>
-              <a:rPr lang="en-US" i="1" dirty="0">
-                <a:latin typeface="Intel Clear Light" panose="020B0404020203020204" pitchFamily="34" charset="0"/>
-                <a:ea typeface="Intel Clear Light" panose="020B0404020203020204" pitchFamily="34" charset="0"/>
-                <a:cs typeface="Intel Clear Light" panose="020B0404020203020204" pitchFamily="34" charset="0"/>
-              </a:rPr>
-              <a:t>							Ordered					Unordered</a:t>
-            </a:r>
-          </a:p>
-          <a:p>
-            <a:r>
-              <a:rPr lang="en-US" i="1" dirty="0">
-                <a:latin typeface="Intel Clear Light" panose="020B0404020203020204" pitchFamily="34" charset="0"/>
-                <a:ea typeface="Intel Clear Light" panose="020B0404020203020204" pitchFamily="34" charset="0"/>
-                <a:cs typeface="Intel Clear Light" panose="020B0404020203020204" pitchFamily="34" charset="0"/>
-              </a:rPr>
-              <a:t>Lookup						</a:t>
-            </a:r>
-            <a:r>
-              <a:rPr lang="en-US" b="1" i="1" dirty="0">
-                <a:latin typeface="Intel Clear Light" panose="020B0404020203020204" pitchFamily="34" charset="0"/>
-                <a:ea typeface="Intel Clear Light" panose="020B0404020203020204" pitchFamily="34" charset="0"/>
-                <a:cs typeface="Intel Clear Light" panose="020B0404020203020204" pitchFamily="34" charset="0"/>
-              </a:rPr>
-              <a:t>O(log(N))			    	     </a:t>
-            </a:r>
-            <a:r>
-              <a:rPr lang="ru-RU" b="1" i="1" dirty="0">
-                <a:latin typeface="Intel Clear Light" panose="020B0404020203020204" pitchFamily="34" charset="0"/>
-                <a:ea typeface="Intel Clear Light" panose="020B0404020203020204" pitchFamily="34" charset="0"/>
-                <a:cs typeface="Intel Clear Light" panose="020B0404020203020204" pitchFamily="34" charset="0"/>
-              </a:rPr>
-              <a:t>        </a:t>
-            </a:r>
-            <a:r>
-              <a:rPr lang="en-US" b="1" i="1" dirty="0">
-                <a:latin typeface="Intel Clear Light" panose="020B0404020203020204" pitchFamily="34" charset="0"/>
-                <a:ea typeface="Intel Clear Light" panose="020B0404020203020204" pitchFamily="34" charset="0"/>
-                <a:cs typeface="Intel Clear Light" panose="020B0404020203020204" pitchFamily="34" charset="0"/>
-              </a:rPr>
-              <a:t>O(1)</a:t>
-            </a:r>
-          </a:p>
-          <a:p>
-            <a:r>
-              <a:rPr lang="en-US" i="1" dirty="0">
-                <a:latin typeface="Intel Clear Light" panose="020B0404020203020204" pitchFamily="34" charset="0"/>
-                <a:ea typeface="Intel Clear Light" panose="020B0404020203020204" pitchFamily="34" charset="0"/>
-                <a:cs typeface="Intel Clear Light" panose="020B0404020203020204" pitchFamily="34" charset="0"/>
-              </a:rPr>
-              <a:t>Insertion						</a:t>
-            </a:r>
-            <a:r>
-              <a:rPr lang="en-US" b="1" i="1" dirty="0">
-                <a:latin typeface="Intel Clear Light" panose="020B0404020203020204" pitchFamily="34" charset="0"/>
-                <a:ea typeface="Intel Clear Light" panose="020B0404020203020204" pitchFamily="34" charset="0"/>
-                <a:cs typeface="Intel Clear Light" panose="020B0404020203020204" pitchFamily="34" charset="0"/>
-              </a:rPr>
-              <a:t>O(log(N))				     </a:t>
-            </a:r>
-            <a:r>
-              <a:rPr lang="ru-RU" b="1" i="1" dirty="0">
-                <a:latin typeface="Intel Clear Light" panose="020B0404020203020204" pitchFamily="34" charset="0"/>
-                <a:ea typeface="Intel Clear Light" panose="020B0404020203020204" pitchFamily="34" charset="0"/>
-                <a:cs typeface="Intel Clear Light" panose="020B0404020203020204" pitchFamily="34" charset="0"/>
-              </a:rPr>
-              <a:t>        </a:t>
-            </a:r>
-            <a:r>
-              <a:rPr lang="en-US" b="1" i="1" dirty="0">
-                <a:latin typeface="Intel Clear Light" panose="020B0404020203020204" pitchFamily="34" charset="0"/>
-                <a:ea typeface="Intel Clear Light" panose="020B0404020203020204" pitchFamily="34" charset="0"/>
-                <a:cs typeface="Intel Clear Light" panose="020B0404020203020204" pitchFamily="34" charset="0"/>
-              </a:rPr>
-              <a:t>O(1)</a:t>
-            </a:r>
-          </a:p>
-          <a:p>
-            <a:r>
-              <a:rPr lang="en-US" i="1" dirty="0">
-                <a:latin typeface="Intel Clear Light" panose="020B0404020203020204" pitchFamily="34" charset="0"/>
-                <a:ea typeface="Intel Clear Light" panose="020B0404020203020204" pitchFamily="34" charset="0"/>
-                <a:cs typeface="Intel Clear Light" panose="020B0404020203020204" pitchFamily="34" charset="0"/>
-              </a:rPr>
-              <a:t>Erase						</a:t>
-            </a:r>
-            <a:r>
-              <a:rPr lang="en-US" b="1" i="1" dirty="0">
-                <a:latin typeface="Intel Clear Light" panose="020B0404020203020204" pitchFamily="34" charset="0"/>
-                <a:ea typeface="Intel Clear Light" panose="020B0404020203020204" pitchFamily="34" charset="0"/>
-                <a:cs typeface="Intel Clear Light" panose="020B0404020203020204" pitchFamily="34" charset="0"/>
-              </a:rPr>
-              <a:t>O(log(N))				     </a:t>
-            </a:r>
-            <a:r>
-              <a:rPr lang="ru-RU" b="1" i="1" dirty="0">
-                <a:latin typeface="Intel Clear Light" panose="020B0404020203020204" pitchFamily="34" charset="0"/>
-                <a:ea typeface="Intel Clear Light" panose="020B0404020203020204" pitchFamily="34" charset="0"/>
-                <a:cs typeface="Intel Clear Light" panose="020B0404020203020204" pitchFamily="34" charset="0"/>
-              </a:rPr>
-              <a:t>        </a:t>
-            </a:r>
-            <a:r>
-              <a:rPr lang="en-US" b="1" i="1" dirty="0">
-                <a:latin typeface="Intel Clear Light" panose="020B0404020203020204" pitchFamily="34" charset="0"/>
-                <a:ea typeface="Intel Clear Light" panose="020B0404020203020204" pitchFamily="34" charset="0"/>
-                <a:cs typeface="Intel Clear Light" panose="020B0404020203020204" pitchFamily="34" charset="0"/>
-              </a:rPr>
-              <a:t>O(1)	     </a:t>
-            </a:r>
+            <a:r>
+              <a:rPr lang="en-US" sz="2400" dirty="0">
+                <a:solidFill>
+                  <a:srgbClr val="000000"/>
+                </a:solidFill>
+                <a:latin typeface="Consolas, "/>
+              </a:rPr>
+              <a:t>std::</a:t>
+            </a:r>
+            <a:r>
+              <a:rPr lang="en-US" sz="2400" dirty="0" err="1">
+                <a:solidFill>
+                  <a:srgbClr val="000000"/>
+                </a:solidFill>
+                <a:latin typeface="Consolas, "/>
+              </a:rPr>
+              <a:t>unordered_set</a:t>
+            </a:r>
+            <a:r>
+              <a:rPr lang="en-US" sz="2400" dirty="0">
+                <a:solidFill>
+                  <a:srgbClr val="000000"/>
+                </a:solidFill>
+                <a:latin typeface="Consolas, "/>
+              </a:rPr>
+              <a:t>&lt;</a:t>
+            </a:r>
+            <a:r>
+              <a:rPr lang="en-US" sz="2400" dirty="0">
+                <a:solidFill>
+                  <a:srgbClr val="0000FF"/>
+                </a:solidFill>
+                <a:latin typeface="Consolas, "/>
+              </a:rPr>
+              <a:t>int</a:t>
+            </a:r>
+            <a:r>
+              <a:rPr lang="en-US" sz="2400" dirty="0">
+                <a:solidFill>
+                  <a:srgbClr val="000000"/>
+                </a:solidFill>
+                <a:latin typeface="Consolas, "/>
+              </a:rPr>
+              <a:t>&gt; s;</a:t>
+            </a:r>
+          </a:p>
+          <a:p>
+            <a:r>
+              <a:rPr lang="en-US" sz="2400" dirty="0" err="1">
+                <a:solidFill>
+                  <a:srgbClr val="000000"/>
+                </a:solidFill>
+                <a:latin typeface="Consolas, "/>
+              </a:rPr>
+              <a:t>s.insert</a:t>
+            </a:r>
+            <a:r>
+              <a:rPr lang="en-US" sz="2400" dirty="0">
+                <a:solidFill>
+                  <a:srgbClr val="000000"/>
+                </a:solidFill>
+                <a:latin typeface="Consolas, "/>
+              </a:rPr>
+              <a:t>(</a:t>
+            </a:r>
+            <a:r>
+              <a:rPr lang="en-US" sz="2400" dirty="0">
+                <a:solidFill>
+                  <a:srgbClr val="098658"/>
+                </a:solidFill>
+                <a:latin typeface="Consolas, "/>
+              </a:rPr>
+              <a:t>100</a:t>
+            </a:r>
+            <a:r>
+              <a:rPr lang="en-US" sz="2400" dirty="0">
+                <a:solidFill>
+                  <a:srgbClr val="000000"/>
+                </a:solidFill>
+                <a:latin typeface="Consolas, "/>
+              </a:rPr>
+              <a:t>);</a:t>
+            </a:r>
+          </a:p>
+          <a:p>
+            <a:r>
+              <a:rPr lang="en-US" sz="2400" dirty="0" err="1">
+                <a:solidFill>
+                  <a:srgbClr val="000000"/>
+                </a:solidFill>
+                <a:latin typeface="Consolas, "/>
+              </a:rPr>
+              <a:t>s.insert</a:t>
+            </a:r>
+            <a:r>
+              <a:rPr lang="en-US" sz="2400" dirty="0">
+                <a:solidFill>
+                  <a:srgbClr val="000000"/>
+                </a:solidFill>
+                <a:latin typeface="Consolas, "/>
+              </a:rPr>
+              <a:t>(</a:t>
+            </a:r>
+            <a:r>
+              <a:rPr lang="en-US" sz="2400" dirty="0">
+                <a:solidFill>
+                  <a:srgbClr val="098658"/>
+                </a:solidFill>
+                <a:latin typeface="Consolas, "/>
+              </a:rPr>
+              <a:t>10</a:t>
+            </a:r>
+            <a:r>
+              <a:rPr lang="en-US" sz="2400" dirty="0">
+                <a:solidFill>
+                  <a:srgbClr val="000000"/>
+                </a:solidFill>
+                <a:latin typeface="Consolas, "/>
+              </a:rPr>
+              <a:t>);</a:t>
+            </a:r>
+          </a:p>
+          <a:p>
+            <a:r>
+              <a:rPr lang="en-US" sz="2400" dirty="0" err="1">
+                <a:solidFill>
+                  <a:srgbClr val="000000"/>
+                </a:solidFill>
+                <a:latin typeface="Consolas, "/>
+              </a:rPr>
+              <a:t>s.insert</a:t>
+            </a:r>
+            <a:r>
+              <a:rPr lang="en-US" sz="2400" dirty="0">
+                <a:solidFill>
+                  <a:srgbClr val="000000"/>
+                </a:solidFill>
+                <a:latin typeface="Consolas, "/>
+              </a:rPr>
+              <a:t>(</a:t>
+            </a:r>
+            <a:r>
+              <a:rPr lang="en-US" sz="2400" dirty="0">
+                <a:solidFill>
+                  <a:srgbClr val="098658"/>
+                </a:solidFill>
+                <a:latin typeface="Consolas, "/>
+              </a:rPr>
+              <a:t>1</a:t>
+            </a:r>
+            <a:r>
+              <a:rPr lang="en-US" sz="2400" dirty="0">
+                <a:solidFill>
+                  <a:srgbClr val="000000"/>
+                </a:solidFill>
+                <a:latin typeface="Consolas, "/>
+              </a:rPr>
+              <a:t>);</a:t>
+            </a:r>
+          </a:p>
+          <a:p>
             <a:endParaRPr lang="en-US" i="1" dirty="0">
               <a:latin typeface="Intel Clear Light" panose="020B0404020203020204" pitchFamily="34" charset="0"/>
               <a:ea typeface="Intel Clear Light" panose="020B0404020203020204" pitchFamily="34" charset="0"/>
@@ -17984,7 +18201,7 @@
     </p:spTree>
     <p:extLst>
       <p:ext uri="{BB962C8B-B14F-4D97-AF65-F5344CB8AC3E}">
-        <p14:creationId xmlns:p14="http://schemas.microsoft.com/office/powerpoint/2010/main" val="1248363622"/>
+        <p14:creationId xmlns:p14="http://schemas.microsoft.com/office/powerpoint/2010/main" val="2519402377"/>
       </p:ext>
     </p:extLst>
   </p:cSld>
@@ -18069,7 +18286,7 @@
                 <a:ea typeface="Intel Clear Pro Bold" panose="020B0804020202060201" pitchFamily="34" charset="-52"/>
                 <a:cs typeface="Intel Clear Pro Bold" panose="020B0804020202060201" pitchFamily="34" charset="-52"/>
               </a:rPr>
-              <a:t>Container adaptors</a:t>
+              <a:t>Associative containers- average complexity</a:t>
             </a:r>
           </a:p>
         </p:txBody>
@@ -18242,87 +18459,135 @@
             </a:lvl9pPr>
           </a:lstStyle>
           <a:p>
-            <a:r>
-              <a:rPr lang="en-US" dirty="0">
-                <a:solidFill>
-                  <a:srgbClr val="0000FF"/>
-                </a:solidFill>
-                <a:latin typeface="Consolas, "/>
-              </a:rPr>
-              <a:t>template</a:t>
-            </a:r>
-            <a:r>
-              <a:rPr lang="en-US" dirty="0">
-                <a:solidFill>
-                  <a:srgbClr val="000000"/>
-                </a:solidFill>
-                <a:latin typeface="Consolas, "/>
-              </a:rPr>
-              <a:t> &lt;</a:t>
-            </a:r>
-            <a:r>
-              <a:rPr lang="en-US" dirty="0" err="1">
-                <a:solidFill>
-                  <a:srgbClr val="0000FF"/>
-                </a:solidFill>
-                <a:latin typeface="Consolas, "/>
-              </a:rPr>
-              <a:t>typename</a:t>
-            </a:r>
-            <a:r>
-              <a:rPr lang="en-US" dirty="0">
-                <a:solidFill>
-                  <a:srgbClr val="000000"/>
-                </a:solidFill>
-                <a:latin typeface="Consolas, "/>
-              </a:rPr>
-              <a:t> T, </a:t>
-            </a:r>
-            <a:r>
-              <a:rPr lang="en-US" dirty="0" err="1">
-                <a:solidFill>
-                  <a:srgbClr val="0000FF"/>
-                </a:solidFill>
-                <a:latin typeface="Consolas, "/>
-              </a:rPr>
-              <a:t>typename</a:t>
-            </a:r>
-            <a:r>
-              <a:rPr lang="en-US" dirty="0">
-                <a:solidFill>
-                  <a:srgbClr val="000000"/>
-                </a:solidFill>
-                <a:latin typeface="Consolas, "/>
-              </a:rPr>
-              <a:t> Container = std::deque&lt;T&gt;&gt;</a:t>
-            </a:r>
-          </a:p>
-          <a:p>
-            <a:r>
-              <a:rPr lang="en-US" dirty="0">
-                <a:solidFill>
-                  <a:srgbClr val="0000FF"/>
-                </a:solidFill>
-                <a:latin typeface="Consolas, "/>
-              </a:rPr>
-              <a:t>class</a:t>
-            </a:r>
-            <a:r>
-              <a:rPr lang="en-US" dirty="0">
-                <a:solidFill>
-                  <a:srgbClr val="000000"/>
-                </a:solidFill>
-                <a:latin typeface="Consolas, "/>
-              </a:rPr>
-              <a:t> stack;</a:t>
-            </a:r>
+            <a:br>
+              <a:rPr lang="en-US" i="1" dirty="0">
+                <a:latin typeface="Intel Clear Light" panose="020B0404020203020204" pitchFamily="34" charset="0"/>
+                <a:ea typeface="Intel Clear Light" panose="020B0404020203020204" pitchFamily="34" charset="0"/>
+                <a:cs typeface="Intel Clear Light" panose="020B0404020203020204" pitchFamily="34" charset="0"/>
+              </a:rPr>
+            </a:br>
+            <a:r>
+              <a:rPr lang="en-US" i="1" dirty="0">
+                <a:latin typeface="Intel Clear Light" panose="020B0404020203020204" pitchFamily="34" charset="0"/>
+                <a:ea typeface="Intel Clear Light" panose="020B0404020203020204" pitchFamily="34" charset="0"/>
+                <a:cs typeface="Intel Clear Light" panose="020B0404020203020204" pitchFamily="34" charset="0"/>
+              </a:rPr>
+              <a:t>							Ordered					Unordered</a:t>
+            </a:r>
+          </a:p>
+          <a:p>
+            <a:r>
+              <a:rPr lang="en-US" i="1" dirty="0">
+                <a:latin typeface="Intel Clear Light" panose="020B0404020203020204" pitchFamily="34" charset="0"/>
+                <a:ea typeface="Intel Clear Light" panose="020B0404020203020204" pitchFamily="34" charset="0"/>
+                <a:cs typeface="Intel Clear Light" panose="020B0404020203020204" pitchFamily="34" charset="0"/>
+              </a:rPr>
+              <a:t>Lookup						</a:t>
+            </a:r>
+            <a:r>
+              <a:rPr lang="en-US" b="1" i="1" dirty="0">
+                <a:latin typeface="Intel Clear Light" panose="020B0404020203020204" pitchFamily="34" charset="0"/>
+                <a:ea typeface="Intel Clear Light" panose="020B0404020203020204" pitchFamily="34" charset="0"/>
+                <a:cs typeface="Intel Clear Light" panose="020B0404020203020204" pitchFamily="34" charset="0"/>
+              </a:rPr>
+              <a:t>O(log(N))			    	     </a:t>
+            </a:r>
+            <a:r>
+              <a:rPr lang="ru-RU" b="1" i="1" dirty="0">
+                <a:latin typeface="Intel Clear Light" panose="020B0404020203020204" pitchFamily="34" charset="0"/>
+                <a:ea typeface="Intel Clear Light" panose="020B0404020203020204" pitchFamily="34" charset="0"/>
+                <a:cs typeface="Intel Clear Light" panose="020B0404020203020204" pitchFamily="34" charset="0"/>
+              </a:rPr>
+              <a:t>        </a:t>
+            </a:r>
+            <a:r>
+              <a:rPr lang="en-US" b="1" i="1" dirty="0">
+                <a:latin typeface="Intel Clear Light" panose="020B0404020203020204" pitchFamily="34" charset="0"/>
+                <a:ea typeface="Intel Clear Light" panose="020B0404020203020204" pitchFamily="34" charset="0"/>
+                <a:cs typeface="Intel Clear Light" panose="020B0404020203020204" pitchFamily="34" charset="0"/>
+              </a:rPr>
+              <a:t>O(1)</a:t>
+            </a:r>
+          </a:p>
+          <a:p>
+            <a:r>
+              <a:rPr lang="en-US" i="1" dirty="0">
+                <a:latin typeface="Intel Clear Light" panose="020B0404020203020204" pitchFamily="34" charset="0"/>
+                <a:ea typeface="Intel Clear Light" panose="020B0404020203020204" pitchFamily="34" charset="0"/>
+                <a:cs typeface="Intel Clear Light" panose="020B0404020203020204" pitchFamily="34" charset="0"/>
+              </a:rPr>
+              <a:t>Insertion						</a:t>
+            </a:r>
+            <a:r>
+              <a:rPr lang="en-US" b="1" i="1" dirty="0">
+                <a:latin typeface="Intel Clear Light" panose="020B0404020203020204" pitchFamily="34" charset="0"/>
+                <a:ea typeface="Intel Clear Light" panose="020B0404020203020204" pitchFamily="34" charset="0"/>
+                <a:cs typeface="Intel Clear Light" panose="020B0404020203020204" pitchFamily="34" charset="0"/>
+              </a:rPr>
+              <a:t>O(log(N))				     </a:t>
+            </a:r>
+            <a:r>
+              <a:rPr lang="ru-RU" b="1" i="1" dirty="0">
+                <a:latin typeface="Intel Clear Light" panose="020B0404020203020204" pitchFamily="34" charset="0"/>
+                <a:ea typeface="Intel Clear Light" panose="020B0404020203020204" pitchFamily="34" charset="0"/>
+                <a:cs typeface="Intel Clear Light" panose="020B0404020203020204" pitchFamily="34" charset="0"/>
+              </a:rPr>
+              <a:t>        </a:t>
+            </a:r>
+            <a:r>
+              <a:rPr lang="en-US" b="1" i="1" dirty="0">
+                <a:latin typeface="Intel Clear Light" panose="020B0404020203020204" pitchFamily="34" charset="0"/>
+                <a:ea typeface="Intel Clear Light" panose="020B0404020203020204" pitchFamily="34" charset="0"/>
+                <a:cs typeface="Intel Clear Light" panose="020B0404020203020204" pitchFamily="34" charset="0"/>
+              </a:rPr>
+              <a:t>O(1)</a:t>
+            </a:r>
+          </a:p>
+          <a:p>
+            <a:r>
+              <a:rPr lang="en-US" i="1" dirty="0">
+                <a:latin typeface="Intel Clear Light" panose="020B0404020203020204" pitchFamily="34" charset="0"/>
+                <a:ea typeface="Intel Clear Light" panose="020B0404020203020204" pitchFamily="34" charset="0"/>
+                <a:cs typeface="Intel Clear Light" panose="020B0404020203020204" pitchFamily="34" charset="0"/>
+              </a:rPr>
+              <a:t>Erase						</a:t>
+            </a:r>
+            <a:r>
+              <a:rPr lang="en-US" b="1" i="1" dirty="0">
+                <a:latin typeface="Intel Clear Light" panose="020B0404020203020204" pitchFamily="34" charset="0"/>
+                <a:ea typeface="Intel Clear Light" panose="020B0404020203020204" pitchFamily="34" charset="0"/>
+                <a:cs typeface="Intel Clear Light" panose="020B0404020203020204" pitchFamily="34" charset="0"/>
+              </a:rPr>
+              <a:t>O(log(N))				     </a:t>
+            </a:r>
+            <a:r>
+              <a:rPr lang="ru-RU" b="1" i="1" dirty="0">
+                <a:latin typeface="Intel Clear Light" panose="020B0404020203020204" pitchFamily="34" charset="0"/>
+                <a:ea typeface="Intel Clear Light" panose="020B0404020203020204" pitchFamily="34" charset="0"/>
+                <a:cs typeface="Intel Clear Light" panose="020B0404020203020204" pitchFamily="34" charset="0"/>
+              </a:rPr>
+              <a:t>        </a:t>
+            </a:r>
+            <a:r>
+              <a:rPr lang="en-US" b="1" i="1" dirty="0">
+                <a:latin typeface="Intel Clear Light" panose="020B0404020203020204" pitchFamily="34" charset="0"/>
+                <a:ea typeface="Intel Clear Light" panose="020B0404020203020204" pitchFamily="34" charset="0"/>
+                <a:cs typeface="Intel Clear Light" panose="020B0404020203020204" pitchFamily="34" charset="0"/>
+              </a:rPr>
+              <a:t>O(1)	     </a:t>
+            </a:r>
+            <a:endParaRPr lang="en-US" i="1" dirty="0">
+              <a:latin typeface="Intel Clear Light" panose="020B0404020203020204" pitchFamily="34" charset="0"/>
+              <a:ea typeface="Intel Clear Light" panose="020B0404020203020204" pitchFamily="34" charset="0"/>
+              <a:cs typeface="Intel Clear Light" panose="020B0404020203020204" pitchFamily="34" charset="0"/>
+            </a:endParaRPr>
           </a:p>
         </p:txBody>
       </p:sp>
     </p:spTree>
     <p:extLst>
       <p:ext uri="{BB962C8B-B14F-4D97-AF65-F5344CB8AC3E}">
-        <p14:creationId xmlns:p14="http://schemas.microsoft.com/office/powerpoint/2010/main" val="3802973703"/>
+        <p14:creationId xmlns:p14="http://schemas.microsoft.com/office/powerpoint/2010/main" val="1248363622"/>
       </p:ext>
     </p:extLst>
   </p:cSld>
@@ -18581,77 +18846,86 @@
           </a:lstStyle>
           <a:p>
             <a:r>
-              <a:rPr lang="en-US" sz="2000" i="1" dirty="0">
-                <a:latin typeface="Intel Clear Light" panose="020B0404020203020204" pitchFamily="34" charset="0"/>
-                <a:ea typeface="Intel Clear Light" panose="020B0404020203020204" pitchFamily="34" charset="0"/>
-                <a:cs typeface="Intel Clear Light" panose="020B0404020203020204" pitchFamily="34" charset="0"/>
-              </a:rPr>
-              <a:t>std::stack;</a:t>
-            </a:r>
-          </a:p>
-          <a:p>
-            <a:r>
-              <a:rPr lang="en-US" sz="2000" i="1" dirty="0">
-                <a:latin typeface="Intel Clear Light" panose="020B0404020203020204" pitchFamily="34" charset="0"/>
-                <a:ea typeface="Intel Clear Light" panose="020B0404020203020204" pitchFamily="34" charset="0"/>
-                <a:cs typeface="Intel Clear Light" panose="020B0404020203020204" pitchFamily="34" charset="0"/>
-              </a:rPr>
-              <a:t>std::queue;</a:t>
-            </a:r>
-          </a:p>
-          <a:p>
-            <a:r>
-              <a:rPr lang="en-US" sz="2000" i="1" dirty="0">
-                <a:latin typeface="Intel Clear Light" panose="020B0404020203020204" pitchFamily="34" charset="0"/>
-                <a:ea typeface="Intel Clear Light" panose="020B0404020203020204" pitchFamily="34" charset="0"/>
-                <a:cs typeface="Intel Clear Light" panose="020B0404020203020204" pitchFamily="34" charset="0"/>
-              </a:rPr>
-              <a:t>std::</a:t>
-            </a:r>
-            <a:r>
-              <a:rPr lang="en-US" sz="2000" i="1" dirty="0" err="1">
-                <a:latin typeface="Intel Clear Light" panose="020B0404020203020204" pitchFamily="34" charset="0"/>
-                <a:ea typeface="Intel Clear Light" panose="020B0404020203020204" pitchFamily="34" charset="0"/>
-                <a:cs typeface="Intel Clear Light" panose="020B0404020203020204" pitchFamily="34" charset="0"/>
-              </a:rPr>
-              <a:t>priority_queue</a:t>
-            </a:r>
-            <a:r>
-              <a:rPr lang="en-US" sz="2000" i="1" dirty="0">
-                <a:latin typeface="Intel Clear Light" panose="020B0404020203020204" pitchFamily="34" charset="0"/>
-                <a:ea typeface="Intel Clear Light" panose="020B0404020203020204" pitchFamily="34" charset="0"/>
-                <a:cs typeface="Intel Clear Light" panose="020B0404020203020204" pitchFamily="34" charset="0"/>
-              </a:rPr>
-              <a:t>;</a:t>
-            </a:r>
-            <a:r>
-              <a:rPr lang="en-US" sz="2000" b="1" i="1" dirty="0">
-                <a:latin typeface="Intel Clear Light" panose="020B0404020203020204" pitchFamily="34" charset="0"/>
-                <a:ea typeface="Intel Clear Light" panose="020B0404020203020204" pitchFamily="34" charset="0"/>
-                <a:cs typeface="Intel Clear Light" panose="020B0404020203020204" pitchFamily="34" charset="0"/>
-              </a:rPr>
-              <a:t>	</a:t>
-            </a:r>
-            <a:r>
-              <a:rPr lang="en-US" b="1" i="1" dirty="0">
-                <a:latin typeface="Intel Clear Light" panose="020B0404020203020204" pitchFamily="34" charset="0"/>
-                <a:ea typeface="Intel Clear Light" panose="020B0404020203020204" pitchFamily="34" charset="0"/>
-                <a:cs typeface="Intel Clear Light" panose="020B0404020203020204" pitchFamily="34" charset="0"/>
-              </a:rPr>
-              <a:t>		     </a:t>
-            </a:r>
-            <a:endParaRPr lang="en-US" i="1" dirty="0">
-              <a:latin typeface="Intel Clear Light" panose="020B0404020203020204" pitchFamily="34" charset="0"/>
-              <a:ea typeface="Intel Clear Light" panose="020B0404020203020204" pitchFamily="34" charset="0"/>
-              <a:cs typeface="Intel Clear Light" panose="020B0404020203020204" pitchFamily="34" charset="0"/>
-            </a:endParaRPr>
+              <a:rPr lang="en-US" dirty="0">
+                <a:solidFill>
+                  <a:srgbClr val="0000FF"/>
+                </a:solidFill>
+                <a:latin typeface="Consolas, "/>
+              </a:rPr>
+              <a:t>template</a:t>
+            </a:r>
+            <a:r>
+              <a:rPr lang="en-US" dirty="0">
+                <a:solidFill>
+                  <a:srgbClr val="000000"/>
+                </a:solidFill>
+                <a:latin typeface="Consolas, "/>
+              </a:rPr>
+              <a:t> &lt;</a:t>
+            </a:r>
+            <a:r>
+              <a:rPr lang="en-US" dirty="0" err="1">
+                <a:solidFill>
+                  <a:srgbClr val="0000FF"/>
+                </a:solidFill>
+                <a:latin typeface="Consolas, "/>
+              </a:rPr>
+              <a:t>typename</a:t>
+            </a:r>
+            <a:r>
+              <a:rPr lang="en-US" dirty="0">
+                <a:solidFill>
+                  <a:srgbClr val="000000"/>
+                </a:solidFill>
+                <a:latin typeface="Consolas, "/>
+              </a:rPr>
+              <a:t> T, </a:t>
+            </a:r>
+            <a:r>
+              <a:rPr lang="en-US" dirty="0" err="1">
+                <a:solidFill>
+                  <a:srgbClr val="0000FF"/>
+                </a:solidFill>
+                <a:latin typeface="Consolas, "/>
+              </a:rPr>
+              <a:t>typename</a:t>
+            </a:r>
+            <a:r>
+              <a:rPr lang="en-US" dirty="0">
+                <a:solidFill>
+                  <a:srgbClr val="000000"/>
+                </a:solidFill>
+                <a:latin typeface="Consolas, "/>
+              </a:rPr>
+              <a:t> Container = std::deque&lt;T&gt;&gt;</a:t>
+            </a:r>
+          </a:p>
+          <a:p>
+            <a:r>
+              <a:rPr lang="en-US" dirty="0">
+                <a:solidFill>
+                  <a:srgbClr val="0000FF"/>
+                </a:solidFill>
+                <a:latin typeface="Consolas, "/>
+              </a:rPr>
+              <a:t>class</a:t>
+            </a:r>
+            <a:r>
+              <a:rPr lang="en-US" dirty="0">
+                <a:solidFill>
+                  <a:srgbClr val="000000"/>
+                </a:solidFill>
+                <a:latin typeface="Consolas, "/>
+              </a:rPr>
+              <a:t> stack;</a:t>
+            </a:r>
           </a:p>
         </p:txBody>
       </p:sp>
     </p:spTree>
     <p:extLst>
       <p:ext uri="{BB962C8B-B14F-4D97-AF65-F5344CB8AC3E}">
-        <p14:creationId xmlns:p14="http://schemas.microsoft.com/office/powerpoint/2010/main" val="3848533270"/>
+        <p14:creationId xmlns:p14="http://schemas.microsoft.com/office/powerpoint/2010/main" val="3802973703"/>
       </p:ext>
     </p:extLst>
   </p:cSld>
@@ -18705,6 +18979,335 @@
               <a:rPr lang="en-US" smtClean="0"/>
               <a:pPr/>
               <a:t>27</a:t>
+            </a:fld>
+            <a:endParaRPr lang="en-US" dirty="0"/>
+          </a:p>
+        </p:txBody>
+      </p:sp>
+      <p:sp>
+        <p:nvSpPr>
+          <p:cNvPr id="7" name="Title 3"/>
+          <p:cNvSpPr>
+            <a:spLocks noGrp="1"/>
+          </p:cNvSpPr>
+          <p:nvPr>
+            <p:ph type="title"/>
+          </p:nvPr>
+        </p:nvSpPr>
+        <p:spPr>
+          <a:xfrm>
+            <a:off x="455613" y="308848"/>
+            <a:ext cx="8229600" cy="634184"/>
+          </a:xfrm>
+        </p:spPr>
+        <p:txBody>
+          <a:bodyPr/>
+          <a:lstStyle/>
+          <a:p>
+            <a:r>
+              <a:rPr lang="en-US" dirty="0">
+                <a:latin typeface="Intel Clear Pro Bold" panose="020B0804020202060201" pitchFamily="34" charset="-52"/>
+                <a:ea typeface="Intel Clear Pro Bold" panose="020B0804020202060201" pitchFamily="34" charset="-52"/>
+                <a:cs typeface="Intel Clear Pro Bold" panose="020B0804020202060201" pitchFamily="34" charset="-52"/>
+              </a:rPr>
+              <a:t>Container adaptors</a:t>
+            </a:r>
+          </a:p>
+        </p:txBody>
+      </p:sp>
+      <p:sp>
+        <p:nvSpPr>
+          <p:cNvPr id="16" name="Content Placeholder 2">
+            <a:extLst>
+              <a:ext uri="{FF2B5EF4-FFF2-40B4-BE49-F238E27FC236}">
+                <a16:creationId xmlns:a16="http://schemas.microsoft.com/office/drawing/2014/main" id="{4932622C-479E-4CD8-BADB-4D2E0D79A554}"/>
+              </a:ext>
+            </a:extLst>
+          </p:cNvPr>
+          <p:cNvSpPr txBox="1">
+            <a:spLocks/>
+          </p:cNvSpPr>
+          <p:nvPr/>
+        </p:nvSpPr>
+        <p:spPr>
+          <a:xfrm>
+            <a:off x="558800" y="943032"/>
+            <a:ext cx="8342313" cy="3394472"/>
+          </a:xfrm>
+          <a:prstGeom prst="rect">
+            <a:avLst/>
+          </a:prstGeom>
+        </p:spPr>
+        <p:txBody>
+          <a:bodyPr>
+            <a:normAutofit/>
+          </a:bodyPr>
+          <a:lstStyle>
+            <a:lvl1pPr marL="0" indent="0" algn="l" defTabSz="457200" rtl="0" eaLnBrk="1" latinLnBrk="0" hangingPunct="1">
+              <a:spcBef>
+                <a:spcPts val="1200"/>
+              </a:spcBef>
+              <a:spcAft>
+                <a:spcPts val="0"/>
+              </a:spcAft>
+              <a:buFont typeface="Wingdings" panose="05000000000000000000" pitchFamily="2" charset="2"/>
+              <a:buNone/>
+              <a:defRPr sz="1800" b="0" kern="1200">
+                <a:solidFill>
+                  <a:srgbClr val="0071C5"/>
+                </a:solidFill>
+                <a:latin typeface="+mn-lt"/>
+                <a:ea typeface="+mn-ea"/>
+                <a:cs typeface="Intel Clear" panose="020B0604020203020204" pitchFamily="34" charset="0"/>
+              </a:defRPr>
+            </a:lvl1pPr>
+            <a:lvl2pPr marL="225425" indent="-225425" algn="l" defTabSz="457200" rtl="0" eaLnBrk="1" latinLnBrk="0" hangingPunct="1">
+              <a:spcBef>
+                <a:spcPts val="1200"/>
+              </a:spcBef>
+              <a:buFont typeface="Wingdings" charset="2"/>
+              <a:buChar char="§"/>
+              <a:defRPr sz="1600" kern="1200" baseline="0">
+                <a:solidFill>
+                  <a:schemeClr val="tx2"/>
+                </a:solidFill>
+                <a:latin typeface="+mn-lt"/>
+                <a:ea typeface="+mn-ea"/>
+                <a:cs typeface="Intel Clear" panose="020B0604020203020204" pitchFamily="34" charset="0"/>
+              </a:defRPr>
+            </a:lvl2pPr>
+            <a:lvl3pPr marL="571500" indent="-228600" algn="l" defTabSz="457200" rtl="0" eaLnBrk="1" latinLnBrk="0" hangingPunct="1">
+              <a:spcBef>
+                <a:spcPts val="800"/>
+              </a:spcBef>
+              <a:buFont typeface="Intel Clear" panose="020B0604020203020204" pitchFamily="34" charset="0"/>
+              <a:buChar char="–"/>
+              <a:defRPr sz="1600" kern="1200">
+                <a:solidFill>
+                  <a:schemeClr val="tx2"/>
+                </a:solidFill>
+                <a:latin typeface="+mn-lt"/>
+                <a:ea typeface="+mn-ea"/>
+                <a:cs typeface="Intel Clear" panose="020B0604020203020204" pitchFamily="34" charset="0"/>
+              </a:defRPr>
+            </a:lvl3pPr>
+            <a:lvl4pPr marL="969963" indent="-228600" algn="l" defTabSz="457200" rtl="0" eaLnBrk="1" latinLnBrk="0" hangingPunct="1">
+              <a:spcBef>
+                <a:spcPct val="20000"/>
+              </a:spcBef>
+              <a:buFont typeface="Arial"/>
+              <a:buChar char="–"/>
+              <a:defRPr sz="1400" kern="1200">
+                <a:solidFill>
+                  <a:schemeClr val="tx2"/>
+                </a:solidFill>
+                <a:latin typeface="+mn-lt"/>
+                <a:ea typeface="+mn-ea"/>
+                <a:cs typeface="Intel Clear" panose="020B0604020203020204" pitchFamily="34" charset="0"/>
+              </a:defRPr>
+            </a:lvl4pPr>
+            <a:lvl5pPr marL="1319213" indent="-228600" algn="l" defTabSz="457200" rtl="0" eaLnBrk="1" latinLnBrk="0" hangingPunct="1">
+              <a:spcBef>
+                <a:spcPct val="20000"/>
+              </a:spcBef>
+              <a:buFont typeface="Intel Clear" panose="020B0604020203020204" pitchFamily="34" charset="0"/>
+              <a:buChar char="–"/>
+              <a:defRPr sz="1400" kern="1200">
+                <a:solidFill>
+                  <a:schemeClr val="tx2"/>
+                </a:solidFill>
+                <a:latin typeface="+mn-lt"/>
+                <a:ea typeface="+mn-ea"/>
+                <a:cs typeface="Intel Clear" panose="020B0604020203020204" pitchFamily="34" charset="0"/>
+              </a:defRPr>
+            </a:lvl5pPr>
+            <a:lvl6pPr marL="2514600" indent="-228600" algn="l" defTabSz="457200" rtl="0" eaLnBrk="1" latinLnBrk="0" hangingPunct="1">
+              <a:spcBef>
+                <a:spcPct val="20000"/>
+              </a:spcBef>
+              <a:buFont typeface="Arial"/>
+              <a:buChar char="•"/>
+              <a:defRPr sz="2000" kern="1200">
+                <a:solidFill>
+                  <a:schemeClr val="tx1"/>
+                </a:solidFill>
+                <a:latin typeface="+mn-lt"/>
+                <a:ea typeface="+mn-ea"/>
+                <a:cs typeface="+mn-cs"/>
+              </a:defRPr>
+            </a:lvl6pPr>
+            <a:lvl7pPr marL="2971800" indent="-228600" algn="l" defTabSz="457200" rtl="0" eaLnBrk="1" latinLnBrk="0" hangingPunct="1">
+              <a:spcBef>
+                <a:spcPct val="20000"/>
+              </a:spcBef>
+              <a:buFont typeface="Arial"/>
+              <a:buChar char="•"/>
+              <a:defRPr sz="2000" kern="1200">
+                <a:solidFill>
+                  <a:schemeClr val="tx1"/>
+                </a:solidFill>
+                <a:latin typeface="+mn-lt"/>
+                <a:ea typeface="+mn-ea"/>
+                <a:cs typeface="+mn-cs"/>
+              </a:defRPr>
+            </a:lvl7pPr>
+            <a:lvl8pPr marL="3429000" indent="-228600" algn="l" defTabSz="457200" rtl="0" eaLnBrk="1" latinLnBrk="0" hangingPunct="1">
+              <a:spcBef>
+                <a:spcPct val="20000"/>
+              </a:spcBef>
+              <a:buFont typeface="Arial"/>
+              <a:buChar char="•"/>
+              <a:defRPr sz="2000" kern="1200">
+                <a:solidFill>
+                  <a:schemeClr val="tx1"/>
+                </a:solidFill>
+                <a:latin typeface="+mn-lt"/>
+                <a:ea typeface="+mn-ea"/>
+                <a:cs typeface="+mn-cs"/>
+              </a:defRPr>
+            </a:lvl8pPr>
+            <a:lvl9pPr marL="3886200" indent="-228600" algn="l" defTabSz="457200" rtl="0" eaLnBrk="1" latinLnBrk="0" hangingPunct="1">
+              <a:spcBef>
+                <a:spcPct val="20000"/>
+              </a:spcBef>
+              <a:buFont typeface="Arial"/>
+              <a:buChar char="•"/>
+              <a:defRPr sz="2000" kern="1200">
+                <a:solidFill>
+                  <a:schemeClr val="tx1"/>
+                </a:solidFill>
+                <a:latin typeface="+mn-lt"/>
+                <a:ea typeface="+mn-ea"/>
+                <a:cs typeface="+mn-cs"/>
+              </a:defRPr>
+            </a:lvl9pPr>
+          </a:lstStyle>
+          <a:p>
+            <a:r>
+              <a:rPr lang="en-US" sz="2000" i="1" dirty="0">
+                <a:latin typeface="Intel Clear Light" panose="020B0404020203020204" pitchFamily="34" charset="0"/>
+                <a:ea typeface="Intel Clear Light" panose="020B0404020203020204" pitchFamily="34" charset="0"/>
+                <a:cs typeface="Intel Clear Light" panose="020B0404020203020204" pitchFamily="34" charset="0"/>
+              </a:rPr>
+              <a:t>std::stack;</a:t>
+            </a:r>
+          </a:p>
+          <a:p>
+            <a:r>
+              <a:rPr lang="en-US" sz="2000" i="1" dirty="0">
+                <a:latin typeface="Intel Clear Light" panose="020B0404020203020204" pitchFamily="34" charset="0"/>
+                <a:ea typeface="Intel Clear Light" panose="020B0404020203020204" pitchFamily="34" charset="0"/>
+                <a:cs typeface="Intel Clear Light" panose="020B0404020203020204" pitchFamily="34" charset="0"/>
+              </a:rPr>
+              <a:t>std::queue;</a:t>
+            </a:r>
+          </a:p>
+          <a:p>
+            <a:r>
+              <a:rPr lang="en-US" sz="2000" i="1" dirty="0">
+                <a:latin typeface="Intel Clear Light" panose="020B0404020203020204" pitchFamily="34" charset="0"/>
+                <a:ea typeface="Intel Clear Light" panose="020B0404020203020204" pitchFamily="34" charset="0"/>
+                <a:cs typeface="Intel Clear Light" panose="020B0404020203020204" pitchFamily="34" charset="0"/>
+              </a:rPr>
+              <a:t>std::</a:t>
+            </a:r>
+            <a:r>
+              <a:rPr lang="en-US" sz="2000" i="1" dirty="0" err="1">
+                <a:latin typeface="Intel Clear Light" panose="020B0404020203020204" pitchFamily="34" charset="0"/>
+                <a:ea typeface="Intel Clear Light" panose="020B0404020203020204" pitchFamily="34" charset="0"/>
+                <a:cs typeface="Intel Clear Light" panose="020B0404020203020204" pitchFamily="34" charset="0"/>
+              </a:rPr>
+              <a:t>priority_queue</a:t>
+            </a:r>
+            <a:r>
+              <a:rPr lang="en-US" sz="2000" i="1" dirty="0">
+                <a:latin typeface="Intel Clear Light" panose="020B0404020203020204" pitchFamily="34" charset="0"/>
+                <a:ea typeface="Intel Clear Light" panose="020B0404020203020204" pitchFamily="34" charset="0"/>
+                <a:cs typeface="Intel Clear Light" panose="020B0404020203020204" pitchFamily="34" charset="0"/>
+              </a:rPr>
+              <a:t>;</a:t>
+            </a:r>
+            <a:r>
+              <a:rPr lang="en-US" sz="2000" b="1" i="1" dirty="0">
+                <a:latin typeface="Intel Clear Light" panose="020B0404020203020204" pitchFamily="34" charset="0"/>
+                <a:ea typeface="Intel Clear Light" panose="020B0404020203020204" pitchFamily="34" charset="0"/>
+                <a:cs typeface="Intel Clear Light" panose="020B0404020203020204" pitchFamily="34" charset="0"/>
+              </a:rPr>
+              <a:t>	</a:t>
+            </a:r>
+            <a:r>
+              <a:rPr lang="en-US" b="1" i="1" dirty="0">
+                <a:latin typeface="Intel Clear Light" panose="020B0404020203020204" pitchFamily="34" charset="0"/>
+                <a:ea typeface="Intel Clear Light" panose="020B0404020203020204" pitchFamily="34" charset="0"/>
+                <a:cs typeface="Intel Clear Light" panose="020B0404020203020204" pitchFamily="34" charset="0"/>
+              </a:rPr>
+              <a:t>		     </a:t>
+            </a:r>
+            <a:endParaRPr lang="en-US" i="1" dirty="0">
+              <a:latin typeface="Intel Clear Light" panose="020B0404020203020204" pitchFamily="34" charset="0"/>
+              <a:ea typeface="Intel Clear Light" panose="020B0404020203020204" pitchFamily="34" charset="0"/>
+              <a:cs typeface="Intel Clear Light" panose="020B0404020203020204" pitchFamily="34" charset="0"/>
+            </a:endParaRPr>
+          </a:p>
+        </p:txBody>
+      </p:sp>
+    </p:spTree>
+    <p:extLst>
+      <p:ext uri="{BB962C8B-B14F-4D97-AF65-F5344CB8AC3E}">
+        <p14:creationId xmlns:p14="http://schemas.microsoft.com/office/powerpoint/2010/main" val="3848533270"/>
+      </p:ext>
+    </p:extLst>
+  </p:cSld>
+  <p:clrMapOvr>
+    <a:masterClrMapping/>
+  </p:clrMapOvr>
+  <mc:AlternateContent xmlns:mc="http://schemas.openxmlformats.org/markup-compatibility/2006" xmlns:p14="http://schemas.microsoft.com/office/powerpoint/2010/main">
+    <mc:Choice Requires="p14">
+      <p:transition p14:dur="10"/>
+    </mc:Choice>
+    <mc:Fallback xmlns="">
+      <p:transition/>
+    </mc:Fallback>
+  </mc:AlternateContent>
+</p:sld>
+</file>
+
+<file path=ppt/slides/slide28.xml><?xml version="1.0" encoding="utf-8"?>
+<p:sld xmlns:a="http://schemas.openxmlformats.org/drawingml/2006/main" xmlns:r="http://schemas.openxmlformats.org/officeDocument/2006/relationships" xmlns:p="http://schemas.openxmlformats.org/presentationml/2006/main">
+  <p:cSld>
+    <p:spTree>
+      <p:nvGrpSpPr>
+        <p:cNvPr id="1" name=""/>
+        <p:cNvGrpSpPr/>
+        <p:nvPr/>
+      </p:nvGrpSpPr>
+      <p:grpSpPr>
+        <a:xfrm>
+          <a:off x="0" y="0"/>
+          <a:ext cx="0" cy="0"/>
+          <a:chOff x="0" y="0"/>
+          <a:chExt cx="0" cy="0"/>
+        </a:xfrm>
+      </p:grpSpPr>
+      <p:sp>
+        <p:nvSpPr>
+          <p:cNvPr id="2" name="Slide Number Placeholder 1"/>
+          <p:cNvSpPr>
+            <a:spLocks noGrp="1"/>
+          </p:cNvSpPr>
+          <p:nvPr>
+            <p:ph type="sldNum" sz="quarter" idx="12"/>
+          </p:nvPr>
+        </p:nvSpPr>
+        <p:spPr/>
+        <p:txBody>
+          <a:bodyPr/>
+          <a:lstStyle/>
+          <a:p>
+            <a:fld id="{EE2556C5-CE8C-6547-B838-EA80C61A4AF7}" type="slidenum">
+              <a:rPr lang="en-US" smtClean="0"/>
+              <a:pPr/>
+              <a:t>28</a:t>
             </a:fld>
             <a:endParaRPr lang="en-US" dirty="0"/>
           </a:p>

</xml_diff>

<commit_message>
Change font to Calibri
</commit_message>
<xml_diff>
--- a/03_containrers_and_initialization/03_containers.pptx
+++ b/03_containrers_and_initialization/03_containers.pptx
@@ -268,7 +268,7 @@
                 <a:latin typeface="Intel Clear"/>
               </a:rPr>
               <a:pPr/>
-              <a:t>8/6/2020</a:t>
+              <a:t>9/23/2020</a:t>
             </a:fld>
             <a:endParaRPr lang="en-US" dirty="0">
               <a:latin typeface="Intel Clear"/>
@@ -448,7 +448,7 @@
             <a:fld id="{ED7FC5FE-6F0D-D34A-8EE6-C95B4F5F4DC8}" type="datetimeFigureOut">
               <a:rPr lang="en-US" smtClean="0"/>
               <a:pPr/>
-              <a:t>8/6/2020</a:t>
+              <a:t>9/23/2020</a:t>
             </a:fld>
             <a:endParaRPr lang="en-US" dirty="0"/>
           </a:p>
@@ -2909,7 +2909,7 @@
             <a:fld id="{B61BEF0D-F0BB-DE4B-95CE-6DB70DBA9567}" type="datetimeFigureOut">
               <a:rPr lang="en-US" smtClean="0"/>
               <a:pPr/>
-              <a:t>8/6/2020</a:t>
+              <a:t>9/23/2020</a:t>
             </a:fld>
             <a:endParaRPr lang="en-US" dirty="0"/>
           </a:p>
@@ -3109,7 +3109,7 @@
           <a:p>
             <a:fld id="{55C6B4A9-1611-4792-9094-5F34BCA07E0B}" type="datetimeFigureOut">
               <a:rPr lang="en-US" smtClean="0"/>
-              <a:t>8/6/2020</a:t>
+              <a:t>9/23/2020</a:t>
             </a:fld>
             <a:endParaRPr lang="en-US" dirty="0"/>
           </a:p>
@@ -3320,7 +3320,7 @@
             <a:fld id="{B61BEF0D-F0BB-DE4B-95CE-6DB70DBA9567}" type="datetimeFigureOut">
               <a:rPr lang="en-US" smtClean="0"/>
               <a:pPr/>
-              <a:t>8/6/2020</a:t>
+              <a:t>9/23/2020</a:t>
             </a:fld>
             <a:endParaRPr lang="en-US" dirty="0"/>
           </a:p>
@@ -3712,7 +3712,7 @@
           <a:noFill/>
           <a:extLst>
             <a:ext uri="{909E8E84-426E-40dd-AFC4-6F175D3DCCD1}">
-              <a14:hiddenFill xmlns:a14="http://schemas.microsoft.com/office/drawing/2010/main" xmlns="">
+              <a14:hiddenFill xmlns="" xmlns:a14="http://schemas.microsoft.com/office/drawing/2010/main">
                 <a:solidFill>
                   <a:srgbClr val="FFFFFF"/>
                 </a:solidFill>
@@ -5737,7 +5737,7 @@
             <a:fld id="{B61BEF0D-F0BB-DE4B-95CE-6DB70DBA9567}" type="datetimeFigureOut">
               <a:rPr lang="en-US" smtClean="0"/>
               <a:pPr/>
-              <a:t>8/6/2020</a:t>
+              <a:t>9/23/2020</a:t>
             </a:fld>
             <a:endParaRPr lang="en-US" dirty="0"/>
           </a:p>
@@ -6940,7 +6940,7 @@
             <a:fld id="{B61BEF0D-F0BB-DE4B-95CE-6DB70DBA9567}" type="datetimeFigureOut">
               <a:rPr lang="en-US" smtClean="0"/>
               <a:pPr/>
-              <a:t>8/6/2020</a:t>
+              <a:t>9/23/2020</a:t>
             </a:fld>
             <a:endParaRPr lang="en-US" dirty="0"/>
           </a:p>
@@ -7207,7 +7207,7 @@
           <a:p>
             <a:fld id="{EB712588-04B1-427B-82EE-E8DB90309F08}" type="datetimeFigureOut">
               <a:rPr lang="en-US" smtClean="0"/>
-              <a:t>8/6/2020</a:t>
+              <a:t>9/23/2020</a:t>
             </a:fld>
             <a:endParaRPr lang="en-US" dirty="0"/>
           </a:p>
@@ -7622,7 +7622,7 @@
             <a:fld id="{B61BEF0D-F0BB-DE4B-95CE-6DB70DBA9567}" type="datetimeFigureOut">
               <a:rPr lang="en-US" smtClean="0"/>
               <a:pPr/>
-              <a:t>8/6/2020</a:t>
+              <a:t>9/23/2020</a:t>
             </a:fld>
             <a:endParaRPr lang="en-US" dirty="0"/>
           </a:p>
@@ -7766,7 +7766,7 @@
             <a:fld id="{B61BEF0D-F0BB-DE4B-95CE-6DB70DBA9567}" type="datetimeFigureOut">
               <a:rPr lang="en-US" smtClean="0"/>
               <a:pPr/>
-              <a:t>8/6/2020</a:t>
+              <a:t>9/23/2020</a:t>
             </a:fld>
             <a:endParaRPr lang="en-US" dirty="0"/>
           </a:p>
@@ -7893,7 +7893,7 @@
             <a:fld id="{B61BEF0D-F0BB-DE4B-95CE-6DB70DBA9567}" type="datetimeFigureOut">
               <a:rPr lang="en-US" smtClean="0"/>
               <a:pPr/>
-              <a:t>8/6/2020</a:t>
+              <a:t>9/23/2020</a:t>
             </a:fld>
             <a:endParaRPr lang="en-US" dirty="0"/>
           </a:p>
@@ -8217,7 +8217,7 @@
           <a:p>
             <a:fld id="{42A54C80-263E-416B-A8E0-580EDEADCBDC}" type="datetimeFigureOut">
               <a:rPr lang="en-US" smtClean="0"/>
-              <a:t>8/6/2020</a:t>
+              <a:t>9/23/2020</a:t>
             </a:fld>
             <a:endParaRPr lang="en-US" dirty="0"/>
           </a:p>
@@ -8508,7 +8508,7 @@
             <a:fld id="{B61BEF0D-F0BB-DE4B-95CE-6DB70DBA9567}" type="datetimeFigureOut">
               <a:rPr lang="en-US" smtClean="0"/>
               <a:pPr/>
-              <a:t>8/6/2020</a:t>
+              <a:t>9/23/2020</a:t>
             </a:fld>
             <a:endParaRPr lang="en-US" dirty="0"/>
           </a:p>
@@ -8752,7 +8752,7 @@
             <a:fld id="{B61BEF0D-F0BB-DE4B-95CE-6DB70DBA9567}" type="datetimeFigureOut">
               <a:rPr lang="en-US" smtClean="0"/>
               <a:pPr/>
-              <a:t>8/6/2020</a:t>
+              <a:t>9/23/2020</a:t>
             </a:fld>
             <a:endParaRPr lang="en-US" dirty="0"/>
           </a:p>
@@ -9545,9 +9545,9 @@
           <a:p>
             <a:r>
               <a:rPr lang="en-US" dirty="0">
-                <a:latin typeface="Intel Clear Pro Bold" panose="020B0804020202060201" pitchFamily="34" charset="-52"/>
-                <a:ea typeface="Intel Clear Pro Bold" panose="020B0804020202060201" pitchFamily="34" charset="-52"/>
-                <a:cs typeface="Intel Clear Pro Bold" panose="020B0804020202060201" pitchFamily="34" charset="-52"/>
+                <a:latin typeface="+mn-lt"/>
+                <a:ea typeface="Intel Clear Pro Bold" panose="020B0804020202060201" pitchFamily="34" charset="0"/>
+                <a:cs typeface="Intel Clear Pro Bold" panose="020B0804020202060201" pitchFamily="34" charset="0"/>
               </a:rPr>
               <a:t>Dynamic array – std::vector</a:t>
             </a:r>
@@ -10362,7 +10362,7 @@
           <a:p>
             <a:r>
               <a:rPr lang="en-US" dirty="0">
-                <a:latin typeface="Intel Clear Pro Bold" panose="020B0804020202060201" pitchFamily="34" charset="-52"/>
+                <a:latin typeface="+mn-lt"/>
                 <a:ea typeface="Intel Clear Pro Bold" panose="020B0804020202060201" pitchFamily="34" charset="-52"/>
                 <a:cs typeface="Intel Clear Pro Bold" panose="020B0804020202060201" pitchFamily="34" charset="-52"/>
               </a:rPr>
@@ -11207,7 +11207,7 @@
           <a:p>
             <a:r>
               <a:rPr lang="en-US" dirty="0">
-                <a:latin typeface="Intel Clear Pro Bold" panose="020B0804020202060201" pitchFamily="34" charset="-52"/>
+                <a:latin typeface="Calibri (Body)"/>
                 <a:ea typeface="Intel Clear Pro Bold" panose="020B0804020202060201" pitchFamily="34" charset="-52"/>
                 <a:cs typeface="Intel Clear Pro Bold" panose="020B0804020202060201" pitchFamily="34" charset="-52"/>
               </a:rPr>
@@ -11999,7 +11999,7 @@
           <a:p>
             <a:r>
               <a:rPr lang="en-US" dirty="0">
-                <a:latin typeface="Intel Clear Pro Bold" panose="020B0804020202060201" pitchFamily="34" charset="-52"/>
+                <a:latin typeface="Calibri (Body)"/>
                 <a:ea typeface="Intel Clear Pro Bold" panose="020B0804020202060201" pitchFamily="34" charset="-52"/>
                 <a:cs typeface="Intel Clear Pro Bold" panose="020B0804020202060201" pitchFamily="34" charset="-52"/>
               </a:rPr>
@@ -13060,7 +13060,7 @@
           <a:p>
             <a:r>
               <a:rPr lang="en-US" dirty="0">
-                <a:latin typeface="Intel Clear Pro Bold" panose="020B0804020202060201" pitchFamily="34" charset="-52"/>
+                <a:latin typeface="Calibri (Body)"/>
                 <a:ea typeface="Intel Clear Pro Bold" panose="020B0804020202060201" pitchFamily="34" charset="-52"/>
                 <a:cs typeface="Intel Clear Pro Bold" panose="020B0804020202060201" pitchFamily="34" charset="-52"/>
               </a:rPr>
@@ -13738,7 +13738,7 @@
             </a:pPr>
             <a:r>
               <a:rPr lang="en-US" sz="2100" b="1" dirty="0">
-                <a:latin typeface="Intel Clear Light" panose="020B0404020203020204" pitchFamily="34" charset="0"/>
+                <a:latin typeface="Calibri (Body)"/>
                 <a:ea typeface="Intel Clear Light" panose="020B0404020203020204" pitchFamily="34" charset="0"/>
                 <a:cs typeface="Intel Clear Light" panose="020B0404020203020204" pitchFamily="34" charset="0"/>
               </a:rPr>
@@ -13752,7 +13752,7 @@
             </a:pPr>
             <a:r>
               <a:rPr lang="en-US" sz="2100" b="1" dirty="0">
-                <a:latin typeface="Intel Clear Light" panose="020B0404020203020204" pitchFamily="34" charset="0"/>
+                <a:latin typeface="Calibri (Body)"/>
                 <a:ea typeface="Intel Clear Light" panose="020B0404020203020204" pitchFamily="34" charset="0"/>
                 <a:cs typeface="Intel Clear Light" panose="020B0404020203020204" pitchFamily="34" charset="0"/>
               </a:rPr>
@@ -13766,7 +13766,7 @@
             </a:pPr>
             <a:r>
               <a:rPr lang="en-US" sz="2100" b="1" dirty="0">
-                <a:latin typeface="Intel Clear Light" panose="020B0404020203020204" pitchFamily="34" charset="0"/>
+                <a:latin typeface="Calibri (Body)"/>
                 <a:ea typeface="Intel Clear Light" panose="020B0404020203020204" pitchFamily="34" charset="0"/>
                 <a:cs typeface="Intel Clear Light" panose="020B0404020203020204" pitchFamily="34" charset="0"/>
               </a:rPr>
@@ -13775,7 +13775,7 @@
           </a:p>
           <a:p>
             <a:endParaRPr lang="en-US" dirty="0">
-              <a:latin typeface="Intel Clear Light" panose="020B0404020203020204" pitchFamily="34" charset="0"/>
+              <a:latin typeface="Calibri (Body)"/>
               <a:ea typeface="Intel Clear Light" panose="020B0404020203020204" pitchFamily="34" charset="0"/>
               <a:cs typeface="Intel Clear Light" panose="020B0404020203020204" pitchFamily="34" charset="0"/>
             </a:endParaRPr>
@@ -13798,11 +13798,15 @@
           <a:lstStyle/>
           <a:p>
             <a:fld id="{EE2556C5-CE8C-6547-B838-EA80C61A4AF7}" type="slidenum">
-              <a:rPr lang="en-US" smtClean="0"/>
+              <a:rPr lang="en-US" smtClean="0">
+                <a:latin typeface="Calibri (Body)"/>
+              </a:rPr>
               <a:pPr/>
               <a:t>15</a:t>
             </a:fld>
-            <a:endParaRPr lang="en-US" dirty="0"/>
+            <a:endParaRPr lang="en-US" dirty="0">
+              <a:latin typeface="Calibri (Body)"/>
+            </a:endParaRPr>
           </a:p>
         </p:txBody>
       </p:sp>
@@ -13823,7 +13827,7 @@
           <a:p>
             <a:r>
               <a:rPr lang="en-US" dirty="0">
-                <a:latin typeface="Intel Clear Pro Bold" panose="020B0804020202060201" pitchFamily="34" charset="-52"/>
+                <a:latin typeface="Calibri (Body)"/>
                 <a:ea typeface="Intel Clear Pro Bold" panose="020B0804020202060201" pitchFamily="34" charset="-52"/>
                 <a:cs typeface="Intel Clear Pro Bold" panose="020B0804020202060201" pitchFamily="34" charset="-52"/>
               </a:rPr>
@@ -13915,7 +13919,7 @@
           <a:p>
             <a:r>
               <a:rPr lang="en-US" dirty="0">
-                <a:latin typeface="Intel Clear Pro Bold" panose="020B0804020202060201" pitchFamily="34" charset="-52"/>
+                <a:latin typeface="Calibri (Body)"/>
                 <a:ea typeface="Intel Clear Pro Bold" panose="020B0804020202060201" pitchFamily="34" charset="-52"/>
                 <a:cs typeface="Intel Clear Pro Bold" panose="020B0804020202060201" pitchFamily="34" charset="-52"/>
               </a:rPr>
@@ -14566,11 +14570,15 @@
           <a:lstStyle/>
           <a:p>
             <a:fld id="{EE2556C5-CE8C-6547-B838-EA80C61A4AF7}" type="slidenum">
-              <a:rPr lang="en-US" smtClean="0"/>
+              <a:rPr lang="en-US" smtClean="0">
+                <a:latin typeface="Calibri (Body)"/>
+              </a:rPr>
               <a:pPr/>
               <a:t>17</a:t>
             </a:fld>
-            <a:endParaRPr lang="en-US" dirty="0"/>
+            <a:endParaRPr lang="en-US" dirty="0">
+              <a:latin typeface="Calibri (Body)"/>
+            </a:endParaRPr>
           </a:p>
         </p:txBody>
       </p:sp>
@@ -14591,22 +14599,22 @@
           <a:p>
             <a:r>
               <a:rPr lang="en-US" dirty="0">
-                <a:latin typeface="Intel Clear Pro Bold" panose="020B0804020202060201" pitchFamily="34" charset="-52"/>
+                <a:latin typeface="Calibri (Body)"/>
                 <a:ea typeface="Intel Clear Pro Bold" panose="020B0804020202060201" pitchFamily="34" charset="-52"/>
                 <a:cs typeface="Intel Clear Pro Bold" panose="020B0804020202060201" pitchFamily="34" charset="-52"/>
               </a:rPr>
-              <a:t>Std::</a:t>
+              <a:t>std::</a:t>
             </a:r>
             <a:r>
               <a:rPr lang="en-US" dirty="0" err="1">
-                <a:latin typeface="Intel Clear Pro Bold" panose="020B0804020202060201" pitchFamily="34" charset="-52"/>
+                <a:latin typeface="Calibri (Body)"/>
                 <a:ea typeface="Intel Clear Pro Bold" panose="020B0804020202060201" pitchFamily="34" charset="-52"/>
                 <a:cs typeface="Intel Clear Pro Bold" panose="020B0804020202060201" pitchFamily="34" charset="-52"/>
               </a:rPr>
-              <a:t>FORWARD_list</a:t>
+              <a:t>forward_list</a:t>
             </a:r>
             <a:endParaRPr lang="en-US" dirty="0">
-              <a:latin typeface="Intel Clear Pro Bold" panose="020B0804020202060201" pitchFamily="34" charset="-52"/>
+              <a:latin typeface="Calibri (Body)"/>
               <a:ea typeface="Intel Clear Pro Bold" panose="020B0804020202060201" pitchFamily="34" charset="-52"/>
               <a:cs typeface="Intel Clear Pro Bold" panose="020B0804020202060201" pitchFamily="34" charset="-52"/>
             </a:endParaRPr>
@@ -14667,6 +14675,7 @@
                 <a:solidFill>
                   <a:srgbClr val="FF0000"/>
                 </a:solidFill>
+                <a:latin typeface="Calibri (Body)"/>
               </a:rPr>
               <a:t>7</a:t>
             </a:r>
@@ -14727,6 +14736,7 @@
                 <a:solidFill>
                   <a:srgbClr val="FF0000"/>
                 </a:solidFill>
+                <a:latin typeface="Calibri (Body)"/>
               </a:rPr>
               <a:t>2</a:t>
             </a:r>
@@ -14830,6 +14840,7 @@
                 <a:solidFill>
                   <a:srgbClr val="FF0000"/>
                 </a:solidFill>
+                <a:latin typeface="Calibri (Body)"/>
               </a:rPr>
               <a:t>5</a:t>
             </a:r>
@@ -14933,6 +14944,7 @@
                 <a:solidFill>
                   <a:srgbClr val="FF0000"/>
                 </a:solidFill>
+                <a:latin typeface="Calibri (Body)"/>
               </a:rPr>
               <a:t>10</a:t>
             </a:r>
@@ -15231,22 +15243,22 @@
           <a:p>
             <a:r>
               <a:rPr lang="en-US" sz="2100" i="1" dirty="0">
-                <a:latin typeface="Intel Clear Light" panose="020B0404020203020204" pitchFamily="34" charset="0"/>
+                <a:latin typeface="Calibri (Body)"/>
                 <a:ea typeface="Intel Clear Light" panose="020B0404020203020204" pitchFamily="34" charset="0"/>
                 <a:cs typeface="Intel Clear Light" panose="020B0404020203020204" pitchFamily="34" charset="0"/>
               </a:rPr>
-              <a:t>					vector		deque		list		</a:t>
+              <a:t>					vector		 deque		list		        </a:t>
             </a:r>
             <a:r>
               <a:rPr lang="en-US" sz="2100" i="1" dirty="0" err="1">
-                <a:latin typeface="Intel Clear Light" panose="020B0404020203020204" pitchFamily="34" charset="0"/>
+                <a:latin typeface="Calibri (Body)"/>
                 <a:ea typeface="Intel Clear Light" panose="020B0404020203020204" pitchFamily="34" charset="0"/>
                 <a:cs typeface="Intel Clear Light" panose="020B0404020203020204" pitchFamily="34" charset="0"/>
               </a:rPr>
               <a:t>forward_list</a:t>
             </a:r>
             <a:endParaRPr lang="en-US" sz="2100" i="1" dirty="0">
-              <a:latin typeface="Intel Clear Light" panose="020B0404020203020204" pitchFamily="34" charset="0"/>
+              <a:latin typeface="Calibri (Body)"/>
               <a:ea typeface="Intel Clear Light" panose="020B0404020203020204" pitchFamily="34" charset="0"/>
               <a:cs typeface="Intel Clear Light" panose="020B0404020203020204" pitchFamily="34" charset="0"/>
             </a:endParaRPr>
@@ -15254,7 +15266,7 @@
           <a:p>
             <a:r>
               <a:rPr lang="en-US" sz="2100" i="1" dirty="0" err="1">
-                <a:latin typeface="Intel Clear Light" panose="020B0404020203020204" pitchFamily="34" charset="0"/>
+                <a:latin typeface="Calibri (Body)"/>
                 <a:ea typeface="Intel Clear Light" panose="020B0404020203020204" pitchFamily="34" charset="0"/>
                 <a:cs typeface="Intel Clear Light" panose="020B0404020203020204" pitchFamily="34" charset="0"/>
               </a:rPr>
@@ -15262,7 +15274,7 @@
             </a:r>
             <a:r>
               <a:rPr lang="en-US" sz="2100" i="1" dirty="0">
-                <a:latin typeface="Intel Clear Light" panose="020B0404020203020204" pitchFamily="34" charset="0"/>
+                <a:latin typeface="Calibri (Body)"/>
                 <a:ea typeface="Intel Clear Light" panose="020B0404020203020204" pitchFamily="34" charset="0"/>
                 <a:cs typeface="Intel Clear Light" panose="020B0404020203020204" pitchFamily="34" charset="0"/>
               </a:rPr>
@@ -15272,7 +15284,7 @@
           <a:p>
             <a:r>
               <a:rPr lang="en-US" sz="2100" i="1" dirty="0" err="1">
-                <a:latin typeface="Intel Clear Light" panose="020B0404020203020204" pitchFamily="34" charset="0"/>
+                <a:latin typeface="Calibri (Body)"/>
                 <a:ea typeface="Intel Clear Light" panose="020B0404020203020204" pitchFamily="34" charset="0"/>
                 <a:cs typeface="Intel Clear Light" panose="020B0404020203020204" pitchFamily="34" charset="0"/>
               </a:rPr>
@@ -15280,7 +15292,7 @@
             </a:r>
             <a:r>
               <a:rPr lang="en-US" sz="2100" i="1" dirty="0">
-                <a:latin typeface="Intel Clear Light" panose="020B0404020203020204" pitchFamily="34" charset="0"/>
+                <a:latin typeface="Calibri (Body)"/>
                 <a:ea typeface="Intel Clear Light" panose="020B0404020203020204" pitchFamily="34" charset="0"/>
                 <a:cs typeface="Intel Clear Light" panose="020B0404020203020204" pitchFamily="34" charset="0"/>
               </a:rPr>
@@ -15290,14 +15302,14 @@
           <a:p>
             <a:r>
               <a:rPr lang="en-US" sz="2100" i="1" dirty="0">
-                <a:latin typeface="Intel Clear Light" panose="020B0404020203020204" pitchFamily="34" charset="0"/>
+                <a:latin typeface="Calibri (Body)"/>
                 <a:ea typeface="Intel Clear Light" panose="020B0404020203020204" pitchFamily="34" charset="0"/>
                 <a:cs typeface="Intel Clear Light" panose="020B0404020203020204" pitchFamily="34" charset="0"/>
               </a:rPr>
-              <a:t>Insert Mid           	  O(N)		 O(N)	       O(1)/O(N)    O(1)/O(N)</a:t>
+              <a:t>Insert Mid           	        O(N)		 O(N)	       O(1)/O(N)     O(1)/O(N)</a:t>
             </a:r>
             <a:endParaRPr lang="ru-RU" sz="2100" i="1" dirty="0">
-              <a:latin typeface="Intel Clear Light" panose="020B0404020203020204" pitchFamily="34" charset="0"/>
+              <a:latin typeface="Calibri (Body)"/>
               <a:ea typeface="Intel Clear Light" panose="020B0404020203020204" pitchFamily="34" charset="0"/>
               <a:cs typeface="Intel Clear Light" panose="020B0404020203020204" pitchFamily="34" charset="0"/>
             </a:endParaRPr>
@@ -15305,16 +15317,16 @@
           <a:p>
             <a:r>
               <a:rPr lang="en-US" sz="2100" i="1" dirty="0">
-                <a:latin typeface="Intel Clear Light" panose="020B0404020203020204" pitchFamily="34" charset="0"/>
+                <a:latin typeface="Calibri (Body)"/>
                 <a:ea typeface="Intel Clear Light" panose="020B0404020203020204" pitchFamily="34" charset="0"/>
                 <a:cs typeface="Intel Clear Light" panose="020B0404020203020204" pitchFamily="34" charset="0"/>
               </a:rPr>
-              <a:t>Erase Mid                    O(N)            O(N)            O(1)/O(N)    O(1)/O(N)</a:t>
+              <a:t>Erase Mid                    O(N)               O(N)             O(1)/O(N)     O(1)/O(N)</a:t>
             </a:r>
           </a:p>
           <a:p>
             <a:endParaRPr lang="en-US" sz="2100" i="1" dirty="0">
-              <a:latin typeface="Intel Clear Light" panose="020B0404020203020204" pitchFamily="34" charset="0"/>
+              <a:latin typeface="Calibri (Body)"/>
               <a:ea typeface="Intel Clear Light" panose="020B0404020203020204" pitchFamily="34" charset="0"/>
               <a:cs typeface="Intel Clear Light" panose="020B0404020203020204" pitchFamily="34" charset="0"/>
             </a:endParaRPr>
@@ -15322,7 +15334,7 @@
           <a:p>
             <a:r>
               <a:rPr lang="en-US" i="1" dirty="0">
-                <a:latin typeface="Intel Clear Light" panose="020B0404020203020204" pitchFamily="34" charset="0"/>
+                <a:latin typeface="Calibri (Body)"/>
                 <a:ea typeface="Intel Clear Light" panose="020B0404020203020204" pitchFamily="34" charset="0"/>
                 <a:cs typeface="Intel Clear Light" panose="020B0404020203020204" pitchFamily="34" charset="0"/>
               </a:rPr>
@@ -15347,11 +15359,15 @@
           <a:lstStyle/>
           <a:p>
             <a:fld id="{EE2556C5-CE8C-6547-B838-EA80C61A4AF7}" type="slidenum">
-              <a:rPr lang="en-US" smtClean="0"/>
+              <a:rPr lang="en-US" smtClean="0">
+                <a:latin typeface="Calibri (Body)"/>
+              </a:rPr>
               <a:pPr/>
               <a:t>18</a:t>
             </a:fld>
-            <a:endParaRPr lang="en-US" dirty="0"/>
+            <a:endParaRPr lang="en-US" dirty="0">
+              <a:latin typeface="Calibri (Body)"/>
+            </a:endParaRPr>
           </a:p>
         </p:txBody>
       </p:sp>
@@ -15377,7 +15393,7 @@
           <a:p>
             <a:r>
               <a:rPr lang="en-US" dirty="0">
-                <a:latin typeface="Intel Clear Pro Bold" panose="020B0804020202060201" pitchFamily="34" charset="-52"/>
+                <a:latin typeface="Calibri (Body)"/>
                 <a:ea typeface="Intel Clear Pro Bold" panose="020B0804020202060201" pitchFamily="34" charset="-52"/>
                 <a:cs typeface="Intel Clear Pro Bold" panose="020B0804020202060201" pitchFamily="34" charset="-52"/>
               </a:rPr>
@@ -15592,7 +15608,7 @@
           <a:p>
             <a:r>
               <a:rPr lang="en-US" sz="2100" b="1" dirty="0">
-                <a:latin typeface="Intel Clear Light" panose="020B0404020203020204" pitchFamily="34" charset="0"/>
+                <a:latin typeface="Calibri (Body)"/>
                 <a:ea typeface="Intel Clear Light" panose="020B0404020203020204" pitchFamily="34" charset="0"/>
                 <a:cs typeface="Intel Clear Light" panose="020B0404020203020204" pitchFamily="34" charset="0"/>
               </a:rPr>
@@ -15602,7 +15618,7 @@
           <a:p>
             <a:r>
               <a:rPr lang="en-US" sz="2100" b="1" dirty="0">
-                <a:latin typeface="Intel Clear Light" panose="020B0404020203020204" pitchFamily="34" charset="0"/>
+                <a:latin typeface="Calibri (Body)"/>
                 <a:ea typeface="Intel Clear Light" panose="020B0404020203020204" pitchFamily="34" charset="0"/>
                 <a:cs typeface="Intel Clear Light" panose="020B0404020203020204" pitchFamily="34" charset="0"/>
               </a:rPr>
@@ -15612,7 +15628,7 @@
           <a:p>
             <a:r>
               <a:rPr lang="en-US" sz="2100" b="1" dirty="0">
-                <a:latin typeface="Intel Clear Light" panose="020B0404020203020204" pitchFamily="34" charset="0"/>
+                <a:latin typeface="Calibri (Body)"/>
                 <a:ea typeface="Intel Clear Light" panose="020B0404020203020204" pitchFamily="34" charset="0"/>
                 <a:cs typeface="Intel Clear Light" panose="020B0404020203020204" pitchFamily="34" charset="0"/>
               </a:rPr>
@@ -15622,7 +15638,7 @@
           <a:p>
             <a:r>
               <a:rPr lang="en-US" sz="2100" b="1" dirty="0">
-                <a:latin typeface="Intel Clear Light" panose="020B0404020203020204" pitchFamily="34" charset="0"/>
+                <a:latin typeface="Calibri (Body)"/>
                 <a:ea typeface="Intel Clear Light" panose="020B0404020203020204" pitchFamily="34" charset="0"/>
                 <a:cs typeface="Intel Clear Light" panose="020B0404020203020204" pitchFamily="34" charset="0"/>
               </a:rPr>
@@ -15631,7 +15647,7 @@
           </a:p>
           <a:p>
             <a:endParaRPr lang="en-US" dirty="0">
-              <a:latin typeface="Intel Clear Light" panose="020B0404020203020204" pitchFamily="34" charset="0"/>
+              <a:latin typeface="Calibri (Body)"/>
               <a:ea typeface="Intel Clear Light" panose="020B0404020203020204" pitchFamily="34" charset="0"/>
               <a:cs typeface="Intel Clear Light" panose="020B0404020203020204" pitchFamily="34" charset="0"/>
             </a:endParaRPr>
@@ -15684,7 +15700,7 @@
           <a:p>
             <a:r>
               <a:rPr lang="en-US" dirty="0">
-                <a:latin typeface="Intel Clear Pro Bold" panose="020B0804020202060201" pitchFamily="34" charset="-52"/>
+                <a:latin typeface="Calibri (Body)"/>
                 <a:ea typeface="Intel Clear Pro Bold" panose="020B0804020202060201" pitchFamily="34" charset="-52"/>
                 <a:cs typeface="Intel Clear Pro Bold" panose="020B0804020202060201" pitchFamily="34" charset="-52"/>
               </a:rPr>
@@ -15789,7 +15805,7 @@
                 <a:solidFill>
                   <a:schemeClr val="tx1"/>
                 </a:solidFill>
-                <a:latin typeface="Intel Clear Pro Bold" panose="020B0804020202060201" pitchFamily="34" charset="-52"/>
+                <a:latin typeface="+mn-lt"/>
                 <a:ea typeface="Intel Clear Pro Bold" panose="020B0804020202060201" pitchFamily="34" charset="-52"/>
                 <a:cs typeface="Intel Clear Pro Bold" panose="020B0804020202060201" pitchFamily="34" charset="-52"/>
               </a:rPr>
@@ -15799,7 +15815,7 @@
               <a:solidFill>
                 <a:schemeClr val="tx1"/>
               </a:solidFill>
-              <a:latin typeface="Intel Clear Pro Bold" panose="020B0804020202060201" pitchFamily="34" charset="-52"/>
+              <a:latin typeface="+mn-lt"/>
               <a:ea typeface="Intel Clear Pro Bold" panose="020B0804020202060201" pitchFamily="34" charset="-52"/>
               <a:cs typeface="Intel Clear Pro Bold" panose="020B0804020202060201" pitchFamily="34" charset="-52"/>
             </a:endParaRPr>
@@ -15894,7 +15910,7 @@
           <a:p>
             <a:r>
               <a:rPr lang="en-US" dirty="0">
-                <a:latin typeface="Intel Clear Pro Bold" panose="020B0804020202060201" pitchFamily="34" charset="-52"/>
+                <a:latin typeface="Calibri (Body)"/>
                 <a:ea typeface="Intel Clear Pro Bold" panose="020B0804020202060201" pitchFamily="34" charset="-52"/>
                 <a:cs typeface="Intel Clear Pro Bold" panose="020B0804020202060201" pitchFamily="34" charset="-52"/>
               </a:rPr>
@@ -16395,7 +16411,7 @@
           <a:p>
             <a:r>
               <a:rPr lang="en-US" dirty="0">
-                <a:latin typeface="Intel Clear Pro Bold" panose="020B0804020202060201" pitchFamily="34" charset="-52"/>
+                <a:latin typeface="Calibri (Body)"/>
                 <a:ea typeface="Intel Clear Pro Bold" panose="020B0804020202060201" pitchFamily="34" charset="-52"/>
                 <a:cs typeface="Intel Clear Pro Bold" panose="020B0804020202060201" pitchFamily="34" charset="-52"/>
               </a:rPr>
@@ -16928,7 +16944,7 @@
           <a:p>
             <a:r>
               <a:rPr lang="en-US" dirty="0">
-                <a:latin typeface="Intel Clear Pro Bold" panose="020B0804020202060201" pitchFamily="34" charset="-52"/>
+                <a:latin typeface="Calibri (Body)"/>
                 <a:ea typeface="Intel Clear Pro Bold" panose="020B0804020202060201" pitchFamily="34" charset="-52"/>
                 <a:cs typeface="Intel Clear Pro Bold" panose="020B0804020202060201" pitchFamily="34" charset="-52"/>
               </a:rPr>
@@ -17611,7 +17627,7 @@
           <a:p>
             <a:r>
               <a:rPr lang="en-US" sz="2100" b="1" dirty="0">
-                <a:latin typeface="Intel Clear Light" panose="020B0404020203020204" pitchFamily="34" charset="0"/>
+                <a:latin typeface="Calibri (Body)"/>
                 <a:ea typeface="Intel Clear Light" panose="020B0404020203020204" pitchFamily="34" charset="0"/>
                 <a:cs typeface="Intel Clear Light" panose="020B0404020203020204" pitchFamily="34" charset="0"/>
               </a:rPr>
@@ -17619,14 +17635,14 @@
             </a:r>
             <a:r>
               <a:rPr lang="en-US" sz="2100" b="1" dirty="0" err="1">
-                <a:latin typeface="Intel Clear Light" panose="020B0404020203020204" pitchFamily="34" charset="0"/>
+                <a:latin typeface="Calibri (Body)"/>
                 <a:ea typeface="Intel Clear Light" panose="020B0404020203020204" pitchFamily="34" charset="0"/>
                 <a:cs typeface="Intel Clear Light" panose="020B0404020203020204" pitchFamily="34" charset="0"/>
               </a:rPr>
               <a:t>unordered_map</a:t>
             </a:r>
             <a:endParaRPr lang="en-US" sz="2100" b="1" dirty="0">
-              <a:latin typeface="Intel Clear Light" panose="020B0404020203020204" pitchFamily="34" charset="0"/>
+              <a:latin typeface="Calibri (Body)"/>
               <a:ea typeface="Intel Clear Light" panose="020B0404020203020204" pitchFamily="34" charset="0"/>
               <a:cs typeface="Intel Clear Light" panose="020B0404020203020204" pitchFamily="34" charset="0"/>
             </a:endParaRPr>
@@ -17634,7 +17650,7 @@
           <a:p>
             <a:r>
               <a:rPr lang="en-US" sz="2100" b="1" dirty="0">
-                <a:latin typeface="Intel Clear Light" panose="020B0404020203020204" pitchFamily="34" charset="0"/>
+                <a:latin typeface="Calibri (Body)"/>
                 <a:ea typeface="Intel Clear Light" panose="020B0404020203020204" pitchFamily="34" charset="0"/>
                 <a:cs typeface="Intel Clear Light" panose="020B0404020203020204" pitchFamily="34" charset="0"/>
               </a:rPr>
@@ -17642,14 +17658,14 @@
             </a:r>
             <a:r>
               <a:rPr lang="en-US" sz="2100" b="1" dirty="0" err="1">
-                <a:latin typeface="Intel Clear Light" panose="020B0404020203020204" pitchFamily="34" charset="0"/>
+                <a:latin typeface="Calibri (Body)"/>
                 <a:ea typeface="Intel Clear Light" panose="020B0404020203020204" pitchFamily="34" charset="0"/>
                 <a:cs typeface="Intel Clear Light" panose="020B0404020203020204" pitchFamily="34" charset="0"/>
               </a:rPr>
               <a:t>unordered_multimap</a:t>
             </a:r>
             <a:endParaRPr lang="en-US" sz="2100" b="1" dirty="0">
-              <a:latin typeface="Intel Clear Light" panose="020B0404020203020204" pitchFamily="34" charset="0"/>
+              <a:latin typeface="Calibri (Body)"/>
               <a:ea typeface="Intel Clear Light" panose="020B0404020203020204" pitchFamily="34" charset="0"/>
               <a:cs typeface="Intel Clear Light" panose="020B0404020203020204" pitchFamily="34" charset="0"/>
             </a:endParaRPr>
@@ -17657,7 +17673,7 @@
           <a:p>
             <a:r>
               <a:rPr lang="en-US" sz="2100" b="1" dirty="0">
-                <a:latin typeface="Intel Clear Light" panose="020B0404020203020204" pitchFamily="34" charset="0"/>
+                <a:latin typeface="Calibri (Body)"/>
                 <a:ea typeface="Intel Clear Light" panose="020B0404020203020204" pitchFamily="34" charset="0"/>
                 <a:cs typeface="Intel Clear Light" panose="020B0404020203020204" pitchFamily="34" charset="0"/>
               </a:rPr>
@@ -17665,14 +17681,14 @@
             </a:r>
             <a:r>
               <a:rPr lang="en-US" sz="2100" b="1" dirty="0" err="1">
-                <a:latin typeface="Intel Clear Light" panose="020B0404020203020204" pitchFamily="34" charset="0"/>
+                <a:latin typeface="Calibri (Body)"/>
                 <a:ea typeface="Intel Clear Light" panose="020B0404020203020204" pitchFamily="34" charset="0"/>
                 <a:cs typeface="Intel Clear Light" panose="020B0404020203020204" pitchFamily="34" charset="0"/>
               </a:rPr>
               <a:t>unordered_set</a:t>
             </a:r>
             <a:endParaRPr lang="en-US" sz="2100" b="1" dirty="0">
-              <a:latin typeface="Intel Clear Light" panose="020B0404020203020204" pitchFamily="34" charset="0"/>
+              <a:latin typeface="Calibri (Body)"/>
               <a:ea typeface="Intel Clear Light" panose="020B0404020203020204" pitchFamily="34" charset="0"/>
               <a:cs typeface="Intel Clear Light" panose="020B0404020203020204" pitchFamily="34" charset="0"/>
             </a:endParaRPr>
@@ -17680,7 +17696,7 @@
           <a:p>
             <a:r>
               <a:rPr lang="en-US" sz="2100" b="1" dirty="0">
-                <a:latin typeface="Intel Clear Light" panose="020B0404020203020204" pitchFamily="34" charset="0"/>
+                <a:latin typeface="Calibri (Body)"/>
                 <a:ea typeface="Intel Clear Light" panose="020B0404020203020204" pitchFamily="34" charset="0"/>
                 <a:cs typeface="Intel Clear Light" panose="020B0404020203020204" pitchFamily="34" charset="0"/>
               </a:rPr>
@@ -17688,21 +17704,21 @@
             </a:r>
             <a:r>
               <a:rPr lang="en-US" sz="2100" b="1" dirty="0" err="1">
-                <a:latin typeface="Intel Clear Light" panose="020B0404020203020204" pitchFamily="34" charset="0"/>
+                <a:latin typeface="Calibri (Body)"/>
                 <a:ea typeface="Intel Clear Light" panose="020B0404020203020204" pitchFamily="34" charset="0"/>
                 <a:cs typeface="Intel Clear Light" panose="020B0404020203020204" pitchFamily="34" charset="0"/>
               </a:rPr>
               <a:t>unordered_multiset</a:t>
             </a:r>
             <a:endParaRPr lang="en-US" sz="2100" b="1" dirty="0">
-              <a:latin typeface="Intel Clear Light" panose="020B0404020203020204" pitchFamily="34" charset="0"/>
+              <a:latin typeface="Calibri (Body)"/>
               <a:ea typeface="Intel Clear Light" panose="020B0404020203020204" pitchFamily="34" charset="0"/>
               <a:cs typeface="Intel Clear Light" panose="020B0404020203020204" pitchFamily="34" charset="0"/>
             </a:endParaRPr>
           </a:p>
           <a:p>
             <a:endParaRPr lang="en-US" dirty="0">
-              <a:latin typeface="Intel Clear Light" panose="020B0404020203020204" pitchFamily="34" charset="0"/>
+              <a:latin typeface="Calibri (Body)"/>
               <a:ea typeface="Intel Clear Light" panose="020B0404020203020204" pitchFamily="34" charset="0"/>
               <a:cs typeface="Intel Clear Light" panose="020B0404020203020204" pitchFamily="34" charset="0"/>
             </a:endParaRPr>
@@ -17755,7 +17771,7 @@
           <a:p>
             <a:r>
               <a:rPr lang="en-US" dirty="0">
-                <a:latin typeface="Intel Clear Pro Bold" panose="020B0804020202060201" pitchFamily="34" charset="-52"/>
+                <a:latin typeface="Calibri (Body)"/>
                 <a:ea typeface="Intel Clear Pro Bold" panose="020B0804020202060201" pitchFamily="34" charset="-52"/>
                 <a:cs typeface="Intel Clear Pro Bold" panose="020B0804020202060201" pitchFamily="34" charset="-52"/>
               </a:rPr>
@@ -17852,7 +17868,7 @@
           <a:p>
             <a:r>
               <a:rPr lang="en-US" dirty="0">
-                <a:latin typeface="Intel Clear Pro Bold" panose="020B0804020202060201" pitchFamily="34" charset="-52"/>
+                <a:latin typeface="Calibri (Body)"/>
                 <a:ea typeface="Intel Clear Pro Bold" panose="020B0804020202060201" pitchFamily="34" charset="-52"/>
                 <a:cs typeface="Intel Clear Pro Bold" panose="020B0804020202060201" pitchFamily="34" charset="-52"/>
               </a:rPr>
@@ -18282,7 +18298,7 @@
           <a:p>
             <a:r>
               <a:rPr lang="en-US" dirty="0">
-                <a:latin typeface="Intel Clear Pro Bold" panose="020B0804020202060201" pitchFamily="34" charset="-52"/>
+                <a:latin typeface="Calibri (Body)"/>
                 <a:ea typeface="Intel Clear Pro Bold" panose="020B0804020202060201" pitchFamily="34" charset="-52"/>
                 <a:cs typeface="Intel Clear Pro Bold" panose="020B0804020202060201" pitchFamily="34" charset="-52"/>
               </a:rPr>
@@ -18461,14 +18477,14 @@
           <a:p>
             <a:br>
               <a:rPr lang="en-US" i="1" dirty="0">
-                <a:latin typeface="Intel Clear Light" panose="020B0404020203020204" pitchFamily="34" charset="0"/>
+                <a:latin typeface="Calibri (Body)"/>
                 <a:ea typeface="Intel Clear Light" panose="020B0404020203020204" pitchFamily="34" charset="0"/>
                 <a:cs typeface="Intel Clear Light" panose="020B0404020203020204" pitchFamily="34" charset="0"/>
               </a:rPr>
             </a:br>
             <a:r>
               <a:rPr lang="en-US" i="1" dirty="0">
-                <a:latin typeface="Intel Clear Light" panose="020B0404020203020204" pitchFamily="34" charset="0"/>
+                <a:latin typeface="Calibri (Body)"/>
                 <a:ea typeface="Intel Clear Light" panose="020B0404020203020204" pitchFamily="34" charset="0"/>
                 <a:cs typeface="Intel Clear Light" panose="020B0404020203020204" pitchFamily="34" charset="0"/>
               </a:rPr>
@@ -18478,7 +18494,7 @@
           <a:p>
             <a:r>
               <a:rPr lang="en-US" i="1" dirty="0">
-                <a:latin typeface="Intel Clear Light" panose="020B0404020203020204" pitchFamily="34" charset="0"/>
+                <a:latin typeface="Calibri (Body)"/>
                 <a:ea typeface="Intel Clear Light" panose="020B0404020203020204" pitchFamily="34" charset="0"/>
                 <a:cs typeface="Intel Clear Light" panose="020B0404020203020204" pitchFamily="34" charset="0"/>
               </a:rPr>
@@ -18486,7 +18502,7 @@
             </a:r>
             <a:r>
               <a:rPr lang="en-US" b="1" i="1" dirty="0">
-                <a:latin typeface="Intel Clear Light" panose="020B0404020203020204" pitchFamily="34" charset="0"/>
+                <a:latin typeface="Calibri (Body)"/>
                 <a:ea typeface="Intel Clear Light" panose="020B0404020203020204" pitchFamily="34" charset="0"/>
                 <a:cs typeface="Intel Clear Light" panose="020B0404020203020204" pitchFamily="34" charset="0"/>
               </a:rPr>
@@ -18494,7 +18510,7 @@
             </a:r>
             <a:r>
               <a:rPr lang="ru-RU" b="1" i="1" dirty="0">
-                <a:latin typeface="Intel Clear Light" panose="020B0404020203020204" pitchFamily="34" charset="0"/>
+                <a:latin typeface="Calibri (Body)"/>
                 <a:ea typeface="Intel Clear Light" panose="020B0404020203020204" pitchFamily="34" charset="0"/>
                 <a:cs typeface="Intel Clear Light" panose="020B0404020203020204" pitchFamily="34" charset="0"/>
               </a:rPr>
@@ -18502,7 +18518,7 @@
             </a:r>
             <a:r>
               <a:rPr lang="en-US" b="1" i="1" dirty="0">
-                <a:latin typeface="Intel Clear Light" panose="020B0404020203020204" pitchFamily="34" charset="0"/>
+                <a:latin typeface="Calibri (Body)"/>
                 <a:ea typeface="Intel Clear Light" panose="020B0404020203020204" pitchFamily="34" charset="0"/>
                 <a:cs typeface="Intel Clear Light" panose="020B0404020203020204" pitchFamily="34" charset="0"/>
               </a:rPr>
@@ -18512,7 +18528,7 @@
           <a:p>
             <a:r>
               <a:rPr lang="en-US" i="1" dirty="0">
-                <a:latin typeface="Intel Clear Light" panose="020B0404020203020204" pitchFamily="34" charset="0"/>
+                <a:latin typeface="Calibri (Body)"/>
                 <a:ea typeface="Intel Clear Light" panose="020B0404020203020204" pitchFamily="34" charset="0"/>
                 <a:cs typeface="Intel Clear Light" panose="020B0404020203020204" pitchFamily="34" charset="0"/>
               </a:rPr>
@@ -18520,7 +18536,7 @@
             </a:r>
             <a:r>
               <a:rPr lang="en-US" b="1" i="1" dirty="0">
-                <a:latin typeface="Intel Clear Light" panose="020B0404020203020204" pitchFamily="34" charset="0"/>
+                <a:latin typeface="Calibri (Body)"/>
                 <a:ea typeface="Intel Clear Light" panose="020B0404020203020204" pitchFamily="34" charset="0"/>
                 <a:cs typeface="Intel Clear Light" panose="020B0404020203020204" pitchFamily="34" charset="0"/>
               </a:rPr>
@@ -18528,7 +18544,7 @@
             </a:r>
             <a:r>
               <a:rPr lang="ru-RU" b="1" i="1" dirty="0">
-                <a:latin typeface="Intel Clear Light" panose="020B0404020203020204" pitchFamily="34" charset="0"/>
+                <a:latin typeface="Calibri (Body)"/>
                 <a:ea typeface="Intel Clear Light" panose="020B0404020203020204" pitchFamily="34" charset="0"/>
                 <a:cs typeface="Intel Clear Light" panose="020B0404020203020204" pitchFamily="34" charset="0"/>
               </a:rPr>
@@ -18536,7 +18552,7 @@
             </a:r>
             <a:r>
               <a:rPr lang="en-US" b="1" i="1" dirty="0">
-                <a:latin typeface="Intel Clear Light" panose="020B0404020203020204" pitchFamily="34" charset="0"/>
+                <a:latin typeface="Calibri (Body)"/>
                 <a:ea typeface="Intel Clear Light" panose="020B0404020203020204" pitchFamily="34" charset="0"/>
                 <a:cs typeface="Intel Clear Light" panose="020B0404020203020204" pitchFamily="34" charset="0"/>
               </a:rPr>
@@ -18546,7 +18562,7 @@
           <a:p>
             <a:r>
               <a:rPr lang="en-US" i="1" dirty="0">
-                <a:latin typeface="Intel Clear Light" panose="020B0404020203020204" pitchFamily="34" charset="0"/>
+                <a:latin typeface="Calibri (Body)"/>
                 <a:ea typeface="Intel Clear Light" panose="020B0404020203020204" pitchFamily="34" charset="0"/>
                 <a:cs typeface="Intel Clear Light" panose="020B0404020203020204" pitchFamily="34" charset="0"/>
               </a:rPr>
@@ -18554,7 +18570,7 @@
             </a:r>
             <a:r>
               <a:rPr lang="en-US" b="1" i="1" dirty="0">
-                <a:latin typeface="Intel Clear Light" panose="020B0404020203020204" pitchFamily="34" charset="0"/>
+                <a:latin typeface="Calibri (Body)"/>
                 <a:ea typeface="Intel Clear Light" panose="020B0404020203020204" pitchFamily="34" charset="0"/>
                 <a:cs typeface="Intel Clear Light" panose="020B0404020203020204" pitchFamily="34" charset="0"/>
               </a:rPr>
@@ -18562,7 +18578,7 @@
             </a:r>
             <a:r>
               <a:rPr lang="ru-RU" b="1" i="1" dirty="0">
-                <a:latin typeface="Intel Clear Light" panose="020B0404020203020204" pitchFamily="34" charset="0"/>
+                <a:latin typeface="Calibri (Body)"/>
                 <a:ea typeface="Intel Clear Light" panose="020B0404020203020204" pitchFamily="34" charset="0"/>
                 <a:cs typeface="Intel Clear Light" panose="020B0404020203020204" pitchFamily="34" charset="0"/>
               </a:rPr>
@@ -18570,14 +18586,14 @@
             </a:r>
             <a:r>
               <a:rPr lang="en-US" b="1" i="1" dirty="0">
-                <a:latin typeface="Intel Clear Light" panose="020B0404020203020204" pitchFamily="34" charset="0"/>
+                <a:latin typeface="Calibri (Body)"/>
                 <a:ea typeface="Intel Clear Light" panose="020B0404020203020204" pitchFamily="34" charset="0"/>
                 <a:cs typeface="Intel Clear Light" panose="020B0404020203020204" pitchFamily="34" charset="0"/>
               </a:rPr>
               <a:t>O(1)	     </a:t>
             </a:r>
             <a:endParaRPr lang="en-US" i="1" dirty="0">
-              <a:latin typeface="Intel Clear Light" panose="020B0404020203020204" pitchFamily="34" charset="0"/>
+              <a:latin typeface="Calibri (Body)"/>
               <a:ea typeface="Intel Clear Light" panose="020B0404020203020204" pitchFamily="34" charset="0"/>
               <a:cs typeface="Intel Clear Light" panose="020B0404020203020204" pitchFamily="34" charset="0"/>
             </a:endParaRPr>
@@ -18668,7 +18684,7 @@
           <a:p>
             <a:r>
               <a:rPr lang="en-US" dirty="0">
-                <a:latin typeface="Intel Clear Pro Bold" panose="020B0804020202060201" pitchFamily="34" charset="-52"/>
+                <a:latin typeface="Calibri (Body)"/>
                 <a:ea typeface="Intel Clear Pro Bold" panose="020B0804020202060201" pitchFamily="34" charset="-52"/>
                 <a:cs typeface="Intel Clear Pro Bold" panose="020B0804020202060201" pitchFamily="34" charset="-52"/>
               </a:rPr>
@@ -19006,7 +19022,7 @@
           <a:p>
             <a:r>
               <a:rPr lang="en-US" dirty="0">
-                <a:latin typeface="Intel Clear Pro Bold" panose="020B0804020202060201" pitchFamily="34" charset="-52"/>
+                <a:latin typeface="Calibri (Body)"/>
                 <a:ea typeface="Intel Clear Pro Bold" panose="020B0804020202060201" pitchFamily="34" charset="-52"/>
                 <a:cs typeface="Intel Clear Pro Bold" panose="020B0804020202060201" pitchFamily="34" charset="-52"/>
               </a:rPr>
@@ -19185,7 +19201,7 @@
           <a:p>
             <a:r>
               <a:rPr lang="en-US" sz="2000" i="1" dirty="0">
-                <a:latin typeface="Intel Clear Light" panose="020B0404020203020204" pitchFamily="34" charset="0"/>
+                <a:latin typeface="Calibri (Body)"/>
                 <a:ea typeface="Intel Clear Light" panose="020B0404020203020204" pitchFamily="34" charset="0"/>
                 <a:cs typeface="Intel Clear Light" panose="020B0404020203020204" pitchFamily="34" charset="0"/>
               </a:rPr>
@@ -19195,7 +19211,7 @@
           <a:p>
             <a:r>
               <a:rPr lang="en-US" sz="2000" i="1" dirty="0">
-                <a:latin typeface="Intel Clear Light" panose="020B0404020203020204" pitchFamily="34" charset="0"/>
+                <a:latin typeface="Calibri (Body)"/>
                 <a:ea typeface="Intel Clear Light" panose="020B0404020203020204" pitchFamily="34" charset="0"/>
                 <a:cs typeface="Intel Clear Light" panose="020B0404020203020204" pitchFamily="34" charset="0"/>
               </a:rPr>
@@ -19205,7 +19221,7 @@
           <a:p>
             <a:r>
               <a:rPr lang="en-US" sz="2000" i="1" dirty="0">
-                <a:latin typeface="Intel Clear Light" panose="020B0404020203020204" pitchFamily="34" charset="0"/>
+                <a:latin typeface="Calibri (Body)"/>
                 <a:ea typeface="Intel Clear Light" panose="020B0404020203020204" pitchFamily="34" charset="0"/>
                 <a:cs typeface="Intel Clear Light" panose="020B0404020203020204" pitchFamily="34" charset="0"/>
               </a:rPr>
@@ -19213,7 +19229,7 @@
             </a:r>
             <a:r>
               <a:rPr lang="en-US" sz="2000" i="1" dirty="0" err="1">
-                <a:latin typeface="Intel Clear Light" panose="020B0404020203020204" pitchFamily="34" charset="0"/>
+                <a:latin typeface="Calibri (Body)"/>
                 <a:ea typeface="Intel Clear Light" panose="020B0404020203020204" pitchFamily="34" charset="0"/>
                 <a:cs typeface="Intel Clear Light" panose="020B0404020203020204" pitchFamily="34" charset="0"/>
               </a:rPr>
@@ -19221,7 +19237,7 @@
             </a:r>
             <a:r>
               <a:rPr lang="en-US" sz="2000" i="1" dirty="0">
-                <a:latin typeface="Intel Clear Light" panose="020B0404020203020204" pitchFamily="34" charset="0"/>
+                <a:latin typeface="Calibri (Body)"/>
                 <a:ea typeface="Intel Clear Light" panose="020B0404020203020204" pitchFamily="34" charset="0"/>
                 <a:cs typeface="Intel Clear Light" panose="020B0404020203020204" pitchFamily="34" charset="0"/>
               </a:rPr>
@@ -19229,7 +19245,7 @@
             </a:r>
             <a:r>
               <a:rPr lang="en-US" sz="2000" b="1" i="1" dirty="0">
-                <a:latin typeface="Intel Clear Light" panose="020B0404020203020204" pitchFamily="34" charset="0"/>
+                <a:latin typeface="Calibri (Body)"/>
                 <a:ea typeface="Intel Clear Light" panose="020B0404020203020204" pitchFamily="34" charset="0"/>
                 <a:cs typeface="Intel Clear Light" panose="020B0404020203020204" pitchFamily="34" charset="0"/>
               </a:rPr>
@@ -19237,14 +19253,14 @@
             </a:r>
             <a:r>
               <a:rPr lang="en-US" b="1" i="1" dirty="0">
-                <a:latin typeface="Intel Clear Light" panose="020B0404020203020204" pitchFamily="34" charset="0"/>
+                <a:latin typeface="Calibri (Body)"/>
                 <a:ea typeface="Intel Clear Light" panose="020B0404020203020204" pitchFamily="34" charset="0"/>
                 <a:cs typeface="Intel Clear Light" panose="020B0404020203020204" pitchFamily="34" charset="0"/>
               </a:rPr>
               <a:t>		     </a:t>
             </a:r>
             <a:endParaRPr lang="en-US" i="1" dirty="0">
-              <a:latin typeface="Intel Clear Light" panose="020B0404020203020204" pitchFamily="34" charset="0"/>
+              <a:latin typeface="Calibri (Body)"/>
               <a:ea typeface="Intel Clear Light" panose="020B0404020203020204" pitchFamily="34" charset="0"/>
               <a:cs typeface="Intel Clear Light" panose="020B0404020203020204" pitchFamily="34" charset="0"/>
             </a:endParaRPr>
@@ -19305,11 +19321,15 @@
           <a:lstStyle/>
           <a:p>
             <a:fld id="{EE2556C5-CE8C-6547-B838-EA80C61A4AF7}" type="slidenum">
-              <a:rPr lang="en-US" smtClean="0"/>
+              <a:rPr lang="en-US" smtClean="0">
+                <a:latin typeface="Calibri (Body)"/>
+              </a:rPr>
               <a:pPr/>
               <a:t>28</a:t>
             </a:fld>
-            <a:endParaRPr lang="en-US" dirty="0"/>
+            <a:endParaRPr lang="en-US" dirty="0">
+              <a:latin typeface="Calibri (Body)"/>
+            </a:endParaRPr>
           </a:p>
         </p:txBody>
       </p:sp>
@@ -19335,7 +19355,7 @@
           <a:p>
             <a:r>
               <a:rPr lang="en-US" dirty="0">
-                <a:latin typeface="Intel Clear Pro Bold" panose="020B0804020202060201" pitchFamily="34" charset="-52"/>
+                <a:latin typeface="Calibri (Body)"/>
                 <a:ea typeface="Intel Clear Pro Bold" panose="020B0804020202060201" pitchFamily="34" charset="-52"/>
                 <a:cs typeface="Intel Clear Pro Bold" panose="020B0804020202060201" pitchFamily="34" charset="-52"/>
               </a:rPr>
@@ -19638,7 +19658,7 @@
           <a:p>
             <a:r>
               <a:rPr lang="en-US" dirty="0">
-                <a:latin typeface="Intel Clear Pro Bold" panose="020B0804020202060201" pitchFamily="34" charset="-52"/>
+                <a:latin typeface="Calibri (Body)"/>
                 <a:ea typeface="Intel Clear Pro Bold" panose="020B0804020202060201" pitchFamily="34" charset="-52"/>
                 <a:cs typeface="Intel Clear Pro Bold" panose="020B0804020202060201" pitchFamily="34" charset="-52"/>
               </a:rPr>
@@ -19647,7 +19667,7 @@
           </a:p>
           <a:p>
             <a:endParaRPr lang="en-US" dirty="0">
-              <a:latin typeface="Intel Clear Pro Bold" panose="020B0804020202060201" pitchFamily="34" charset="-52"/>
+              <a:latin typeface="Calibri (Body)"/>
               <a:ea typeface="Intel Clear Pro Bold" panose="020B0804020202060201" pitchFamily="34" charset="-52"/>
               <a:cs typeface="Intel Clear Pro Bold" panose="020B0804020202060201" pitchFamily="34" charset="-52"/>
             </a:endParaRPr>
@@ -19824,7 +19844,7 @@
           <a:p>
             <a:r>
               <a:rPr lang="en-US" i="1" dirty="0">
-                <a:latin typeface="Intel Clear Light" panose="020B0404020203020204" pitchFamily="34" charset="0"/>
+                <a:latin typeface="Calibri (Body)"/>
                 <a:ea typeface="Intel Clear Light" panose="020B0404020203020204" pitchFamily="34" charset="0"/>
                 <a:cs typeface="Intel Clear Light" panose="020B0404020203020204" pitchFamily="34" charset="0"/>
               </a:rPr>
@@ -19834,7 +19854,7 @@
           <a:p>
             <a:r>
               <a:rPr lang="en-US" i="1" dirty="0">
-                <a:latin typeface="Intel Clear Light" panose="020B0404020203020204" pitchFamily="34" charset="0"/>
+                <a:latin typeface="Calibri (Body)"/>
                 <a:ea typeface="Intel Clear Light" panose="020B0404020203020204" pitchFamily="34" charset="0"/>
                 <a:cs typeface="Intel Clear Light" panose="020B0404020203020204" pitchFamily="34" charset="0"/>
               </a:rPr>
@@ -19844,7 +19864,7 @@
           <a:p>
             <a:r>
               <a:rPr lang="en-US" i="1" dirty="0">
-                <a:latin typeface="Intel Clear Light" panose="020B0404020203020204" pitchFamily="34" charset="0"/>
+                <a:latin typeface="Calibri (Body)"/>
                 <a:ea typeface="Intel Clear Light" panose="020B0404020203020204" pitchFamily="34" charset="0"/>
                 <a:cs typeface="Intel Clear Light" panose="020B0404020203020204" pitchFamily="34" charset="0"/>
               </a:rPr>
@@ -19852,7 +19872,7 @@
             </a:r>
             <a:r>
               <a:rPr lang="en-US" i="1" dirty="0" err="1">
-                <a:latin typeface="Intel Clear Light" panose="020B0404020203020204" pitchFamily="34" charset="0"/>
+                <a:latin typeface="Calibri (Body)"/>
                 <a:ea typeface="Intel Clear Light" panose="020B0404020203020204" pitchFamily="34" charset="0"/>
                 <a:cs typeface="Intel Clear Light" panose="020B0404020203020204" pitchFamily="34" charset="0"/>
               </a:rPr>
@@ -19860,7 +19880,7 @@
             </a:r>
             <a:r>
               <a:rPr lang="en-US" i="1" dirty="0">
-                <a:latin typeface="Intel Clear Light" panose="020B0404020203020204" pitchFamily="34" charset="0"/>
+                <a:latin typeface="Calibri (Body)"/>
                 <a:ea typeface="Intel Clear Light" panose="020B0404020203020204" pitchFamily="34" charset="0"/>
                 <a:cs typeface="Intel Clear Light" panose="020B0404020203020204" pitchFamily="34" charset="0"/>
               </a:rPr>
@@ -19870,7 +19890,7 @@
           <a:p>
             <a:r>
               <a:rPr lang="en-US" i="1" dirty="0">
-                <a:latin typeface="Intel Clear Light" panose="020B0404020203020204" pitchFamily="34" charset="0"/>
+                <a:latin typeface="Calibri (Body)"/>
                 <a:ea typeface="Intel Clear Light" panose="020B0404020203020204" pitchFamily="34" charset="0"/>
                 <a:cs typeface="Intel Clear Light" panose="020B0404020203020204" pitchFamily="34" charset="0"/>
               </a:rPr>
@@ -19878,7 +19898,7 @@
             </a:r>
             <a:r>
               <a:rPr lang="en-US" i="1" dirty="0" err="1">
-                <a:latin typeface="Intel Clear Light" panose="020B0404020203020204" pitchFamily="34" charset="0"/>
+                <a:latin typeface="Calibri (Body)"/>
                 <a:ea typeface="Intel Clear Light" panose="020B0404020203020204" pitchFamily="34" charset="0"/>
                 <a:cs typeface="Intel Clear Light" panose="020B0404020203020204" pitchFamily="34" charset="0"/>
               </a:rPr>
@@ -19886,7 +19906,7 @@
             </a:r>
             <a:r>
               <a:rPr lang="en-US" i="1" dirty="0">
-                <a:latin typeface="Intel Clear Light" panose="020B0404020203020204" pitchFamily="34" charset="0"/>
+                <a:latin typeface="Calibri (Body)"/>
                 <a:ea typeface="Intel Clear Light" panose="020B0404020203020204" pitchFamily="34" charset="0"/>
                 <a:cs typeface="Intel Clear Light" panose="020B0404020203020204" pitchFamily="34" charset="0"/>
               </a:rPr>
@@ -19987,7 +20007,7 @@
                 <a:solidFill>
                   <a:schemeClr val="tx1"/>
                 </a:solidFill>
-                <a:latin typeface="Intel Clear Pro Bold" panose="020B0804020202060201" pitchFamily="34" charset="-52"/>
+                <a:latin typeface="+mn-lt"/>
                 <a:ea typeface="Intel Clear Pro Bold" panose="020B0804020202060201" pitchFamily="34" charset="-52"/>
                 <a:cs typeface="Intel Clear Pro Bold" panose="020B0804020202060201" pitchFamily="34" charset="-52"/>
               </a:rPr>
@@ -19997,7 +20017,7 @@
               <a:solidFill>
                 <a:schemeClr val="tx1"/>
               </a:solidFill>
-              <a:latin typeface="Intel Clear Pro Bold" panose="020B0804020202060201" pitchFamily="34" charset="-52"/>
+              <a:latin typeface="+mn-lt"/>
               <a:ea typeface="Intel Clear Pro Bold" panose="020B0804020202060201" pitchFamily="34" charset="-52"/>
               <a:cs typeface="Intel Clear Pro Bold" panose="020B0804020202060201" pitchFamily="34" charset="-52"/>
             </a:endParaRPr>
@@ -20241,7 +20261,7 @@
                 <a:solidFill>
                   <a:schemeClr val="tx1"/>
                 </a:solidFill>
-                <a:latin typeface="Intel Clear Pro Bold" panose="020B0804020202060201" pitchFamily="34" charset="-52"/>
+                <a:latin typeface="+mn-lt"/>
                 <a:ea typeface="Intel Clear Pro Bold" panose="020B0804020202060201" pitchFamily="34" charset="-52"/>
                 <a:cs typeface="Intel Clear Pro Bold" panose="020B0804020202060201" pitchFamily="34" charset="-52"/>
               </a:rPr>
@@ -20251,7 +20271,7 @@
               <a:solidFill>
                 <a:schemeClr val="tx1"/>
               </a:solidFill>
-              <a:latin typeface="Intel Clear Pro Bold" panose="020B0804020202060201" pitchFamily="34" charset="-52"/>
+              <a:latin typeface="+mn-lt"/>
               <a:ea typeface="Intel Clear Pro Bold" panose="020B0804020202060201" pitchFamily="34" charset="-52"/>
               <a:cs typeface="Intel Clear Pro Bold" panose="020B0804020202060201" pitchFamily="34" charset="-52"/>
             </a:endParaRPr>
@@ -20542,7 +20562,7 @@
                 <a:solidFill>
                   <a:schemeClr val="tx1"/>
                 </a:solidFill>
-                <a:latin typeface="Intel Clear Pro Bold" panose="020B0804020202060201" pitchFamily="34" charset="-52"/>
+                <a:latin typeface="+mn-lt"/>
                 <a:ea typeface="Intel Clear Pro Bold" panose="020B0804020202060201" pitchFamily="34" charset="-52"/>
                 <a:cs typeface="Intel Clear Pro Bold" panose="020B0804020202060201" pitchFamily="34" charset="-52"/>
               </a:rPr>
@@ -20574,7 +20594,6 @@
             <a:pPr marL="342900" indent="-342900"/>
             <a:r>
               <a:rPr lang="en-US" sz="2000" b="1" dirty="0">
-                <a:latin typeface="Intel Clear Light" panose="020B0404020203020204" pitchFamily="34" charset="0"/>
                 <a:ea typeface="Intel Clear Light" panose="020B0404020203020204" pitchFamily="34" charset="0"/>
                 <a:cs typeface="Intel Clear Light" panose="020B0404020203020204" pitchFamily="34" charset="0"/>
               </a:rPr>
@@ -20585,7 +20604,6 @@
             <a:pPr marL="342900" indent="-342900"/>
             <a:r>
               <a:rPr lang="en-US" sz="2000" b="1" dirty="0">
-                <a:latin typeface="Intel Clear Light" panose="020B0404020203020204" pitchFamily="34" charset="0"/>
                 <a:ea typeface="Intel Clear Light" panose="020B0404020203020204" pitchFamily="34" charset="0"/>
                 <a:cs typeface="Intel Clear Light" panose="020B0404020203020204" pitchFamily="34" charset="0"/>
               </a:rPr>
@@ -20596,7 +20614,6 @@
             <a:pPr marL="342900" indent="-342900"/>
             <a:r>
               <a:rPr lang="en-US" sz="2000" b="1" dirty="0">
-                <a:latin typeface="Intel Clear Light" panose="020B0404020203020204" pitchFamily="34" charset="0"/>
                 <a:ea typeface="Intel Clear Light" panose="020B0404020203020204" pitchFamily="34" charset="0"/>
                 <a:cs typeface="Intel Clear Light" panose="020B0404020203020204" pitchFamily="34" charset="0"/>
               </a:rPr>
@@ -20607,7 +20624,6 @@
             <a:pPr marL="342900" indent="-342900"/>
             <a:r>
               <a:rPr lang="en-US" sz="2000" b="1" dirty="0">
-                <a:latin typeface="Intel Clear Light" panose="020B0404020203020204" pitchFamily="34" charset="0"/>
                 <a:ea typeface="Intel Clear Light" panose="020B0404020203020204" pitchFamily="34" charset="0"/>
                 <a:cs typeface="Intel Clear Light" panose="020B0404020203020204" pitchFamily="34" charset="0"/>
               </a:rPr>
@@ -20619,7 +20635,6 @@
               <a:buNone/>
             </a:pPr>
             <a:endParaRPr lang="ru-RU" sz="2000" b="1" dirty="0">
-              <a:latin typeface="Intel Clear Light" panose="020B0404020203020204" pitchFamily="34" charset="0"/>
               <a:ea typeface="Intel Clear Light" panose="020B0404020203020204" pitchFamily="34" charset="0"/>
               <a:cs typeface="Intel Clear Light" panose="020B0404020203020204" pitchFamily="34" charset="0"/>
             </a:endParaRPr>
@@ -20678,7 +20693,7 @@
                 <a:solidFill>
                   <a:schemeClr val="tx1"/>
                 </a:solidFill>
-                <a:latin typeface="Intel Clear Pro Bold" panose="020B0804020202060201" pitchFamily="34" charset="-52"/>
+                <a:latin typeface="+mn-lt"/>
                 <a:ea typeface="Intel Clear Pro Bold" panose="020B0804020202060201" pitchFamily="34" charset="-52"/>
                 <a:cs typeface="Intel Clear Pro Bold" panose="020B0804020202060201" pitchFamily="34" charset="-52"/>
               </a:rPr>
@@ -20882,7 +20897,6 @@
             <a:pPr marL="342900" indent="-342900"/>
             <a:r>
               <a:rPr lang="en-US" sz="2000" b="1" dirty="0">
-                <a:latin typeface="Intel Clear Light" panose="020B0404020203020204" pitchFamily="34" charset="0"/>
                 <a:ea typeface="Intel Clear Light" panose="020B0404020203020204" pitchFamily="34" charset="0"/>
                 <a:cs typeface="Intel Clear Light" panose="020B0404020203020204" pitchFamily="34" charset="0"/>
               </a:rPr>
@@ -20895,7 +20909,6 @@
               <a:buNone/>
             </a:pPr>
             <a:endParaRPr lang="ru-RU" sz="2000" b="1" dirty="0">
-              <a:latin typeface="Intel Clear Light" panose="020B0404020203020204" pitchFamily="34" charset="0"/>
               <a:ea typeface="Intel Clear Light" panose="020B0404020203020204" pitchFamily="34" charset="0"/>
               <a:cs typeface="Intel Clear Light" panose="020B0404020203020204" pitchFamily="34" charset="0"/>
             </a:endParaRPr>
@@ -21108,7 +21121,6 @@
           <a:p>
             <a:r>
               <a:rPr lang="en-US" sz="2100" b="1" dirty="0">
-                <a:latin typeface="Intel Clear Light" panose="020B0404020203020204" pitchFamily="34" charset="0"/>
                 <a:ea typeface="Intel Clear Light" panose="020B0404020203020204" pitchFamily="34" charset="0"/>
                 <a:cs typeface="Intel Clear Light" panose="020B0404020203020204" pitchFamily="34" charset="0"/>
               </a:rPr>
@@ -21118,7 +21130,6 @@
           <a:p>
             <a:r>
               <a:rPr lang="en-US" sz="2100" b="1" dirty="0">
-                <a:latin typeface="Intel Clear Light" panose="020B0404020203020204" pitchFamily="34" charset="0"/>
                 <a:ea typeface="Intel Clear Light" panose="020B0404020203020204" pitchFamily="34" charset="0"/>
                 <a:cs typeface="Intel Clear Light" panose="020B0404020203020204" pitchFamily="34" charset="0"/>
               </a:rPr>
@@ -21128,7 +21139,6 @@
           <a:p>
             <a:r>
               <a:rPr lang="en-US" sz="2100" b="1" dirty="0">
-                <a:latin typeface="Intel Clear Light" panose="020B0404020203020204" pitchFamily="34" charset="0"/>
                 <a:ea typeface="Intel Clear Light" panose="020B0404020203020204" pitchFamily="34" charset="0"/>
                 <a:cs typeface="Intel Clear Light" panose="020B0404020203020204" pitchFamily="34" charset="0"/>
               </a:rPr>
@@ -21138,7 +21148,6 @@
           <a:p>
             <a:r>
               <a:rPr lang="en-US" sz="2100" b="1" dirty="0">
-                <a:latin typeface="Intel Clear Light" panose="020B0404020203020204" pitchFamily="34" charset="0"/>
                 <a:ea typeface="Intel Clear Light" panose="020B0404020203020204" pitchFamily="34" charset="0"/>
                 <a:cs typeface="Intel Clear Light" panose="020B0404020203020204" pitchFamily="34" charset="0"/>
               </a:rPr>
@@ -21146,7 +21155,6 @@
             </a:r>
             <a:r>
               <a:rPr lang="en-US" sz="2100" b="1" dirty="0" err="1">
-                <a:latin typeface="Intel Clear Light" panose="020B0404020203020204" pitchFamily="34" charset="0"/>
                 <a:ea typeface="Intel Clear Light" panose="020B0404020203020204" pitchFamily="34" charset="0"/>
                 <a:cs typeface="Intel Clear Light" panose="020B0404020203020204" pitchFamily="34" charset="0"/>
               </a:rPr>
@@ -21154,7 +21162,6 @@
             </a:r>
             <a:r>
               <a:rPr lang="en-US" sz="2100" b="1" dirty="0">
-                <a:latin typeface="Intel Clear Light" panose="020B0404020203020204" pitchFamily="34" charset="0"/>
                 <a:ea typeface="Intel Clear Light" panose="020B0404020203020204" pitchFamily="34" charset="0"/>
                 <a:cs typeface="Intel Clear Light" panose="020B0404020203020204" pitchFamily="34" charset="0"/>
               </a:rPr>
@@ -21164,7 +21171,6 @@
           <a:p>
             <a:r>
               <a:rPr lang="en-US" sz="2100" b="1" dirty="0">
-                <a:latin typeface="Intel Clear Light" panose="020B0404020203020204" pitchFamily="34" charset="0"/>
                 <a:ea typeface="Intel Clear Light" panose="020B0404020203020204" pitchFamily="34" charset="0"/>
                 <a:cs typeface="Intel Clear Light" panose="020B0404020203020204" pitchFamily="34" charset="0"/>
               </a:rPr>
@@ -21173,7 +21179,6 @@
           </a:p>
           <a:p>
             <a:endParaRPr lang="en-US" dirty="0">
-              <a:latin typeface="Intel Clear Light" panose="020B0404020203020204" pitchFamily="34" charset="0"/>
               <a:ea typeface="Intel Clear Light" panose="020B0404020203020204" pitchFamily="34" charset="0"/>
               <a:cs typeface="Intel Clear Light" panose="020B0404020203020204" pitchFamily="34" charset="0"/>
             </a:endParaRPr>
@@ -21226,7 +21231,7 @@
           <a:p>
             <a:r>
               <a:rPr lang="en-US" dirty="0">
-                <a:latin typeface="Intel Clear Pro Bold" panose="020B0804020202060201" pitchFamily="34" charset="-52"/>
+                <a:latin typeface="+mn-lt"/>
                 <a:ea typeface="Intel Clear Pro Bold" panose="020B0804020202060201" pitchFamily="34" charset="-52"/>
                 <a:cs typeface="Intel Clear Pro Bold" panose="020B0804020202060201" pitchFamily="34" charset="-52"/>
               </a:rPr>
@@ -21668,7 +21673,7 @@
           <a:p>
             <a:r>
               <a:rPr lang="en-US" dirty="0">
-                <a:latin typeface="Intel Clear Pro Bold" panose="020B0804020202060201" pitchFamily="34" charset="-52"/>
+                <a:latin typeface="+mn-lt"/>
                 <a:ea typeface="Intel Clear Pro Bold" panose="020B0804020202060201" pitchFamily="34" charset="-52"/>
                 <a:cs typeface="Intel Clear Pro Bold" panose="020B0804020202060201" pitchFamily="34" charset="-52"/>
               </a:rPr>
@@ -21731,6 +21736,7 @@
                 <a:solidFill>
                   <a:srgbClr val="FF0000"/>
                 </a:solidFill>
+                <a:latin typeface="+mj-lt"/>
               </a:rPr>
               <a:t>7</a:t>
             </a:r>
@@ -21791,6 +21797,7 @@
                 <a:solidFill>
                   <a:srgbClr val="FF0000"/>
                 </a:solidFill>
+                <a:latin typeface="+mj-lt"/>
               </a:rPr>
               <a:t>1</a:t>
             </a:r>
@@ -21851,6 +21858,7 @@
                 <a:solidFill>
                   <a:srgbClr val="FF0000"/>
                 </a:solidFill>
+                <a:latin typeface="+mj-lt"/>
               </a:rPr>
               <a:t>3</a:t>
             </a:r>
@@ -21911,6 +21919,7 @@
                 <a:solidFill>
                   <a:srgbClr val="FF0000"/>
                 </a:solidFill>
+                <a:latin typeface="+mj-lt"/>
               </a:rPr>
               <a:t>0</a:t>
             </a:r>
@@ -21971,6 +21980,7 @@
                 <a:solidFill>
                   <a:srgbClr val="FF0000"/>
                 </a:solidFill>
+                <a:latin typeface="+mj-lt"/>
               </a:rPr>
               <a:t>0</a:t>
             </a:r>
@@ -22026,7 +22036,9 @@
           <a:lstStyle/>
           <a:p>
             <a:pPr algn="ctr"/>
-            <a:endParaRPr lang="en-US"/>
+            <a:endParaRPr lang="en-US">
+              <a:latin typeface="+mj-lt"/>
+            </a:endParaRPr>
           </a:p>
         </p:txBody>
       </p:sp>
@@ -22079,7 +22091,9 @@
           <a:lstStyle/>
           <a:p>
             <a:pPr algn="ctr"/>
-            <a:endParaRPr lang="en-US"/>
+            <a:endParaRPr lang="en-US">
+              <a:latin typeface="+mj-lt"/>
+            </a:endParaRPr>
           </a:p>
         </p:txBody>
       </p:sp>
@@ -22132,7 +22146,9 @@
           <a:lstStyle/>
           <a:p>
             <a:pPr algn="ctr"/>
-            <a:endParaRPr lang="en-US"/>
+            <a:endParaRPr lang="en-US">
+              <a:latin typeface="+mj-lt"/>
+            </a:endParaRPr>
           </a:p>
         </p:txBody>
       </p:sp>
@@ -22401,7 +22417,7 @@
           <a:p>
             <a:r>
               <a:rPr lang="en-US" dirty="0">
-                <a:latin typeface="Intel Clear Pro Bold" panose="020B0804020202060201" pitchFamily="34" charset="-52"/>
+                <a:latin typeface="Calibri (Body)"/>
                 <a:ea typeface="Intel Clear Pro Bold" panose="020B0804020202060201" pitchFamily="34" charset="-52"/>
                 <a:cs typeface="Intel Clear Pro Bold" panose="020B0804020202060201" pitchFamily="34" charset="-52"/>
               </a:rPr>
@@ -23123,7 +23139,7 @@
           <a:p>
             <a:r>
               <a:rPr lang="en-US" dirty="0">
-                <a:latin typeface="Intel Clear Pro Bold" panose="020B0804020202060201" pitchFamily="34" charset="-52"/>
+                <a:latin typeface="+mn-lt"/>
                 <a:ea typeface="Intel Clear Pro Bold" panose="020B0804020202060201" pitchFamily="34" charset="-52"/>
                 <a:cs typeface="Intel Clear Pro Bold" panose="020B0804020202060201" pitchFamily="34" charset="-52"/>
               </a:rPr>

</xml_diff>